<commit_message>
Add integration marker 2
</commit_message>
<xml_diff>
--- a/apps/data_processing/aruco_marker/aruco_marker_creation/marker_img/integration_marker.pptx
+++ b/apps/data_processing/aruco_marker/aruco_marker_creation/marker_img/integration_marker.pptx
@@ -2,13 +2,14 @@
 <file path=ppt/presentation.xml><?xml version="1.0" encoding="utf-8"?>
 <p:presentation xmlns:a="http://schemas.openxmlformats.org/drawingml/2006/main" xmlns:r="http://schemas.openxmlformats.org/officeDocument/2006/relationships" xmlns:p="http://schemas.openxmlformats.org/presentationml/2006/main" saveSubsetFonts="1">
   <p:sldMasterIdLst>
-    <p:sldMasterId id="2147483660" r:id="rId1"/>
+    <p:sldMasterId id="2147483672" r:id="rId1"/>
   </p:sldMasterIdLst>
   <p:sldIdLst>
     <p:sldId id="256" r:id="rId2"/>
     <p:sldId id="257" r:id="rId3"/>
+    <p:sldId id="258" r:id="rId4"/>
   </p:sldIdLst>
-  <p:sldSz cx="30275213" cy="42803763"/>
+  <p:sldSz cx="43200638" cy="43200638"/>
   <p:notesSz cx="6858000" cy="9144000"/>
   <p:defaultTextStyle>
     <a:defPPr>
@@ -142,15 +143,15 @@
         </p:nvSpPr>
         <p:spPr>
           <a:xfrm>
-            <a:off x="2270641" y="7005156"/>
-            <a:ext cx="25733931" cy="14902051"/>
+            <a:off x="3240048" y="7070130"/>
+            <a:ext cx="36720542" cy="15040222"/>
           </a:xfrm>
         </p:spPr>
         <p:txBody>
           <a:bodyPr anchor="b"/>
           <a:lstStyle>
             <a:lvl1pPr algn="ctr">
-              <a:defRPr sz="19865"/>
+              <a:defRPr sz="28341"/>
             </a:lvl1pPr>
           </a:lstStyle>
           <a:p>
@@ -174,8 +175,8 @@
         </p:nvSpPr>
         <p:spPr>
           <a:xfrm>
-            <a:off x="3784402" y="22481887"/>
-            <a:ext cx="22706410" cy="10334331"/>
+            <a:off x="5400087" y="22690359"/>
+            <a:ext cx="32400479" cy="10430154"/>
           </a:xfrm>
         </p:spPr>
         <p:txBody>
@@ -183,39 +184,39 @@
           <a:lstStyle>
             <a:lvl1pPr marL="0" indent="0" algn="ctr">
               <a:buNone/>
-              <a:defRPr sz="7946"/>
+              <a:defRPr sz="11335"/>
             </a:lvl1pPr>
-            <a:lvl2pPr marL="1513743" indent="0" algn="ctr">
-              <a:buNone/>
-              <a:defRPr sz="6622"/>
+            <a:lvl2pPr marL="2159784" indent="0" algn="ctr">
+              <a:buNone/>
+              <a:defRPr sz="9447"/>
             </a:lvl2pPr>
-            <a:lvl3pPr marL="3027487" indent="0" algn="ctr">
-              <a:buNone/>
-              <a:defRPr sz="5960"/>
+            <a:lvl3pPr marL="4319569" indent="0" algn="ctr">
+              <a:buNone/>
+              <a:defRPr sz="8503"/>
             </a:lvl3pPr>
-            <a:lvl4pPr marL="4541230" indent="0" algn="ctr">
-              <a:buNone/>
-              <a:defRPr sz="5297"/>
+            <a:lvl4pPr marL="6479362" indent="0" algn="ctr">
+              <a:buNone/>
+              <a:defRPr sz="7559"/>
             </a:lvl4pPr>
-            <a:lvl5pPr marL="6054974" indent="0" algn="ctr">
-              <a:buNone/>
-              <a:defRPr sz="5297"/>
+            <a:lvl5pPr marL="8639146" indent="0" algn="ctr">
+              <a:buNone/>
+              <a:defRPr sz="7559"/>
             </a:lvl5pPr>
-            <a:lvl6pPr marL="7568717" indent="0" algn="ctr">
-              <a:buNone/>
-              <a:defRPr sz="5297"/>
+            <a:lvl6pPr marL="10798931" indent="0" algn="ctr">
+              <a:buNone/>
+              <a:defRPr sz="7559"/>
             </a:lvl6pPr>
-            <a:lvl7pPr marL="9082461" indent="0" algn="ctr">
-              <a:buNone/>
-              <a:defRPr sz="5297"/>
+            <a:lvl7pPr marL="12958715" indent="0" algn="ctr">
+              <a:buNone/>
+              <a:defRPr sz="7559"/>
             </a:lvl7pPr>
-            <a:lvl8pPr marL="10596204" indent="0" algn="ctr">
-              <a:buNone/>
-              <a:defRPr sz="5297"/>
+            <a:lvl8pPr marL="15118499" indent="0" algn="ctr">
+              <a:buNone/>
+              <a:defRPr sz="7559"/>
             </a:lvl8pPr>
-            <a:lvl9pPr marL="12109948" indent="0" algn="ctr">
-              <a:buNone/>
-              <a:defRPr sz="5297"/>
+            <a:lvl9pPr marL="17278284" indent="0" algn="ctr">
+              <a:buNone/>
+              <a:defRPr sz="7559"/>
             </a:lvl9pPr>
           </a:lstStyle>
           <a:p>
@@ -244,7 +245,7 @@
           <a:p>
             <a:fld id="{C8A4090B-3ADF-4090-9EE5-2E9D826556F2}" type="datetimeFigureOut">
               <a:rPr lang="en-US" smtClean="0"/>
-              <a:t>7/7/2021</a:t>
+              <a:t>10/7/2021</a:t>
             </a:fld>
             <a:endParaRPr lang="en-US"/>
           </a:p>
@@ -295,7 +296,7 @@
     </p:spTree>
     <p:extLst>
       <p:ext uri="{BB962C8B-B14F-4D97-AF65-F5344CB8AC3E}">
-        <p14:creationId xmlns:p14="http://schemas.microsoft.com/office/powerpoint/2010/main" val="3314845852"/>
+        <p14:creationId xmlns:p14="http://schemas.microsoft.com/office/powerpoint/2010/main" val="3307929859"/>
       </p:ext>
     </p:extLst>
   </p:cSld>
@@ -414,7 +415,7 @@
           <a:p>
             <a:fld id="{C8A4090B-3ADF-4090-9EE5-2E9D826556F2}" type="datetimeFigureOut">
               <a:rPr lang="en-US" smtClean="0"/>
-              <a:t>7/7/2021</a:t>
+              <a:t>10/7/2021</a:t>
             </a:fld>
             <a:endParaRPr lang="en-US"/>
           </a:p>
@@ -465,7 +466,7 @@
     </p:spTree>
     <p:extLst>
       <p:ext uri="{BB962C8B-B14F-4D97-AF65-F5344CB8AC3E}">
-        <p14:creationId xmlns:p14="http://schemas.microsoft.com/office/powerpoint/2010/main" val="1535591716"/>
+        <p14:creationId xmlns:p14="http://schemas.microsoft.com/office/powerpoint/2010/main" val="285050302"/>
       </p:ext>
     </p:extLst>
   </p:cSld>
@@ -504,8 +505,8 @@
         </p:nvSpPr>
         <p:spPr>
           <a:xfrm>
-            <a:off x="21665701" y="2278904"/>
-            <a:ext cx="6528093" cy="36274211"/>
+            <a:off x="30915459" y="2300035"/>
+            <a:ext cx="9315138" cy="36610540"/>
           </a:xfrm>
         </p:spPr>
         <p:txBody>
@@ -532,8 +533,8 @@
         </p:nvSpPr>
         <p:spPr>
           <a:xfrm>
-            <a:off x="2081423" y="2278904"/>
-            <a:ext cx="19205838" cy="36274211"/>
+            <a:off x="2970047" y="2300035"/>
+            <a:ext cx="27405405" cy="36610540"/>
           </a:xfrm>
         </p:spPr>
         <p:txBody>
@@ -594,7 +595,7 @@
           <a:p>
             <a:fld id="{C8A4090B-3ADF-4090-9EE5-2E9D826556F2}" type="datetimeFigureOut">
               <a:rPr lang="en-US" smtClean="0"/>
-              <a:t>7/7/2021</a:t>
+              <a:t>10/7/2021</a:t>
             </a:fld>
             <a:endParaRPr lang="en-US"/>
           </a:p>
@@ -645,7 +646,7 @@
     </p:spTree>
     <p:extLst>
       <p:ext uri="{BB962C8B-B14F-4D97-AF65-F5344CB8AC3E}">
-        <p14:creationId xmlns:p14="http://schemas.microsoft.com/office/powerpoint/2010/main" val="2039305081"/>
+        <p14:creationId xmlns:p14="http://schemas.microsoft.com/office/powerpoint/2010/main" val="728777166"/>
       </p:ext>
     </p:extLst>
   </p:cSld>
@@ -764,7 +765,7 @@
           <a:p>
             <a:fld id="{C8A4090B-3ADF-4090-9EE5-2E9D826556F2}" type="datetimeFigureOut">
               <a:rPr lang="en-US" smtClean="0"/>
-              <a:t>7/7/2021</a:t>
+              <a:t>10/7/2021</a:t>
             </a:fld>
             <a:endParaRPr lang="en-US"/>
           </a:p>
@@ -815,7 +816,7 @@
     </p:spTree>
     <p:extLst>
       <p:ext uri="{BB962C8B-B14F-4D97-AF65-F5344CB8AC3E}">
-        <p14:creationId xmlns:p14="http://schemas.microsoft.com/office/powerpoint/2010/main" val="3450824392"/>
+        <p14:creationId xmlns:p14="http://schemas.microsoft.com/office/powerpoint/2010/main" val="3741835959"/>
       </p:ext>
     </p:extLst>
   </p:cSld>
@@ -854,15 +855,15 @@
         </p:nvSpPr>
         <p:spPr>
           <a:xfrm>
-            <a:off x="2065654" y="10671229"/>
-            <a:ext cx="26112371" cy="17805173"/>
+            <a:off x="2947546" y="10770174"/>
+            <a:ext cx="37260550" cy="17970259"/>
           </a:xfrm>
         </p:spPr>
         <p:txBody>
           <a:bodyPr anchor="b"/>
           <a:lstStyle>
             <a:lvl1pPr>
-              <a:defRPr sz="19865"/>
+              <a:defRPr sz="28341"/>
             </a:lvl1pPr>
           </a:lstStyle>
           <a:p>
@@ -886,8 +887,8 @@
         </p:nvSpPr>
         <p:spPr>
           <a:xfrm>
-            <a:off x="2065654" y="28644846"/>
-            <a:ext cx="26112371" cy="9363320"/>
+            <a:off x="2947546" y="28910441"/>
+            <a:ext cx="37260550" cy="9450134"/>
           </a:xfrm>
         </p:spPr>
         <p:txBody>
@@ -895,15 +896,15 @@
           <a:lstStyle>
             <a:lvl1pPr marL="0" indent="0">
               <a:buNone/>
-              <a:defRPr sz="7946">
+              <a:defRPr sz="11335">
                 <a:solidFill>
                   <a:schemeClr val="tx1"/>
                 </a:solidFill>
               </a:defRPr>
             </a:lvl1pPr>
-            <a:lvl2pPr marL="1513743" indent="0">
-              <a:buNone/>
-              <a:defRPr sz="6622">
+            <a:lvl2pPr marL="2159784" indent="0">
+              <a:buNone/>
+              <a:defRPr sz="9447">
                 <a:solidFill>
                   <a:schemeClr val="tx1">
                     <a:tint val="75000"/>
@@ -911,9 +912,9 @@
                 </a:solidFill>
               </a:defRPr>
             </a:lvl2pPr>
-            <a:lvl3pPr marL="3027487" indent="0">
-              <a:buNone/>
-              <a:defRPr sz="5960">
+            <a:lvl3pPr marL="4319569" indent="0">
+              <a:buNone/>
+              <a:defRPr sz="8503">
                 <a:solidFill>
                   <a:schemeClr val="tx1">
                     <a:tint val="75000"/>
@@ -921,9 +922,9 @@
                 </a:solidFill>
               </a:defRPr>
             </a:lvl3pPr>
-            <a:lvl4pPr marL="4541230" indent="0">
-              <a:buNone/>
-              <a:defRPr sz="5297">
+            <a:lvl4pPr marL="6479362" indent="0">
+              <a:buNone/>
+              <a:defRPr sz="7559">
                 <a:solidFill>
                   <a:schemeClr val="tx1">
                     <a:tint val="75000"/>
@@ -931,9 +932,9 @@
                 </a:solidFill>
               </a:defRPr>
             </a:lvl4pPr>
-            <a:lvl5pPr marL="6054974" indent="0">
-              <a:buNone/>
-              <a:defRPr sz="5297">
+            <a:lvl5pPr marL="8639146" indent="0">
+              <a:buNone/>
+              <a:defRPr sz="7559">
                 <a:solidFill>
                   <a:schemeClr val="tx1">
                     <a:tint val="75000"/>
@@ -941,9 +942,9 @@
                 </a:solidFill>
               </a:defRPr>
             </a:lvl5pPr>
-            <a:lvl6pPr marL="7568717" indent="0">
-              <a:buNone/>
-              <a:defRPr sz="5297">
+            <a:lvl6pPr marL="10798931" indent="0">
+              <a:buNone/>
+              <a:defRPr sz="7559">
                 <a:solidFill>
                   <a:schemeClr val="tx1">
                     <a:tint val="75000"/>
@@ -951,9 +952,9 @@
                 </a:solidFill>
               </a:defRPr>
             </a:lvl6pPr>
-            <a:lvl7pPr marL="9082461" indent="0">
-              <a:buNone/>
-              <a:defRPr sz="5297">
+            <a:lvl7pPr marL="12958715" indent="0">
+              <a:buNone/>
+              <a:defRPr sz="7559">
                 <a:solidFill>
                   <a:schemeClr val="tx1">
                     <a:tint val="75000"/>
@@ -961,9 +962,9 @@
                 </a:solidFill>
               </a:defRPr>
             </a:lvl7pPr>
-            <a:lvl8pPr marL="10596204" indent="0">
-              <a:buNone/>
-              <a:defRPr sz="5297">
+            <a:lvl8pPr marL="15118499" indent="0">
+              <a:buNone/>
+              <a:defRPr sz="7559">
                 <a:solidFill>
                   <a:schemeClr val="tx1">
                     <a:tint val="75000"/>
@@ -971,9 +972,9 @@
                 </a:solidFill>
               </a:defRPr>
             </a:lvl8pPr>
-            <a:lvl9pPr marL="12109948" indent="0">
-              <a:buNone/>
-              <a:defRPr sz="5297">
+            <a:lvl9pPr marL="17278284" indent="0">
+              <a:buNone/>
+              <a:defRPr sz="7559">
                 <a:solidFill>
                   <a:schemeClr val="tx1">
                     <a:tint val="75000"/>
@@ -1008,7 +1009,7 @@
           <a:p>
             <a:fld id="{C8A4090B-3ADF-4090-9EE5-2E9D826556F2}" type="datetimeFigureOut">
               <a:rPr lang="en-US" smtClean="0"/>
-              <a:t>7/7/2021</a:t>
+              <a:t>10/7/2021</a:t>
             </a:fld>
             <a:endParaRPr lang="en-US"/>
           </a:p>
@@ -1059,7 +1060,7 @@
     </p:spTree>
     <p:extLst>
       <p:ext uri="{BB962C8B-B14F-4D97-AF65-F5344CB8AC3E}">
-        <p14:creationId xmlns:p14="http://schemas.microsoft.com/office/powerpoint/2010/main" val="1871109783"/>
+        <p14:creationId xmlns:p14="http://schemas.microsoft.com/office/powerpoint/2010/main" val="548068433"/>
       </p:ext>
     </p:extLst>
   </p:cSld>
@@ -1121,8 +1122,8 @@
         </p:nvSpPr>
         <p:spPr>
           <a:xfrm>
-            <a:off x="2081421" y="11394520"/>
-            <a:ext cx="12866966" cy="27158594"/>
+            <a:off x="2970052" y="11500193"/>
+            <a:ext cx="18360271" cy="27410411"/>
           </a:xfrm>
         </p:spPr>
         <p:txBody>
@@ -1178,8 +1179,8 @@
         </p:nvSpPr>
         <p:spPr>
           <a:xfrm>
-            <a:off x="15326826" y="11394520"/>
-            <a:ext cx="12866966" cy="27158594"/>
+            <a:off x="21870325" y="11500193"/>
+            <a:ext cx="18360271" cy="27410411"/>
           </a:xfrm>
         </p:spPr>
         <p:txBody>
@@ -1240,7 +1241,7 @@
           <a:p>
             <a:fld id="{C8A4090B-3ADF-4090-9EE5-2E9D826556F2}" type="datetimeFigureOut">
               <a:rPr lang="en-US" smtClean="0"/>
-              <a:t>7/7/2021</a:t>
+              <a:t>10/7/2021</a:t>
             </a:fld>
             <a:endParaRPr lang="en-US"/>
           </a:p>
@@ -1291,7 +1292,7 @@
     </p:spTree>
     <p:extLst>
       <p:ext uri="{BB962C8B-B14F-4D97-AF65-F5344CB8AC3E}">
-        <p14:creationId xmlns:p14="http://schemas.microsoft.com/office/powerpoint/2010/main" val="1022005536"/>
+        <p14:creationId xmlns:p14="http://schemas.microsoft.com/office/powerpoint/2010/main" val="2197818852"/>
       </p:ext>
     </p:extLst>
   </p:cSld>
@@ -1330,8 +1331,8 @@
         </p:nvSpPr>
         <p:spPr>
           <a:xfrm>
-            <a:off x="2085364" y="2278913"/>
-            <a:ext cx="26112371" cy="8273416"/>
+            <a:off x="2975671" y="2300046"/>
+            <a:ext cx="37260550" cy="8350128"/>
           </a:xfrm>
         </p:spPr>
         <p:txBody>
@@ -1358,8 +1359,8 @@
         </p:nvSpPr>
         <p:spPr>
           <a:xfrm>
-            <a:off x="2085368" y="10492870"/>
-            <a:ext cx="12807832" cy="5142393"/>
+            <a:off x="2975675" y="10590181"/>
+            <a:ext cx="18275892" cy="5190076"/>
           </a:xfrm>
         </p:spPr>
         <p:txBody>
@@ -1367,39 +1368,39 @@
           <a:lstStyle>
             <a:lvl1pPr marL="0" indent="0">
               <a:buNone/>
-              <a:defRPr sz="7946" b="1"/>
+              <a:defRPr sz="11335" b="1"/>
             </a:lvl1pPr>
-            <a:lvl2pPr marL="1513743" indent="0">
-              <a:buNone/>
-              <a:defRPr sz="6622" b="1"/>
+            <a:lvl2pPr marL="2159784" indent="0">
+              <a:buNone/>
+              <a:defRPr sz="9447" b="1"/>
             </a:lvl2pPr>
-            <a:lvl3pPr marL="3027487" indent="0">
-              <a:buNone/>
-              <a:defRPr sz="5960" b="1"/>
+            <a:lvl3pPr marL="4319569" indent="0">
+              <a:buNone/>
+              <a:defRPr sz="8503" b="1"/>
             </a:lvl3pPr>
-            <a:lvl4pPr marL="4541230" indent="0">
-              <a:buNone/>
-              <a:defRPr sz="5297" b="1"/>
+            <a:lvl4pPr marL="6479362" indent="0">
+              <a:buNone/>
+              <a:defRPr sz="7559" b="1"/>
             </a:lvl4pPr>
-            <a:lvl5pPr marL="6054974" indent="0">
-              <a:buNone/>
-              <a:defRPr sz="5297" b="1"/>
+            <a:lvl5pPr marL="8639146" indent="0">
+              <a:buNone/>
+              <a:defRPr sz="7559" b="1"/>
             </a:lvl5pPr>
-            <a:lvl6pPr marL="7568717" indent="0">
-              <a:buNone/>
-              <a:defRPr sz="5297" b="1"/>
+            <a:lvl6pPr marL="10798931" indent="0">
+              <a:buNone/>
+              <a:defRPr sz="7559" b="1"/>
             </a:lvl6pPr>
-            <a:lvl7pPr marL="9082461" indent="0">
-              <a:buNone/>
-              <a:defRPr sz="5297" b="1"/>
+            <a:lvl7pPr marL="12958715" indent="0">
+              <a:buNone/>
+              <a:defRPr sz="7559" b="1"/>
             </a:lvl7pPr>
-            <a:lvl8pPr marL="10596204" indent="0">
-              <a:buNone/>
-              <a:defRPr sz="5297" b="1"/>
+            <a:lvl8pPr marL="15118499" indent="0">
+              <a:buNone/>
+              <a:defRPr sz="7559" b="1"/>
             </a:lvl8pPr>
-            <a:lvl9pPr marL="12109948" indent="0">
-              <a:buNone/>
-              <a:defRPr sz="5297" b="1"/>
+            <a:lvl9pPr marL="17278284" indent="0">
+              <a:buNone/>
+              <a:defRPr sz="7559" b="1"/>
             </a:lvl9pPr>
           </a:lstStyle>
           <a:p>
@@ -1423,8 +1424,8 @@
         </p:nvSpPr>
         <p:spPr>
           <a:xfrm>
-            <a:off x="2085368" y="15635264"/>
-            <a:ext cx="12807832" cy="22997117"/>
+            <a:off x="2975675" y="15780240"/>
+            <a:ext cx="18275892" cy="23210346"/>
           </a:xfrm>
         </p:spPr>
         <p:txBody>
@@ -1480,8 +1481,8 @@
         </p:nvSpPr>
         <p:spPr>
           <a:xfrm>
-            <a:off x="15326828" y="10492870"/>
-            <a:ext cx="12870909" cy="5142393"/>
+            <a:off x="21870325" y="10590181"/>
+            <a:ext cx="18365898" cy="5190076"/>
           </a:xfrm>
         </p:spPr>
         <p:txBody>
@@ -1489,39 +1490,39 @@
           <a:lstStyle>
             <a:lvl1pPr marL="0" indent="0">
               <a:buNone/>
-              <a:defRPr sz="7946" b="1"/>
+              <a:defRPr sz="11335" b="1"/>
             </a:lvl1pPr>
-            <a:lvl2pPr marL="1513743" indent="0">
-              <a:buNone/>
-              <a:defRPr sz="6622" b="1"/>
+            <a:lvl2pPr marL="2159784" indent="0">
+              <a:buNone/>
+              <a:defRPr sz="9447" b="1"/>
             </a:lvl2pPr>
-            <a:lvl3pPr marL="3027487" indent="0">
-              <a:buNone/>
-              <a:defRPr sz="5960" b="1"/>
+            <a:lvl3pPr marL="4319569" indent="0">
+              <a:buNone/>
+              <a:defRPr sz="8503" b="1"/>
             </a:lvl3pPr>
-            <a:lvl4pPr marL="4541230" indent="0">
-              <a:buNone/>
-              <a:defRPr sz="5297" b="1"/>
+            <a:lvl4pPr marL="6479362" indent="0">
+              <a:buNone/>
+              <a:defRPr sz="7559" b="1"/>
             </a:lvl4pPr>
-            <a:lvl5pPr marL="6054974" indent="0">
-              <a:buNone/>
-              <a:defRPr sz="5297" b="1"/>
+            <a:lvl5pPr marL="8639146" indent="0">
+              <a:buNone/>
+              <a:defRPr sz="7559" b="1"/>
             </a:lvl5pPr>
-            <a:lvl6pPr marL="7568717" indent="0">
-              <a:buNone/>
-              <a:defRPr sz="5297" b="1"/>
+            <a:lvl6pPr marL="10798931" indent="0">
+              <a:buNone/>
+              <a:defRPr sz="7559" b="1"/>
             </a:lvl6pPr>
-            <a:lvl7pPr marL="9082461" indent="0">
-              <a:buNone/>
-              <a:defRPr sz="5297" b="1"/>
+            <a:lvl7pPr marL="12958715" indent="0">
+              <a:buNone/>
+              <a:defRPr sz="7559" b="1"/>
             </a:lvl7pPr>
-            <a:lvl8pPr marL="10596204" indent="0">
-              <a:buNone/>
-              <a:defRPr sz="5297" b="1"/>
+            <a:lvl8pPr marL="15118499" indent="0">
+              <a:buNone/>
+              <a:defRPr sz="7559" b="1"/>
             </a:lvl8pPr>
-            <a:lvl9pPr marL="12109948" indent="0">
-              <a:buNone/>
-              <a:defRPr sz="5297" b="1"/>
+            <a:lvl9pPr marL="17278284" indent="0">
+              <a:buNone/>
+              <a:defRPr sz="7559" b="1"/>
             </a:lvl9pPr>
           </a:lstStyle>
           <a:p>
@@ -1545,8 +1546,8 @@
         </p:nvSpPr>
         <p:spPr>
           <a:xfrm>
-            <a:off x="15326828" y="15635264"/>
-            <a:ext cx="12870909" cy="22997117"/>
+            <a:off x="21870325" y="15780240"/>
+            <a:ext cx="18365898" cy="23210346"/>
           </a:xfrm>
         </p:spPr>
         <p:txBody>
@@ -1607,7 +1608,7 @@
           <a:p>
             <a:fld id="{C8A4090B-3ADF-4090-9EE5-2E9D826556F2}" type="datetimeFigureOut">
               <a:rPr lang="en-US" smtClean="0"/>
-              <a:t>7/7/2021</a:t>
+              <a:t>10/7/2021</a:t>
             </a:fld>
             <a:endParaRPr lang="en-US"/>
           </a:p>
@@ -1658,7 +1659,7 @@
     </p:spTree>
     <p:extLst>
       <p:ext uri="{BB962C8B-B14F-4D97-AF65-F5344CB8AC3E}">
-        <p14:creationId xmlns:p14="http://schemas.microsoft.com/office/powerpoint/2010/main" val="723580618"/>
+        <p14:creationId xmlns:p14="http://schemas.microsoft.com/office/powerpoint/2010/main" val="597908966"/>
       </p:ext>
     </p:extLst>
   </p:cSld>
@@ -1725,7 +1726,7 @@
           <a:p>
             <a:fld id="{C8A4090B-3ADF-4090-9EE5-2E9D826556F2}" type="datetimeFigureOut">
               <a:rPr lang="en-US" smtClean="0"/>
-              <a:t>7/7/2021</a:t>
+              <a:t>10/7/2021</a:t>
             </a:fld>
             <a:endParaRPr lang="en-US"/>
           </a:p>
@@ -1776,7 +1777,7 @@
     </p:spTree>
     <p:extLst>
       <p:ext uri="{BB962C8B-B14F-4D97-AF65-F5344CB8AC3E}">
-        <p14:creationId xmlns:p14="http://schemas.microsoft.com/office/powerpoint/2010/main" val="4215394254"/>
+        <p14:creationId xmlns:p14="http://schemas.microsoft.com/office/powerpoint/2010/main" val="2031223852"/>
       </p:ext>
     </p:extLst>
   </p:cSld>
@@ -1820,7 +1821,7 @@
           <a:p>
             <a:fld id="{C8A4090B-3ADF-4090-9EE5-2E9D826556F2}" type="datetimeFigureOut">
               <a:rPr lang="en-US" smtClean="0"/>
-              <a:t>7/7/2021</a:t>
+              <a:t>10/7/2021</a:t>
             </a:fld>
             <a:endParaRPr lang="en-US"/>
           </a:p>
@@ -1871,7 +1872,7 @@
     </p:spTree>
     <p:extLst>
       <p:ext uri="{BB962C8B-B14F-4D97-AF65-F5344CB8AC3E}">
-        <p14:creationId xmlns:p14="http://schemas.microsoft.com/office/powerpoint/2010/main" val="4205017505"/>
+        <p14:creationId xmlns:p14="http://schemas.microsoft.com/office/powerpoint/2010/main" val="3682578128"/>
       </p:ext>
     </p:extLst>
   </p:cSld>
@@ -1910,15 +1911,15 @@
         </p:nvSpPr>
         <p:spPr>
           <a:xfrm>
-            <a:off x="2085364" y="2853584"/>
-            <a:ext cx="9764544" cy="9987545"/>
+            <a:off x="2975671" y="2880043"/>
+            <a:ext cx="13933330" cy="10080153"/>
           </a:xfrm>
         </p:spPr>
         <p:txBody>
           <a:bodyPr anchor="b"/>
           <a:lstStyle>
             <a:lvl1pPr>
-              <a:defRPr sz="10595"/>
+              <a:defRPr sz="15118"/>
             </a:lvl1pPr>
           </a:lstStyle>
           <a:p>
@@ -1942,39 +1943,39 @@
         </p:nvSpPr>
         <p:spPr>
           <a:xfrm>
-            <a:off x="12870909" y="6162959"/>
-            <a:ext cx="15326827" cy="30418415"/>
+            <a:off x="18365900" y="6220099"/>
+            <a:ext cx="21870323" cy="30700456"/>
           </a:xfrm>
         </p:spPr>
         <p:txBody>
           <a:bodyPr/>
           <a:lstStyle>
             <a:lvl1pPr>
-              <a:defRPr sz="10595"/>
+              <a:defRPr sz="15118"/>
             </a:lvl1pPr>
             <a:lvl2pPr>
-              <a:defRPr sz="9271"/>
+              <a:defRPr sz="13231"/>
             </a:lvl2pPr>
             <a:lvl3pPr>
-              <a:defRPr sz="7946"/>
+              <a:defRPr sz="11335"/>
             </a:lvl3pPr>
             <a:lvl4pPr>
-              <a:defRPr sz="6622"/>
+              <a:defRPr sz="9447"/>
             </a:lvl4pPr>
             <a:lvl5pPr>
-              <a:defRPr sz="6622"/>
+              <a:defRPr sz="9447"/>
             </a:lvl5pPr>
             <a:lvl6pPr>
-              <a:defRPr sz="6622"/>
+              <a:defRPr sz="9447"/>
             </a:lvl6pPr>
             <a:lvl7pPr>
-              <a:defRPr sz="6622"/>
+              <a:defRPr sz="9447"/>
             </a:lvl7pPr>
             <a:lvl8pPr>
-              <a:defRPr sz="6622"/>
+              <a:defRPr sz="9447"/>
             </a:lvl8pPr>
             <a:lvl9pPr>
-              <a:defRPr sz="6622"/>
+              <a:defRPr sz="9447"/>
             </a:lvl9pPr>
           </a:lstStyle>
           <a:p>
@@ -2027,8 +2028,8 @@
         </p:nvSpPr>
         <p:spPr>
           <a:xfrm>
-            <a:off x="2085364" y="12841129"/>
-            <a:ext cx="9764544" cy="23789780"/>
+            <a:off x="2975671" y="12960188"/>
+            <a:ext cx="13933330" cy="24010361"/>
           </a:xfrm>
         </p:spPr>
         <p:txBody>
@@ -2036,39 +2037,39 @@
           <a:lstStyle>
             <a:lvl1pPr marL="0" indent="0">
               <a:buNone/>
-              <a:defRPr sz="5297"/>
+              <a:defRPr sz="7559"/>
             </a:lvl1pPr>
-            <a:lvl2pPr marL="1513743" indent="0">
-              <a:buNone/>
-              <a:defRPr sz="4635"/>
+            <a:lvl2pPr marL="2159784" indent="0">
+              <a:buNone/>
+              <a:defRPr sz="6615"/>
             </a:lvl2pPr>
-            <a:lvl3pPr marL="3027487" indent="0">
-              <a:buNone/>
-              <a:defRPr sz="3973"/>
+            <a:lvl3pPr marL="4319569" indent="0">
+              <a:buNone/>
+              <a:defRPr sz="5671"/>
             </a:lvl3pPr>
-            <a:lvl4pPr marL="4541230" indent="0">
-              <a:buNone/>
-              <a:defRPr sz="3311"/>
+            <a:lvl4pPr marL="6479362" indent="0">
+              <a:buNone/>
+              <a:defRPr sz="4727"/>
             </a:lvl4pPr>
-            <a:lvl5pPr marL="6054974" indent="0">
-              <a:buNone/>
-              <a:defRPr sz="3311"/>
+            <a:lvl5pPr marL="8639146" indent="0">
+              <a:buNone/>
+              <a:defRPr sz="4727"/>
             </a:lvl5pPr>
-            <a:lvl6pPr marL="7568717" indent="0">
-              <a:buNone/>
-              <a:defRPr sz="3311"/>
+            <a:lvl6pPr marL="10798931" indent="0">
+              <a:buNone/>
+              <a:defRPr sz="4727"/>
             </a:lvl6pPr>
-            <a:lvl7pPr marL="9082461" indent="0">
-              <a:buNone/>
-              <a:defRPr sz="3311"/>
+            <a:lvl7pPr marL="12958715" indent="0">
+              <a:buNone/>
+              <a:defRPr sz="4727"/>
             </a:lvl7pPr>
-            <a:lvl8pPr marL="10596204" indent="0">
-              <a:buNone/>
-              <a:defRPr sz="3311"/>
+            <a:lvl8pPr marL="15118499" indent="0">
+              <a:buNone/>
+              <a:defRPr sz="4727"/>
             </a:lvl8pPr>
-            <a:lvl9pPr marL="12109948" indent="0">
-              <a:buNone/>
-              <a:defRPr sz="3311"/>
+            <a:lvl9pPr marL="17278284" indent="0">
+              <a:buNone/>
+              <a:defRPr sz="4727"/>
             </a:lvl9pPr>
           </a:lstStyle>
           <a:p>
@@ -2097,7 +2098,7 @@
           <a:p>
             <a:fld id="{C8A4090B-3ADF-4090-9EE5-2E9D826556F2}" type="datetimeFigureOut">
               <a:rPr lang="en-US" smtClean="0"/>
-              <a:t>7/7/2021</a:t>
+              <a:t>10/7/2021</a:t>
             </a:fld>
             <a:endParaRPr lang="en-US"/>
           </a:p>
@@ -2148,7 +2149,7 @@
     </p:spTree>
     <p:extLst>
       <p:ext uri="{BB962C8B-B14F-4D97-AF65-F5344CB8AC3E}">
-        <p14:creationId xmlns:p14="http://schemas.microsoft.com/office/powerpoint/2010/main" val="600044764"/>
+        <p14:creationId xmlns:p14="http://schemas.microsoft.com/office/powerpoint/2010/main" val="3210350357"/>
       </p:ext>
     </p:extLst>
   </p:cSld>
@@ -2187,15 +2188,15 @@
         </p:nvSpPr>
         <p:spPr>
           <a:xfrm>
-            <a:off x="2085364" y="2853584"/>
-            <a:ext cx="9764544" cy="9987545"/>
+            <a:off x="2975671" y="2880043"/>
+            <a:ext cx="13933330" cy="10080153"/>
           </a:xfrm>
         </p:spPr>
         <p:txBody>
           <a:bodyPr anchor="b"/>
           <a:lstStyle>
             <a:lvl1pPr>
-              <a:defRPr sz="10595"/>
+              <a:defRPr sz="15118"/>
             </a:lvl1pPr>
           </a:lstStyle>
           <a:p>
@@ -2219,8 +2220,8 @@
         </p:nvSpPr>
         <p:spPr>
           <a:xfrm>
-            <a:off x="12870909" y="6162959"/>
-            <a:ext cx="15326827" cy="30418415"/>
+            <a:off x="18365900" y="6220099"/>
+            <a:ext cx="21870323" cy="30700456"/>
           </a:xfrm>
         </p:spPr>
         <p:txBody>
@@ -2228,39 +2229,39 @@
           <a:lstStyle>
             <a:lvl1pPr marL="0" indent="0">
               <a:buNone/>
-              <a:defRPr sz="10595"/>
+              <a:defRPr sz="15118"/>
             </a:lvl1pPr>
-            <a:lvl2pPr marL="1513743" indent="0">
-              <a:buNone/>
-              <a:defRPr sz="9271"/>
+            <a:lvl2pPr marL="2159784" indent="0">
+              <a:buNone/>
+              <a:defRPr sz="13231"/>
             </a:lvl2pPr>
-            <a:lvl3pPr marL="3027487" indent="0">
-              <a:buNone/>
-              <a:defRPr sz="7946"/>
+            <a:lvl3pPr marL="4319569" indent="0">
+              <a:buNone/>
+              <a:defRPr sz="11335"/>
             </a:lvl3pPr>
-            <a:lvl4pPr marL="4541230" indent="0">
-              <a:buNone/>
-              <a:defRPr sz="6622"/>
+            <a:lvl4pPr marL="6479362" indent="0">
+              <a:buNone/>
+              <a:defRPr sz="9447"/>
             </a:lvl4pPr>
-            <a:lvl5pPr marL="6054974" indent="0">
-              <a:buNone/>
-              <a:defRPr sz="6622"/>
+            <a:lvl5pPr marL="8639146" indent="0">
+              <a:buNone/>
+              <a:defRPr sz="9447"/>
             </a:lvl5pPr>
-            <a:lvl6pPr marL="7568717" indent="0">
-              <a:buNone/>
-              <a:defRPr sz="6622"/>
+            <a:lvl6pPr marL="10798931" indent="0">
+              <a:buNone/>
+              <a:defRPr sz="9447"/>
             </a:lvl6pPr>
-            <a:lvl7pPr marL="9082461" indent="0">
-              <a:buNone/>
-              <a:defRPr sz="6622"/>
+            <a:lvl7pPr marL="12958715" indent="0">
+              <a:buNone/>
+              <a:defRPr sz="9447"/>
             </a:lvl7pPr>
-            <a:lvl8pPr marL="10596204" indent="0">
-              <a:buNone/>
-              <a:defRPr sz="6622"/>
+            <a:lvl8pPr marL="15118499" indent="0">
+              <a:buNone/>
+              <a:defRPr sz="9447"/>
             </a:lvl8pPr>
-            <a:lvl9pPr marL="12109948" indent="0">
-              <a:buNone/>
-              <a:defRPr sz="6622"/>
+            <a:lvl9pPr marL="17278284" indent="0">
+              <a:buNone/>
+              <a:defRPr sz="9447"/>
             </a:lvl9pPr>
           </a:lstStyle>
           <a:p>
@@ -2284,8 +2285,8 @@
         </p:nvSpPr>
         <p:spPr>
           <a:xfrm>
-            <a:off x="2085364" y="12841129"/>
-            <a:ext cx="9764544" cy="23789780"/>
+            <a:off x="2975671" y="12960188"/>
+            <a:ext cx="13933330" cy="24010361"/>
           </a:xfrm>
         </p:spPr>
         <p:txBody>
@@ -2293,39 +2294,39 @@
           <a:lstStyle>
             <a:lvl1pPr marL="0" indent="0">
               <a:buNone/>
-              <a:defRPr sz="5297"/>
+              <a:defRPr sz="7559"/>
             </a:lvl1pPr>
-            <a:lvl2pPr marL="1513743" indent="0">
-              <a:buNone/>
-              <a:defRPr sz="4635"/>
+            <a:lvl2pPr marL="2159784" indent="0">
+              <a:buNone/>
+              <a:defRPr sz="6615"/>
             </a:lvl2pPr>
-            <a:lvl3pPr marL="3027487" indent="0">
-              <a:buNone/>
-              <a:defRPr sz="3973"/>
+            <a:lvl3pPr marL="4319569" indent="0">
+              <a:buNone/>
+              <a:defRPr sz="5671"/>
             </a:lvl3pPr>
-            <a:lvl4pPr marL="4541230" indent="0">
-              <a:buNone/>
-              <a:defRPr sz="3311"/>
+            <a:lvl4pPr marL="6479362" indent="0">
+              <a:buNone/>
+              <a:defRPr sz="4727"/>
             </a:lvl4pPr>
-            <a:lvl5pPr marL="6054974" indent="0">
-              <a:buNone/>
-              <a:defRPr sz="3311"/>
+            <a:lvl5pPr marL="8639146" indent="0">
+              <a:buNone/>
+              <a:defRPr sz="4727"/>
             </a:lvl5pPr>
-            <a:lvl6pPr marL="7568717" indent="0">
-              <a:buNone/>
-              <a:defRPr sz="3311"/>
+            <a:lvl6pPr marL="10798931" indent="0">
+              <a:buNone/>
+              <a:defRPr sz="4727"/>
             </a:lvl6pPr>
-            <a:lvl7pPr marL="9082461" indent="0">
-              <a:buNone/>
-              <a:defRPr sz="3311"/>
+            <a:lvl7pPr marL="12958715" indent="0">
+              <a:buNone/>
+              <a:defRPr sz="4727"/>
             </a:lvl7pPr>
-            <a:lvl8pPr marL="10596204" indent="0">
-              <a:buNone/>
-              <a:defRPr sz="3311"/>
+            <a:lvl8pPr marL="15118499" indent="0">
+              <a:buNone/>
+              <a:defRPr sz="4727"/>
             </a:lvl8pPr>
-            <a:lvl9pPr marL="12109948" indent="0">
-              <a:buNone/>
-              <a:defRPr sz="3311"/>
+            <a:lvl9pPr marL="17278284" indent="0">
+              <a:buNone/>
+              <a:defRPr sz="4727"/>
             </a:lvl9pPr>
           </a:lstStyle>
           <a:p>
@@ -2354,7 +2355,7 @@
           <a:p>
             <a:fld id="{C8A4090B-3ADF-4090-9EE5-2E9D826556F2}" type="datetimeFigureOut">
               <a:rPr lang="en-US" smtClean="0"/>
-              <a:t>7/7/2021</a:t>
+              <a:t>10/7/2021</a:t>
             </a:fld>
             <a:endParaRPr lang="en-US"/>
           </a:p>
@@ -2405,7 +2406,7 @@
     </p:spTree>
     <p:extLst>
       <p:ext uri="{BB962C8B-B14F-4D97-AF65-F5344CB8AC3E}">
-        <p14:creationId xmlns:p14="http://schemas.microsoft.com/office/powerpoint/2010/main" val="1636729123"/>
+        <p14:creationId xmlns:p14="http://schemas.microsoft.com/office/powerpoint/2010/main" val="496035143"/>
       </p:ext>
     </p:extLst>
   </p:cSld>
@@ -2449,8 +2450,8 @@
         </p:nvSpPr>
         <p:spPr>
           <a:xfrm>
-            <a:off x="2081421" y="2278913"/>
-            <a:ext cx="26112371" cy="8273416"/>
+            <a:off x="2970044" y="2300046"/>
+            <a:ext cx="37260550" cy="8350128"/>
           </a:xfrm>
           <a:prstGeom prst="rect">
             <a:avLst/>
@@ -2482,8 +2483,8 @@
         </p:nvSpPr>
         <p:spPr>
           <a:xfrm>
-            <a:off x="2081421" y="11394520"/>
-            <a:ext cx="26112371" cy="27158594"/>
+            <a:off x="2970044" y="11500193"/>
+            <a:ext cx="37260550" cy="27410411"/>
           </a:xfrm>
           <a:prstGeom prst="rect">
             <a:avLst/>
@@ -2544,8 +2545,8 @@
         </p:nvSpPr>
         <p:spPr>
           <a:xfrm>
-            <a:off x="2081421" y="39672756"/>
-            <a:ext cx="6811923" cy="2278904"/>
+            <a:off x="2970044" y="40040603"/>
+            <a:ext cx="9720144" cy="2300034"/>
           </a:xfrm>
           <a:prstGeom prst="rect">
             <a:avLst/>
@@ -2555,7 +2556,7 @@
           <a:bodyPr vert="horz" lIns="91440" tIns="45720" rIns="91440" bIns="45720" rtlCol="0" anchor="ctr"/>
           <a:lstStyle>
             <a:lvl1pPr algn="l">
-              <a:defRPr sz="3973">
+              <a:defRPr sz="5671">
                 <a:solidFill>
                   <a:schemeClr val="tx1">
                     <a:tint val="75000"/>
@@ -2567,7 +2568,7 @@
           <a:p>
             <a:fld id="{C8A4090B-3ADF-4090-9EE5-2E9D826556F2}" type="datetimeFigureOut">
               <a:rPr lang="en-US" smtClean="0"/>
-              <a:t>7/7/2021</a:t>
+              <a:t>10/7/2021</a:t>
             </a:fld>
             <a:endParaRPr lang="en-US"/>
           </a:p>
@@ -2585,8 +2586,8 @@
         </p:nvSpPr>
         <p:spPr>
           <a:xfrm>
-            <a:off x="10028665" y="39672756"/>
-            <a:ext cx="10217884" cy="2278904"/>
+            <a:off x="14310219" y="40040603"/>
+            <a:ext cx="14580215" cy="2300034"/>
           </a:xfrm>
           <a:prstGeom prst="rect">
             <a:avLst/>
@@ -2596,7 +2597,7 @@
           <a:bodyPr vert="horz" lIns="91440" tIns="45720" rIns="91440" bIns="45720" rtlCol="0" anchor="ctr"/>
           <a:lstStyle>
             <a:lvl1pPr algn="ctr">
-              <a:defRPr sz="3973">
+              <a:defRPr sz="5671">
                 <a:solidFill>
                   <a:schemeClr val="tx1">
                     <a:tint val="75000"/>
@@ -2622,8 +2623,8 @@
         </p:nvSpPr>
         <p:spPr>
           <a:xfrm>
-            <a:off x="21381869" y="39672756"/>
-            <a:ext cx="6811923" cy="2278904"/>
+            <a:off x="30510450" y="40040603"/>
+            <a:ext cx="9720144" cy="2300034"/>
           </a:xfrm>
           <a:prstGeom prst="rect">
             <a:avLst/>
@@ -2633,7 +2634,7 @@
           <a:bodyPr vert="horz" lIns="91440" tIns="45720" rIns="91440" bIns="45720" rtlCol="0" anchor="ctr"/>
           <a:lstStyle>
             <a:lvl1pPr algn="r">
-              <a:defRPr sz="3973">
+              <a:defRPr sz="5671">
                 <a:solidFill>
                   <a:schemeClr val="tx1">
                     <a:tint val="75000"/>
@@ -2654,27 +2655,27 @@
     </p:spTree>
     <p:extLst>
       <p:ext uri="{BB962C8B-B14F-4D97-AF65-F5344CB8AC3E}">
-        <p14:creationId xmlns:p14="http://schemas.microsoft.com/office/powerpoint/2010/main" val="1323769968"/>
+        <p14:creationId xmlns:p14="http://schemas.microsoft.com/office/powerpoint/2010/main" val="3892097522"/>
       </p:ext>
     </p:extLst>
   </p:cSld>
   <p:clrMap bg1="lt1" tx1="dk1" bg2="lt2" tx2="dk2" accent1="accent1" accent2="accent2" accent3="accent3" accent4="accent4" accent5="accent5" accent6="accent6" hlink="hlink" folHlink="folHlink"/>
   <p:sldLayoutIdLst>
-    <p:sldLayoutId id="2147483661" r:id="rId1"/>
-    <p:sldLayoutId id="2147483662" r:id="rId2"/>
-    <p:sldLayoutId id="2147483663" r:id="rId3"/>
-    <p:sldLayoutId id="2147483664" r:id="rId4"/>
-    <p:sldLayoutId id="2147483665" r:id="rId5"/>
-    <p:sldLayoutId id="2147483666" r:id="rId6"/>
-    <p:sldLayoutId id="2147483667" r:id="rId7"/>
-    <p:sldLayoutId id="2147483668" r:id="rId8"/>
-    <p:sldLayoutId id="2147483669" r:id="rId9"/>
-    <p:sldLayoutId id="2147483670" r:id="rId10"/>
-    <p:sldLayoutId id="2147483671" r:id="rId11"/>
+    <p:sldLayoutId id="2147483673" r:id="rId1"/>
+    <p:sldLayoutId id="2147483674" r:id="rId2"/>
+    <p:sldLayoutId id="2147483675" r:id="rId3"/>
+    <p:sldLayoutId id="2147483676" r:id="rId4"/>
+    <p:sldLayoutId id="2147483677" r:id="rId5"/>
+    <p:sldLayoutId id="2147483678" r:id="rId6"/>
+    <p:sldLayoutId id="2147483679" r:id="rId7"/>
+    <p:sldLayoutId id="2147483680" r:id="rId8"/>
+    <p:sldLayoutId id="2147483681" r:id="rId9"/>
+    <p:sldLayoutId id="2147483682" r:id="rId10"/>
+    <p:sldLayoutId id="2147483683" r:id="rId11"/>
   </p:sldLayoutIdLst>
   <p:txStyles>
     <p:titleStyle>
-      <a:lvl1pPr algn="l" defTabSz="3027487" rtl="0" eaLnBrk="1" latinLnBrk="0" hangingPunct="1">
+      <a:lvl1pPr algn="l" defTabSz="4319569" rtl="0" eaLnBrk="1" latinLnBrk="0" hangingPunct="1">
         <a:lnSpc>
           <a:spcPct val="90000"/>
         </a:lnSpc>
@@ -2682,7 +2683,7 @@
           <a:spcPct val="0"/>
         </a:spcBef>
         <a:buNone/>
-        <a:defRPr sz="14568" kern="1200">
+        <a:defRPr sz="20790" kern="1200">
           <a:solidFill>
             <a:schemeClr val="tx1"/>
           </a:solidFill>
@@ -2693,16 +2694,16 @@
       </a:lvl1pPr>
     </p:titleStyle>
     <p:bodyStyle>
-      <a:lvl1pPr marL="756872" indent="-756872" algn="l" defTabSz="3027487" rtl="0" eaLnBrk="1" latinLnBrk="0" hangingPunct="1">
+      <a:lvl1pPr marL="1079896" indent="-1079896" algn="l" defTabSz="4319569" rtl="0" eaLnBrk="1" latinLnBrk="0" hangingPunct="1">
         <a:lnSpc>
           <a:spcPct val="90000"/>
         </a:lnSpc>
         <a:spcBef>
-          <a:spcPts val="3311"/>
+          <a:spcPts val="4727"/>
         </a:spcBef>
         <a:buFont typeface="Arial" panose="020B0604020202020204" pitchFamily="34" charset="0"/>
         <a:buChar char="•"/>
-        <a:defRPr sz="9271" kern="1200">
+        <a:defRPr sz="13231" kern="1200">
           <a:solidFill>
             <a:schemeClr val="tx1"/>
           </a:solidFill>
@@ -2711,16 +2712,16 @@
           <a:cs typeface="+mn-cs"/>
         </a:defRPr>
       </a:lvl1pPr>
-      <a:lvl2pPr marL="2270615" indent="-756872" algn="l" defTabSz="3027487" rtl="0" eaLnBrk="1" latinLnBrk="0" hangingPunct="1">
+      <a:lvl2pPr marL="3239680" indent="-1079896" algn="l" defTabSz="4319569" rtl="0" eaLnBrk="1" latinLnBrk="0" hangingPunct="1">
         <a:lnSpc>
           <a:spcPct val="90000"/>
         </a:lnSpc>
         <a:spcBef>
-          <a:spcPts val="1655"/>
+          <a:spcPts val="2360"/>
         </a:spcBef>
         <a:buFont typeface="Arial" panose="020B0604020202020204" pitchFamily="34" charset="0"/>
         <a:buChar char="•"/>
-        <a:defRPr sz="7946" kern="1200">
+        <a:defRPr sz="11335" kern="1200">
           <a:solidFill>
             <a:schemeClr val="tx1"/>
           </a:solidFill>
@@ -2729,16 +2730,16 @@
           <a:cs typeface="+mn-cs"/>
         </a:defRPr>
       </a:lvl2pPr>
-      <a:lvl3pPr marL="3784359" indent="-756872" algn="l" defTabSz="3027487" rtl="0" eaLnBrk="1" latinLnBrk="0" hangingPunct="1">
+      <a:lvl3pPr marL="5399465" indent="-1079896" algn="l" defTabSz="4319569" rtl="0" eaLnBrk="1" latinLnBrk="0" hangingPunct="1">
         <a:lnSpc>
           <a:spcPct val="90000"/>
         </a:lnSpc>
         <a:spcBef>
-          <a:spcPts val="1655"/>
+          <a:spcPts val="2360"/>
         </a:spcBef>
         <a:buFont typeface="Arial" panose="020B0604020202020204" pitchFamily="34" charset="0"/>
         <a:buChar char="•"/>
-        <a:defRPr sz="6622" kern="1200">
+        <a:defRPr sz="9447" kern="1200">
           <a:solidFill>
             <a:schemeClr val="tx1"/>
           </a:solidFill>
@@ -2747,16 +2748,16 @@
           <a:cs typeface="+mn-cs"/>
         </a:defRPr>
       </a:lvl3pPr>
-      <a:lvl4pPr marL="5298102" indent="-756872" algn="l" defTabSz="3027487" rtl="0" eaLnBrk="1" latinLnBrk="0" hangingPunct="1">
+      <a:lvl4pPr marL="7559249" indent="-1079896" algn="l" defTabSz="4319569" rtl="0" eaLnBrk="1" latinLnBrk="0" hangingPunct="1">
         <a:lnSpc>
           <a:spcPct val="90000"/>
         </a:lnSpc>
         <a:spcBef>
-          <a:spcPts val="1655"/>
+          <a:spcPts val="2360"/>
         </a:spcBef>
         <a:buFont typeface="Arial" panose="020B0604020202020204" pitchFamily="34" charset="0"/>
         <a:buChar char="•"/>
-        <a:defRPr sz="5960" kern="1200">
+        <a:defRPr sz="8503" kern="1200">
           <a:solidFill>
             <a:schemeClr val="tx1"/>
           </a:solidFill>
@@ -2765,16 +2766,16 @@
           <a:cs typeface="+mn-cs"/>
         </a:defRPr>
       </a:lvl4pPr>
-      <a:lvl5pPr marL="6811846" indent="-756872" algn="l" defTabSz="3027487" rtl="0" eaLnBrk="1" latinLnBrk="0" hangingPunct="1">
+      <a:lvl5pPr marL="9719034" indent="-1079896" algn="l" defTabSz="4319569" rtl="0" eaLnBrk="1" latinLnBrk="0" hangingPunct="1">
         <a:lnSpc>
           <a:spcPct val="90000"/>
         </a:lnSpc>
         <a:spcBef>
-          <a:spcPts val="1655"/>
+          <a:spcPts val="2360"/>
         </a:spcBef>
         <a:buFont typeface="Arial" panose="020B0604020202020204" pitchFamily="34" charset="0"/>
         <a:buChar char="•"/>
-        <a:defRPr sz="5960" kern="1200">
+        <a:defRPr sz="8503" kern="1200">
           <a:solidFill>
             <a:schemeClr val="tx1"/>
           </a:solidFill>
@@ -2783,16 +2784,16 @@
           <a:cs typeface="+mn-cs"/>
         </a:defRPr>
       </a:lvl5pPr>
-      <a:lvl6pPr marL="8325589" indent="-756872" algn="l" defTabSz="3027487" rtl="0" eaLnBrk="1" latinLnBrk="0" hangingPunct="1">
+      <a:lvl6pPr marL="11878827" indent="-1079896" algn="l" defTabSz="4319569" rtl="0" eaLnBrk="1" latinLnBrk="0" hangingPunct="1">
         <a:lnSpc>
           <a:spcPct val="90000"/>
         </a:lnSpc>
         <a:spcBef>
-          <a:spcPts val="1655"/>
+          <a:spcPts val="2360"/>
         </a:spcBef>
         <a:buFont typeface="Arial" panose="020B0604020202020204" pitchFamily="34" charset="0"/>
         <a:buChar char="•"/>
-        <a:defRPr sz="5960" kern="1200">
+        <a:defRPr sz="8503" kern="1200">
           <a:solidFill>
             <a:schemeClr val="tx1"/>
           </a:solidFill>
@@ -2801,16 +2802,16 @@
           <a:cs typeface="+mn-cs"/>
         </a:defRPr>
       </a:lvl6pPr>
-      <a:lvl7pPr marL="9839333" indent="-756872" algn="l" defTabSz="3027487" rtl="0" eaLnBrk="1" latinLnBrk="0" hangingPunct="1">
+      <a:lvl7pPr marL="14038611" indent="-1079896" algn="l" defTabSz="4319569" rtl="0" eaLnBrk="1" latinLnBrk="0" hangingPunct="1">
         <a:lnSpc>
           <a:spcPct val="90000"/>
         </a:lnSpc>
         <a:spcBef>
-          <a:spcPts val="1655"/>
+          <a:spcPts val="2360"/>
         </a:spcBef>
         <a:buFont typeface="Arial" panose="020B0604020202020204" pitchFamily="34" charset="0"/>
         <a:buChar char="•"/>
-        <a:defRPr sz="5960" kern="1200">
+        <a:defRPr sz="8503" kern="1200">
           <a:solidFill>
             <a:schemeClr val="tx1"/>
           </a:solidFill>
@@ -2819,16 +2820,16 @@
           <a:cs typeface="+mn-cs"/>
         </a:defRPr>
       </a:lvl7pPr>
-      <a:lvl8pPr marL="11353076" indent="-756872" algn="l" defTabSz="3027487" rtl="0" eaLnBrk="1" latinLnBrk="0" hangingPunct="1">
+      <a:lvl8pPr marL="16198395" indent="-1079896" algn="l" defTabSz="4319569" rtl="0" eaLnBrk="1" latinLnBrk="0" hangingPunct="1">
         <a:lnSpc>
           <a:spcPct val="90000"/>
         </a:lnSpc>
         <a:spcBef>
-          <a:spcPts val="1655"/>
+          <a:spcPts val="2360"/>
         </a:spcBef>
         <a:buFont typeface="Arial" panose="020B0604020202020204" pitchFamily="34" charset="0"/>
         <a:buChar char="•"/>
-        <a:defRPr sz="5960" kern="1200">
+        <a:defRPr sz="8503" kern="1200">
           <a:solidFill>
             <a:schemeClr val="tx1"/>
           </a:solidFill>
@@ -2837,16 +2838,16 @@
           <a:cs typeface="+mn-cs"/>
         </a:defRPr>
       </a:lvl8pPr>
-      <a:lvl9pPr marL="12866820" indent="-756872" algn="l" defTabSz="3027487" rtl="0" eaLnBrk="1" latinLnBrk="0" hangingPunct="1">
+      <a:lvl9pPr marL="18358180" indent="-1079896" algn="l" defTabSz="4319569" rtl="0" eaLnBrk="1" latinLnBrk="0" hangingPunct="1">
         <a:lnSpc>
           <a:spcPct val="90000"/>
         </a:lnSpc>
         <a:spcBef>
-          <a:spcPts val="1655"/>
+          <a:spcPts val="2360"/>
         </a:spcBef>
         <a:buFont typeface="Arial" panose="020B0604020202020204" pitchFamily="34" charset="0"/>
         <a:buChar char="•"/>
-        <a:defRPr sz="5960" kern="1200">
+        <a:defRPr sz="8503" kern="1200">
           <a:solidFill>
             <a:schemeClr val="tx1"/>
           </a:solidFill>
@@ -2860,8 +2861,8 @@
       <a:defPPr>
         <a:defRPr lang="en-US"/>
       </a:defPPr>
-      <a:lvl1pPr marL="0" algn="l" defTabSz="3027487" rtl="0" eaLnBrk="1" latinLnBrk="0" hangingPunct="1">
-        <a:defRPr sz="5960" kern="1200">
+      <a:lvl1pPr marL="0" algn="l" defTabSz="4319569" rtl="0" eaLnBrk="1" latinLnBrk="0" hangingPunct="1">
+        <a:defRPr sz="8503" kern="1200">
           <a:solidFill>
             <a:schemeClr val="tx1"/>
           </a:solidFill>
@@ -2870,8 +2871,8 @@
           <a:cs typeface="+mn-cs"/>
         </a:defRPr>
       </a:lvl1pPr>
-      <a:lvl2pPr marL="1513743" algn="l" defTabSz="3027487" rtl="0" eaLnBrk="1" latinLnBrk="0" hangingPunct="1">
-        <a:defRPr sz="5960" kern="1200">
+      <a:lvl2pPr marL="2159784" algn="l" defTabSz="4319569" rtl="0" eaLnBrk="1" latinLnBrk="0" hangingPunct="1">
+        <a:defRPr sz="8503" kern="1200">
           <a:solidFill>
             <a:schemeClr val="tx1"/>
           </a:solidFill>
@@ -2880,8 +2881,8 @@
           <a:cs typeface="+mn-cs"/>
         </a:defRPr>
       </a:lvl2pPr>
-      <a:lvl3pPr marL="3027487" algn="l" defTabSz="3027487" rtl="0" eaLnBrk="1" latinLnBrk="0" hangingPunct="1">
-        <a:defRPr sz="5960" kern="1200">
+      <a:lvl3pPr marL="4319569" algn="l" defTabSz="4319569" rtl="0" eaLnBrk="1" latinLnBrk="0" hangingPunct="1">
+        <a:defRPr sz="8503" kern="1200">
           <a:solidFill>
             <a:schemeClr val="tx1"/>
           </a:solidFill>
@@ -2890,8 +2891,8 @@
           <a:cs typeface="+mn-cs"/>
         </a:defRPr>
       </a:lvl3pPr>
-      <a:lvl4pPr marL="4541230" algn="l" defTabSz="3027487" rtl="0" eaLnBrk="1" latinLnBrk="0" hangingPunct="1">
-        <a:defRPr sz="5960" kern="1200">
+      <a:lvl4pPr marL="6479362" algn="l" defTabSz="4319569" rtl="0" eaLnBrk="1" latinLnBrk="0" hangingPunct="1">
+        <a:defRPr sz="8503" kern="1200">
           <a:solidFill>
             <a:schemeClr val="tx1"/>
           </a:solidFill>
@@ -2900,8 +2901,8 @@
           <a:cs typeface="+mn-cs"/>
         </a:defRPr>
       </a:lvl4pPr>
-      <a:lvl5pPr marL="6054974" algn="l" defTabSz="3027487" rtl="0" eaLnBrk="1" latinLnBrk="0" hangingPunct="1">
-        <a:defRPr sz="5960" kern="1200">
+      <a:lvl5pPr marL="8639146" algn="l" defTabSz="4319569" rtl="0" eaLnBrk="1" latinLnBrk="0" hangingPunct="1">
+        <a:defRPr sz="8503" kern="1200">
           <a:solidFill>
             <a:schemeClr val="tx1"/>
           </a:solidFill>
@@ -2910,8 +2911,8 @@
           <a:cs typeface="+mn-cs"/>
         </a:defRPr>
       </a:lvl5pPr>
-      <a:lvl6pPr marL="7568717" algn="l" defTabSz="3027487" rtl="0" eaLnBrk="1" latinLnBrk="0" hangingPunct="1">
-        <a:defRPr sz="5960" kern="1200">
+      <a:lvl6pPr marL="10798931" algn="l" defTabSz="4319569" rtl="0" eaLnBrk="1" latinLnBrk="0" hangingPunct="1">
+        <a:defRPr sz="8503" kern="1200">
           <a:solidFill>
             <a:schemeClr val="tx1"/>
           </a:solidFill>
@@ -2920,8 +2921,8 @@
           <a:cs typeface="+mn-cs"/>
         </a:defRPr>
       </a:lvl6pPr>
-      <a:lvl7pPr marL="9082461" algn="l" defTabSz="3027487" rtl="0" eaLnBrk="1" latinLnBrk="0" hangingPunct="1">
-        <a:defRPr sz="5960" kern="1200">
+      <a:lvl7pPr marL="12958715" algn="l" defTabSz="4319569" rtl="0" eaLnBrk="1" latinLnBrk="0" hangingPunct="1">
+        <a:defRPr sz="8503" kern="1200">
           <a:solidFill>
             <a:schemeClr val="tx1"/>
           </a:solidFill>
@@ -2930,8 +2931,8 @@
           <a:cs typeface="+mn-cs"/>
         </a:defRPr>
       </a:lvl7pPr>
-      <a:lvl8pPr marL="10596204" algn="l" defTabSz="3027487" rtl="0" eaLnBrk="1" latinLnBrk="0" hangingPunct="1">
-        <a:defRPr sz="5960" kern="1200">
+      <a:lvl8pPr marL="15118499" algn="l" defTabSz="4319569" rtl="0" eaLnBrk="1" latinLnBrk="0" hangingPunct="1">
+        <a:defRPr sz="8503" kern="1200">
           <a:solidFill>
             <a:schemeClr val="tx1"/>
           </a:solidFill>
@@ -2940,8 +2941,8 @@
           <a:cs typeface="+mn-cs"/>
         </a:defRPr>
       </a:lvl8pPr>
-      <a:lvl9pPr marL="12109948" algn="l" defTabSz="3027487" rtl="0" eaLnBrk="1" latinLnBrk="0" hangingPunct="1">
-        <a:defRPr sz="5960" kern="1200">
+      <a:lvl9pPr marL="17278284" algn="l" defTabSz="4319569" rtl="0" eaLnBrk="1" latinLnBrk="0" hangingPunct="1">
+        <a:defRPr sz="8503" kern="1200">
           <a:solidFill>
             <a:schemeClr val="tx1"/>
           </a:solidFill>
@@ -2986,8 +2987,8 @@
         </p:nvGrpSpPr>
         <p:grpSpPr>
           <a:xfrm>
-            <a:off x="2537606" y="8801881"/>
-            <a:ext cx="25200000" cy="25200000"/>
+            <a:off x="8883501" y="8883501"/>
+            <a:ext cx="25433652" cy="25433652"/>
             <a:chOff x="3293455" y="5459540"/>
             <a:chExt cx="25200000" cy="25200000"/>
           </a:xfrm>
@@ -3060,7 +3061,7 @@
               <a:lstStyle/>
               <a:p>
                 <a:pPr algn="ctr"/>
-                <a:endParaRPr lang="en-US"/>
+                <a:endParaRPr lang="en-US" sz="2152"/>
               </a:p>
             </p:txBody>
           </p:sp>
@@ -3275,7 +3276,7 @@
               <a:lstStyle/>
               <a:p>
                 <a:pPr algn="ctr"/>
-                <a:endParaRPr lang="en-US"/>
+                <a:endParaRPr lang="en-US" sz="2152"/>
               </a:p>
             </p:txBody>
           </p:sp>
@@ -3475,8 +3476,8 @@
         </p:nvSpPr>
         <p:spPr>
           <a:xfrm>
-            <a:off x="7953588" y="1327171"/>
-            <a:ext cx="14368036" cy="1862048"/>
+            <a:off x="14349694" y="1339481"/>
+            <a:ext cx="14488262" cy="1878528"/>
           </a:xfrm>
           <a:prstGeom prst="rect">
             <a:avLst/>
@@ -3490,7 +3491,7 @@
           <a:lstStyle/>
           <a:p>
             <a:r>
-              <a:rPr lang="en-US" sz="11500" b="1" dirty="0">
+              <a:rPr lang="en-US" sz="11607" b="1" dirty="0">
                 <a:latin typeface="Arial" panose="020B0604020202020204" pitchFamily="34" charset="0"/>
               </a:rPr>
               <a:t>Integration marker 0</a:t>
@@ -3542,8 +3543,8 @@
         </p:nvGrpSpPr>
         <p:grpSpPr>
           <a:xfrm>
-            <a:off x="2537606" y="8801881"/>
-            <a:ext cx="25200000" cy="25200000"/>
+            <a:off x="8883501" y="8883501"/>
+            <a:ext cx="25433652" cy="25433652"/>
             <a:chOff x="2537606" y="8801881"/>
             <a:chExt cx="25200000" cy="25200000"/>
           </a:xfrm>
@@ -3636,7 +3637,7 @@
                 <a:lstStyle/>
                 <a:p>
                   <a:pPr algn="ctr"/>
-                  <a:endParaRPr lang="en-US"/>
+                  <a:endParaRPr lang="en-US" sz="2152"/>
                 </a:p>
               </p:txBody>
             </p:sp>
@@ -3851,7 +3852,7 @@
                 <a:lstStyle/>
                 <a:p>
                   <a:pPr algn="ctr"/>
-                  <a:endParaRPr lang="en-US"/>
+                  <a:endParaRPr lang="en-US" sz="2152"/>
                 </a:p>
               </p:txBody>
             </p:sp>
@@ -4105,7 +4106,7 @@
               <a:lstStyle/>
               <a:p>
                 <a:pPr algn="ctr"/>
-                <a:endParaRPr lang="en-US"/>
+                <a:endParaRPr lang="en-US" sz="2152"/>
               </a:p>
             </p:txBody>
           </p:sp>
@@ -4269,8 +4270,8 @@
         </p:nvSpPr>
         <p:spPr>
           <a:xfrm>
-            <a:off x="7953588" y="1327171"/>
-            <a:ext cx="14368036" cy="1862048"/>
+            <a:off x="14349694" y="1339481"/>
+            <a:ext cx="14488262" cy="1878528"/>
           </a:xfrm>
           <a:prstGeom prst="rect">
             <a:avLst/>
@@ -4284,7 +4285,7 @@
           <a:lstStyle/>
           <a:p>
             <a:r>
-              <a:rPr lang="en-US" sz="11500" b="1" dirty="0">
+              <a:rPr lang="en-US" sz="11607" b="1" dirty="0">
                 <a:latin typeface="Arial" panose="020B0604020202020204" pitchFamily="34" charset="0"/>
               </a:rPr>
               <a:t>Integration marker 1</a:t>
@@ -4296,6 +4297,879 @@
     <p:extLst>
       <p:ext uri="{BB962C8B-B14F-4D97-AF65-F5344CB8AC3E}">
         <p14:creationId xmlns:p14="http://schemas.microsoft.com/office/powerpoint/2010/main" val="3542145129"/>
+      </p:ext>
+    </p:extLst>
+  </p:cSld>
+  <p:clrMapOvr>
+    <a:masterClrMapping/>
+  </p:clrMapOvr>
+</p:sld>
+</file>
+
+<file path=ppt/slides/slide3.xml><?xml version="1.0" encoding="utf-8"?>
+<p:sld xmlns:a="http://schemas.openxmlformats.org/drawingml/2006/main" xmlns:r="http://schemas.openxmlformats.org/officeDocument/2006/relationships" xmlns:p="http://schemas.openxmlformats.org/presentationml/2006/main">
+  <p:cSld>
+    <p:spTree>
+      <p:nvGrpSpPr>
+        <p:cNvPr id="1" name=""/>
+        <p:cNvGrpSpPr/>
+        <p:nvPr/>
+      </p:nvGrpSpPr>
+      <p:grpSpPr>
+        <a:xfrm>
+          <a:off x="0" y="0"/>
+          <a:ext cx="0" cy="0"/>
+          <a:chOff x="0" y="0"/>
+          <a:chExt cx="0" cy="0"/>
+        </a:xfrm>
+      </p:grpSpPr>
+      <p:sp>
+        <p:nvSpPr>
+          <p:cNvPr id="25" name="TextBox 24">
+            <a:extLst>
+              <a:ext uri="{FF2B5EF4-FFF2-40B4-BE49-F238E27FC236}">
+                <a16:creationId xmlns:a16="http://schemas.microsoft.com/office/drawing/2014/main" id="{87900024-C425-48D4-8434-19D57474403D}"/>
+              </a:ext>
+            </a:extLst>
+          </p:cNvPr>
+          <p:cNvSpPr txBox="1"/>
+          <p:nvPr/>
+        </p:nvSpPr>
+        <p:spPr>
+          <a:xfrm>
+            <a:off x="14349694" y="1339481"/>
+            <a:ext cx="14488262" cy="1878528"/>
+          </a:xfrm>
+          <a:prstGeom prst="rect">
+            <a:avLst/>
+          </a:prstGeom>
+          <a:noFill/>
+        </p:spPr>
+        <p:txBody>
+          <a:bodyPr wrap="none" rtlCol="0">
+            <a:spAutoFit/>
+          </a:bodyPr>
+          <a:lstStyle/>
+          <a:p>
+            <a:r>
+              <a:rPr lang="en-US" sz="11607" b="1" dirty="0">
+                <a:latin typeface="Arial" panose="020B0604020202020204" pitchFamily="34" charset="0"/>
+              </a:rPr>
+              <a:t>Integration marker 2</a:t>
+            </a:r>
+          </a:p>
+        </p:txBody>
+      </p:sp>
+      <p:grpSp>
+        <p:nvGrpSpPr>
+          <p:cNvPr id="61" name="그룹 60">
+            <a:extLst>
+              <a:ext uri="{FF2B5EF4-FFF2-40B4-BE49-F238E27FC236}">
+                <a16:creationId xmlns:a16="http://schemas.microsoft.com/office/drawing/2014/main" id="{DF9C9F2A-9F74-445D-86C8-49E069ABF53D}"/>
+              </a:ext>
+            </a:extLst>
+          </p:cNvPr>
+          <p:cNvGrpSpPr>
+            <a:grpSpLocks noChangeAspect="1"/>
+          </p:cNvGrpSpPr>
+          <p:nvPr/>
+        </p:nvGrpSpPr>
+        <p:grpSpPr>
+          <a:xfrm>
+            <a:off x="3600319" y="5124319"/>
+            <a:ext cx="36000000" cy="36000000"/>
+            <a:chOff x="3433432" y="5587153"/>
+            <a:chExt cx="36000000" cy="36000000"/>
+          </a:xfrm>
+        </p:grpSpPr>
+        <p:grpSp>
+          <p:nvGrpSpPr>
+            <p:cNvPr id="56" name="그룹 55">
+              <a:extLst>
+                <a:ext uri="{FF2B5EF4-FFF2-40B4-BE49-F238E27FC236}">
+                  <a16:creationId xmlns:a16="http://schemas.microsoft.com/office/drawing/2014/main" id="{15ECBC04-5E82-49BE-A1E6-5106DE12D8CE}"/>
+                </a:ext>
+              </a:extLst>
+            </p:cNvPr>
+            <p:cNvGrpSpPr/>
+            <p:nvPr/>
+          </p:nvGrpSpPr>
+          <p:grpSpPr>
+            <a:xfrm>
+              <a:off x="3433432" y="5587153"/>
+              <a:ext cx="36000000" cy="36000000"/>
+              <a:chOff x="3433423" y="5587152"/>
+              <a:chExt cx="36333791" cy="36333791"/>
+            </a:xfrm>
+          </p:grpSpPr>
+          <p:sp>
+            <p:nvSpPr>
+              <p:cNvPr id="55" name="직사각형 54">
+                <a:extLst>
+                  <a:ext uri="{FF2B5EF4-FFF2-40B4-BE49-F238E27FC236}">
+                    <a16:creationId xmlns:a16="http://schemas.microsoft.com/office/drawing/2014/main" id="{8C6FC87C-902E-4E17-9D5D-F3FA89C47B02}"/>
+                  </a:ext>
+                </a:extLst>
+              </p:cNvPr>
+              <p:cNvSpPr/>
+              <p:nvPr/>
+            </p:nvSpPr>
+            <p:spPr>
+              <a:xfrm>
+                <a:off x="3433423" y="5587152"/>
+                <a:ext cx="36333791" cy="36333791"/>
+              </a:xfrm>
+              <a:prstGeom prst="rect">
+                <a:avLst/>
+              </a:prstGeom>
+              <a:solidFill>
+                <a:schemeClr val="bg1"/>
+              </a:solidFill>
+              <a:ln>
+                <a:noFill/>
+              </a:ln>
+            </p:spPr>
+            <p:style>
+              <a:lnRef idx="2">
+                <a:schemeClr val="accent1">
+                  <a:shade val="50000"/>
+                </a:schemeClr>
+              </a:lnRef>
+              <a:fillRef idx="1">
+                <a:schemeClr val="accent1"/>
+              </a:fillRef>
+              <a:effectRef idx="0">
+                <a:schemeClr val="accent1"/>
+              </a:effectRef>
+              <a:fontRef idx="minor">
+                <a:schemeClr val="lt1"/>
+              </a:fontRef>
+            </p:style>
+            <p:txBody>
+              <a:bodyPr rtlCol="0" anchor="ctr"/>
+              <a:lstStyle/>
+              <a:p>
+                <a:pPr algn="ctr"/>
+                <a:endParaRPr lang="en-US" sz="2152"/>
+              </a:p>
+            </p:txBody>
+          </p:sp>
+          <p:pic>
+            <p:nvPicPr>
+              <p:cNvPr id="21" name="그림 20">
+                <a:extLst>
+                  <a:ext uri="{FF2B5EF4-FFF2-40B4-BE49-F238E27FC236}">
+                    <a16:creationId xmlns:a16="http://schemas.microsoft.com/office/drawing/2014/main" id="{7EEB59A8-FF04-4915-9207-10A1C8FD7086}"/>
+                  </a:ext>
+                </a:extLst>
+              </p:cNvPr>
+              <p:cNvPicPr>
+                <a:picLocks noChangeAspect="1"/>
+              </p:cNvPicPr>
+              <p:nvPr/>
+            </p:nvPicPr>
+            <p:blipFill>
+              <a:blip r:embed="rId2">
+                <a:extLst>
+                  <a:ext uri="{28A0092B-C50C-407E-A947-70E740481C1C}">
+                    <a14:useLocalDpi xmlns:a14="http://schemas.microsoft.com/office/drawing/2010/main" val="0"/>
+                  </a:ext>
+                </a:extLst>
+              </a:blip>
+              <a:stretch>
+                <a:fillRect/>
+              </a:stretch>
+            </p:blipFill>
+            <p:spPr>
+              <a:xfrm>
+                <a:off x="3433424" y="5587153"/>
+                <a:ext cx="7266758" cy="7266758"/>
+              </a:xfrm>
+              <a:prstGeom prst="rect">
+                <a:avLst/>
+              </a:prstGeom>
+            </p:spPr>
+          </p:pic>
+          <p:pic>
+            <p:nvPicPr>
+              <p:cNvPr id="22" name="그림 21">
+                <a:extLst>
+                  <a:ext uri="{FF2B5EF4-FFF2-40B4-BE49-F238E27FC236}">
+                    <a16:creationId xmlns:a16="http://schemas.microsoft.com/office/drawing/2014/main" id="{7EBD7A37-8E94-40D0-A92A-1E0D3145A8A9}"/>
+                  </a:ext>
+                </a:extLst>
+              </p:cNvPr>
+              <p:cNvPicPr>
+                <a:picLocks noChangeAspect="1"/>
+              </p:cNvPicPr>
+              <p:nvPr/>
+            </p:nvPicPr>
+            <p:blipFill>
+              <a:blip r:embed="rId3">
+                <a:extLst>
+                  <a:ext uri="{28A0092B-C50C-407E-A947-70E740481C1C}">
+                    <a14:useLocalDpi xmlns:a14="http://schemas.microsoft.com/office/drawing/2010/main" val="0"/>
+                  </a:ext>
+                </a:extLst>
+              </a:blip>
+              <a:stretch>
+                <a:fillRect/>
+              </a:stretch>
+            </p:blipFill>
+            <p:spPr>
+              <a:xfrm>
+                <a:off x="17966940" y="5587153"/>
+                <a:ext cx="7266758" cy="7266758"/>
+              </a:xfrm>
+              <a:prstGeom prst="rect">
+                <a:avLst/>
+              </a:prstGeom>
+            </p:spPr>
+          </p:pic>
+          <p:pic>
+            <p:nvPicPr>
+              <p:cNvPr id="23" name="그림 22">
+                <a:extLst>
+                  <a:ext uri="{FF2B5EF4-FFF2-40B4-BE49-F238E27FC236}">
+                    <a16:creationId xmlns:a16="http://schemas.microsoft.com/office/drawing/2014/main" id="{9DA5EAAA-1DB6-4EED-85F5-77577B5263F4}"/>
+                  </a:ext>
+                </a:extLst>
+              </p:cNvPr>
+              <p:cNvPicPr>
+                <a:picLocks noChangeAspect="1"/>
+              </p:cNvPicPr>
+              <p:nvPr/>
+            </p:nvPicPr>
+            <p:blipFill>
+              <a:blip r:embed="rId4">
+                <a:extLst>
+                  <a:ext uri="{28A0092B-C50C-407E-A947-70E740481C1C}">
+                    <a14:useLocalDpi xmlns:a14="http://schemas.microsoft.com/office/drawing/2010/main" val="0"/>
+                  </a:ext>
+                </a:extLst>
+              </a:blip>
+              <a:stretch>
+                <a:fillRect/>
+              </a:stretch>
+            </p:blipFill>
+            <p:spPr>
+              <a:xfrm>
+                <a:off x="32500456" y="20120669"/>
+                <a:ext cx="7266758" cy="7266758"/>
+              </a:xfrm>
+              <a:prstGeom prst="rect">
+                <a:avLst/>
+              </a:prstGeom>
+            </p:spPr>
+          </p:pic>
+          <p:pic>
+            <p:nvPicPr>
+              <p:cNvPr id="24" name="그림 23">
+                <a:extLst>
+                  <a:ext uri="{FF2B5EF4-FFF2-40B4-BE49-F238E27FC236}">
+                    <a16:creationId xmlns:a16="http://schemas.microsoft.com/office/drawing/2014/main" id="{E0E1BF56-3BFA-4FC1-BD2F-CB012B356025}"/>
+                  </a:ext>
+                </a:extLst>
+              </p:cNvPr>
+              <p:cNvPicPr>
+                <a:picLocks noChangeAspect="1"/>
+              </p:cNvPicPr>
+              <p:nvPr/>
+            </p:nvPicPr>
+            <p:blipFill>
+              <a:blip r:embed="rId5">
+                <a:extLst>
+                  <a:ext uri="{28A0092B-C50C-407E-A947-70E740481C1C}">
+                    <a14:useLocalDpi xmlns:a14="http://schemas.microsoft.com/office/drawing/2010/main" val="0"/>
+                  </a:ext>
+                </a:extLst>
+              </a:blip>
+              <a:stretch>
+                <a:fillRect/>
+              </a:stretch>
+            </p:blipFill>
+            <p:spPr>
+              <a:xfrm>
+                <a:off x="32500456" y="5587153"/>
+                <a:ext cx="7266758" cy="7266758"/>
+              </a:xfrm>
+              <a:prstGeom prst="rect">
+                <a:avLst/>
+              </a:prstGeom>
+            </p:spPr>
+          </p:pic>
+          <p:pic>
+            <p:nvPicPr>
+              <p:cNvPr id="3" name="그림 2">
+                <a:extLst>
+                  <a:ext uri="{FF2B5EF4-FFF2-40B4-BE49-F238E27FC236}">
+                    <a16:creationId xmlns:a16="http://schemas.microsoft.com/office/drawing/2014/main" id="{DD4FA6AC-295E-4178-AD52-C9BB972BC06F}"/>
+                  </a:ext>
+                </a:extLst>
+              </p:cNvPr>
+              <p:cNvPicPr>
+                <a:picLocks noChangeAspect="1"/>
+              </p:cNvPicPr>
+              <p:nvPr/>
+            </p:nvPicPr>
+            <p:blipFill>
+              <a:blip r:embed="rId6">
+                <a:extLst>
+                  <a:ext uri="{28A0092B-C50C-407E-A947-70E740481C1C}">
+                    <a14:useLocalDpi xmlns:a14="http://schemas.microsoft.com/office/drawing/2010/main" val="0"/>
+                  </a:ext>
+                </a:extLst>
+              </a:blip>
+              <a:stretch>
+                <a:fillRect/>
+              </a:stretch>
+            </p:blipFill>
+            <p:spPr>
+              <a:xfrm>
+                <a:off x="32500456" y="34654185"/>
+                <a:ext cx="7266758" cy="7266758"/>
+              </a:xfrm>
+              <a:prstGeom prst="rect">
+                <a:avLst/>
+              </a:prstGeom>
+            </p:spPr>
+          </p:pic>
+          <p:pic>
+            <p:nvPicPr>
+              <p:cNvPr id="29" name="그림 28">
+                <a:extLst>
+                  <a:ext uri="{FF2B5EF4-FFF2-40B4-BE49-F238E27FC236}">
+                    <a16:creationId xmlns:a16="http://schemas.microsoft.com/office/drawing/2014/main" id="{982EA5FD-40E7-4D14-80DF-6624B5980BD3}"/>
+                  </a:ext>
+                </a:extLst>
+              </p:cNvPr>
+              <p:cNvPicPr>
+                <a:picLocks noChangeAspect="1"/>
+              </p:cNvPicPr>
+              <p:nvPr/>
+            </p:nvPicPr>
+            <p:blipFill>
+              <a:blip r:embed="rId7">
+                <a:extLst>
+                  <a:ext uri="{28A0092B-C50C-407E-A947-70E740481C1C}">
+                    <a14:useLocalDpi xmlns:a14="http://schemas.microsoft.com/office/drawing/2010/main" val="0"/>
+                  </a:ext>
+                </a:extLst>
+              </a:blip>
+              <a:stretch>
+                <a:fillRect/>
+              </a:stretch>
+            </p:blipFill>
+            <p:spPr>
+              <a:xfrm>
+                <a:off x="17966940" y="34654185"/>
+                <a:ext cx="7266758" cy="7266758"/>
+              </a:xfrm>
+              <a:prstGeom prst="rect">
+                <a:avLst/>
+              </a:prstGeom>
+            </p:spPr>
+          </p:pic>
+          <p:pic>
+            <p:nvPicPr>
+              <p:cNvPr id="31" name="그림 30">
+                <a:extLst>
+                  <a:ext uri="{FF2B5EF4-FFF2-40B4-BE49-F238E27FC236}">
+                    <a16:creationId xmlns:a16="http://schemas.microsoft.com/office/drawing/2014/main" id="{8E1D0A1A-9B41-441C-A8F5-E6C91F8D8C5C}"/>
+                  </a:ext>
+                </a:extLst>
+              </p:cNvPr>
+              <p:cNvPicPr>
+                <a:picLocks noChangeAspect="1"/>
+              </p:cNvPicPr>
+              <p:nvPr/>
+            </p:nvPicPr>
+            <p:blipFill>
+              <a:blip r:embed="rId8">
+                <a:extLst>
+                  <a:ext uri="{28A0092B-C50C-407E-A947-70E740481C1C}">
+                    <a14:useLocalDpi xmlns:a14="http://schemas.microsoft.com/office/drawing/2010/main" val="0"/>
+                  </a:ext>
+                </a:extLst>
+              </a:blip>
+              <a:stretch>
+                <a:fillRect/>
+              </a:stretch>
+            </p:blipFill>
+            <p:spPr>
+              <a:xfrm>
+                <a:off x="3433424" y="34654185"/>
+                <a:ext cx="7266758" cy="7266758"/>
+              </a:xfrm>
+              <a:prstGeom prst="rect">
+                <a:avLst/>
+              </a:prstGeom>
+            </p:spPr>
+          </p:pic>
+          <p:pic>
+            <p:nvPicPr>
+              <p:cNvPr id="33" name="그림 32">
+                <a:extLst>
+                  <a:ext uri="{FF2B5EF4-FFF2-40B4-BE49-F238E27FC236}">
+                    <a16:creationId xmlns:a16="http://schemas.microsoft.com/office/drawing/2014/main" id="{56370C09-F8B7-4C9C-832B-E102446AB15F}"/>
+                  </a:ext>
+                </a:extLst>
+              </p:cNvPr>
+              <p:cNvPicPr>
+                <a:picLocks noChangeAspect="1"/>
+              </p:cNvPicPr>
+              <p:nvPr/>
+            </p:nvPicPr>
+            <p:blipFill>
+              <a:blip r:embed="rId9">
+                <a:extLst>
+                  <a:ext uri="{28A0092B-C50C-407E-A947-70E740481C1C}">
+                    <a14:useLocalDpi xmlns:a14="http://schemas.microsoft.com/office/drawing/2010/main" val="0"/>
+                  </a:ext>
+                </a:extLst>
+              </a:blip>
+              <a:stretch>
+                <a:fillRect/>
+              </a:stretch>
+            </p:blipFill>
+            <p:spPr>
+              <a:xfrm>
+                <a:off x="3433424" y="20120669"/>
+                <a:ext cx="7266758" cy="7266758"/>
+              </a:xfrm>
+              <a:prstGeom prst="rect">
+                <a:avLst/>
+              </a:prstGeom>
+            </p:spPr>
+          </p:pic>
+        </p:grpSp>
+        <p:grpSp>
+          <p:nvGrpSpPr>
+            <p:cNvPr id="57" name="그룹 56">
+              <a:extLst>
+                <a:ext uri="{FF2B5EF4-FFF2-40B4-BE49-F238E27FC236}">
+                  <a16:creationId xmlns:a16="http://schemas.microsoft.com/office/drawing/2014/main" id="{4F956931-B1D4-4031-973D-13A558B013AF}"/>
+                </a:ext>
+              </a:extLst>
+            </p:cNvPr>
+            <p:cNvGrpSpPr>
+              <a:grpSpLocks noChangeAspect="1"/>
+            </p:cNvGrpSpPr>
+            <p:nvPr/>
+          </p:nvGrpSpPr>
+          <p:grpSpPr>
+            <a:xfrm>
+              <a:off x="14413432" y="16567153"/>
+              <a:ext cx="14040000" cy="14040000"/>
+              <a:chOff x="14580318" y="16734047"/>
+              <a:chExt cx="14040000" cy="14040000"/>
+            </a:xfrm>
+          </p:grpSpPr>
+          <p:grpSp>
+            <p:nvGrpSpPr>
+              <p:cNvPr id="54" name="그룹 53">
+                <a:extLst>
+                  <a:ext uri="{FF2B5EF4-FFF2-40B4-BE49-F238E27FC236}">
+                    <a16:creationId xmlns:a16="http://schemas.microsoft.com/office/drawing/2014/main" id="{98C839DD-3B29-4D61-AF91-533862BC19B4}"/>
+                  </a:ext>
+                </a:extLst>
+              </p:cNvPr>
+              <p:cNvGrpSpPr/>
+              <p:nvPr/>
+            </p:nvGrpSpPr>
+            <p:grpSpPr>
+              <a:xfrm>
+                <a:off x="14580318" y="16734047"/>
+                <a:ext cx="14040000" cy="14040000"/>
+                <a:chOff x="14580318" y="16734047"/>
+                <a:chExt cx="14040000" cy="14040000"/>
+              </a:xfrm>
+            </p:grpSpPr>
+            <p:sp>
+              <p:nvSpPr>
+                <p:cNvPr id="14" name="직사각형 13">
+                  <a:extLst>
+                    <a:ext uri="{FF2B5EF4-FFF2-40B4-BE49-F238E27FC236}">
+                      <a16:creationId xmlns:a16="http://schemas.microsoft.com/office/drawing/2014/main" id="{EB82289C-B3FF-42BF-BCD0-0E85F7901C15}"/>
+                    </a:ext>
+                  </a:extLst>
+                </p:cNvPr>
+                <p:cNvSpPr>
+                  <a:spLocks noChangeAspect="1"/>
+                </p:cNvSpPr>
+                <p:nvPr/>
+              </p:nvSpPr>
+              <p:spPr>
+                <a:xfrm>
+                  <a:off x="14580318" y="16734047"/>
+                  <a:ext cx="14040000" cy="14040000"/>
+                </a:xfrm>
+                <a:prstGeom prst="rect">
+                  <a:avLst/>
+                </a:prstGeom>
+                <a:solidFill>
+                  <a:schemeClr val="bg1"/>
+                </a:solidFill>
+                <a:ln>
+                  <a:noFill/>
+                </a:ln>
+              </p:spPr>
+              <p:style>
+                <a:lnRef idx="2">
+                  <a:schemeClr val="accent1">
+                    <a:shade val="50000"/>
+                  </a:schemeClr>
+                </a:lnRef>
+                <a:fillRef idx="1">
+                  <a:schemeClr val="accent1"/>
+                </a:fillRef>
+                <a:effectRef idx="0">
+                  <a:schemeClr val="accent1"/>
+                </a:effectRef>
+                <a:fontRef idx="minor">
+                  <a:schemeClr val="lt1"/>
+                </a:fontRef>
+              </p:style>
+              <p:txBody>
+                <a:bodyPr rtlCol="0" anchor="ctr"/>
+                <a:lstStyle/>
+                <a:p>
+                  <a:pPr algn="ctr"/>
+                  <a:endParaRPr lang="en-US" sz="2152"/>
+                </a:p>
+              </p:txBody>
+            </p:sp>
+            <p:pic>
+              <p:nvPicPr>
+                <p:cNvPr id="37" name="그림 36">
+                  <a:extLst>
+                    <a:ext uri="{FF2B5EF4-FFF2-40B4-BE49-F238E27FC236}">
+                      <a16:creationId xmlns:a16="http://schemas.microsoft.com/office/drawing/2014/main" id="{757220ED-3FB8-499F-A115-753735506A11}"/>
+                    </a:ext>
+                  </a:extLst>
+                </p:cNvPr>
+                <p:cNvPicPr>
+                  <a:picLocks noChangeAspect="1"/>
+                </p:cNvPicPr>
+                <p:nvPr/>
+              </p:nvPicPr>
+              <p:blipFill>
+                <a:blip r:embed="rId10">
+                  <a:extLst>
+                    <a:ext uri="{28A0092B-C50C-407E-A947-70E740481C1C}">
+                      <a14:useLocalDpi xmlns:a14="http://schemas.microsoft.com/office/drawing/2010/main" val="0"/>
+                    </a:ext>
+                  </a:extLst>
+                </a:blip>
+                <a:stretch>
+                  <a:fillRect/>
+                </a:stretch>
+              </p:blipFill>
+              <p:spPr>
+                <a:xfrm>
+                  <a:off x="14580318" y="16734047"/>
+                  <a:ext cx="2880000" cy="2880000"/>
+                </a:xfrm>
+                <a:prstGeom prst="rect">
+                  <a:avLst/>
+                </a:prstGeom>
+              </p:spPr>
+            </p:pic>
+            <p:pic>
+              <p:nvPicPr>
+                <p:cNvPr id="39" name="그림 38">
+                  <a:extLst>
+                    <a:ext uri="{FF2B5EF4-FFF2-40B4-BE49-F238E27FC236}">
+                      <a16:creationId xmlns:a16="http://schemas.microsoft.com/office/drawing/2014/main" id="{70B05AC8-BD0B-4258-BBDD-CD3E57862488}"/>
+                    </a:ext>
+                  </a:extLst>
+                </p:cNvPr>
+                <p:cNvPicPr>
+                  <a:picLocks noChangeAspect="1"/>
+                </p:cNvPicPr>
+                <p:nvPr/>
+              </p:nvPicPr>
+              <p:blipFill>
+                <a:blip r:embed="rId11">
+                  <a:extLst>
+                    <a:ext uri="{28A0092B-C50C-407E-A947-70E740481C1C}">
+                      <a14:useLocalDpi xmlns:a14="http://schemas.microsoft.com/office/drawing/2010/main" val="0"/>
+                    </a:ext>
+                  </a:extLst>
+                </a:blip>
+                <a:stretch>
+                  <a:fillRect/>
+                </a:stretch>
+              </p:blipFill>
+              <p:spPr>
+                <a:xfrm>
+                  <a:off x="20160318" y="16734047"/>
+                  <a:ext cx="2880000" cy="2880000"/>
+                </a:xfrm>
+                <a:prstGeom prst="rect">
+                  <a:avLst/>
+                </a:prstGeom>
+              </p:spPr>
+            </p:pic>
+            <p:pic>
+              <p:nvPicPr>
+                <p:cNvPr id="41" name="그림 40">
+                  <a:extLst>
+                    <a:ext uri="{FF2B5EF4-FFF2-40B4-BE49-F238E27FC236}">
+                      <a16:creationId xmlns:a16="http://schemas.microsoft.com/office/drawing/2014/main" id="{788E18D8-CE55-4CB0-A970-AC82AC582205}"/>
+                    </a:ext>
+                  </a:extLst>
+                </p:cNvPr>
+                <p:cNvPicPr>
+                  <a:picLocks noChangeAspect="1"/>
+                </p:cNvPicPr>
+                <p:nvPr/>
+              </p:nvPicPr>
+              <p:blipFill>
+                <a:blip r:embed="rId12">
+                  <a:extLst>
+                    <a:ext uri="{28A0092B-C50C-407E-A947-70E740481C1C}">
+                      <a14:useLocalDpi xmlns:a14="http://schemas.microsoft.com/office/drawing/2010/main" val="0"/>
+                    </a:ext>
+                  </a:extLst>
+                </a:blip>
+                <a:stretch>
+                  <a:fillRect/>
+                </a:stretch>
+              </p:blipFill>
+              <p:spPr>
+                <a:xfrm>
+                  <a:off x="25740318" y="16734047"/>
+                  <a:ext cx="2880000" cy="2880000"/>
+                </a:xfrm>
+                <a:prstGeom prst="rect">
+                  <a:avLst/>
+                </a:prstGeom>
+              </p:spPr>
+            </p:pic>
+            <p:pic>
+              <p:nvPicPr>
+                <p:cNvPr id="43" name="그림 42">
+                  <a:extLst>
+                    <a:ext uri="{FF2B5EF4-FFF2-40B4-BE49-F238E27FC236}">
+                      <a16:creationId xmlns:a16="http://schemas.microsoft.com/office/drawing/2014/main" id="{2C3946A2-96D5-40E8-B70B-26D28D49FCA8}"/>
+                    </a:ext>
+                  </a:extLst>
+                </p:cNvPr>
+                <p:cNvPicPr>
+                  <a:picLocks noChangeAspect="1"/>
+                </p:cNvPicPr>
+                <p:nvPr/>
+              </p:nvPicPr>
+              <p:blipFill>
+                <a:blip r:embed="rId13">
+                  <a:extLst>
+                    <a:ext uri="{28A0092B-C50C-407E-A947-70E740481C1C}">
+                      <a14:useLocalDpi xmlns:a14="http://schemas.microsoft.com/office/drawing/2010/main" val="0"/>
+                    </a:ext>
+                  </a:extLst>
+                </a:blip>
+                <a:stretch>
+                  <a:fillRect/>
+                </a:stretch>
+              </p:blipFill>
+              <p:spPr>
+                <a:xfrm>
+                  <a:off x="25740318" y="22314047"/>
+                  <a:ext cx="2880000" cy="2880000"/>
+                </a:xfrm>
+                <a:prstGeom prst="rect">
+                  <a:avLst/>
+                </a:prstGeom>
+              </p:spPr>
+            </p:pic>
+            <p:pic>
+              <p:nvPicPr>
+                <p:cNvPr id="45" name="그림 44">
+                  <a:extLst>
+                    <a:ext uri="{FF2B5EF4-FFF2-40B4-BE49-F238E27FC236}">
+                      <a16:creationId xmlns:a16="http://schemas.microsoft.com/office/drawing/2014/main" id="{E758D147-9DE0-42E6-9AA5-053B952A7C63}"/>
+                    </a:ext>
+                  </a:extLst>
+                </p:cNvPr>
+                <p:cNvPicPr>
+                  <a:picLocks noChangeAspect="1"/>
+                </p:cNvPicPr>
+                <p:nvPr/>
+              </p:nvPicPr>
+              <p:blipFill>
+                <a:blip r:embed="rId14">
+                  <a:extLst>
+                    <a:ext uri="{28A0092B-C50C-407E-A947-70E740481C1C}">
+                      <a14:useLocalDpi xmlns:a14="http://schemas.microsoft.com/office/drawing/2010/main" val="0"/>
+                    </a:ext>
+                  </a:extLst>
+                </a:blip>
+                <a:stretch>
+                  <a:fillRect/>
+                </a:stretch>
+              </p:blipFill>
+              <p:spPr>
+                <a:xfrm>
+                  <a:off x="25740318" y="27894047"/>
+                  <a:ext cx="2880000" cy="2880000"/>
+                </a:xfrm>
+                <a:prstGeom prst="rect">
+                  <a:avLst/>
+                </a:prstGeom>
+              </p:spPr>
+            </p:pic>
+            <p:pic>
+              <p:nvPicPr>
+                <p:cNvPr id="47" name="그림 46">
+                  <a:extLst>
+                    <a:ext uri="{FF2B5EF4-FFF2-40B4-BE49-F238E27FC236}">
+                      <a16:creationId xmlns:a16="http://schemas.microsoft.com/office/drawing/2014/main" id="{C59C4C96-FEB0-400B-8854-45E459D0B170}"/>
+                    </a:ext>
+                  </a:extLst>
+                </p:cNvPr>
+                <p:cNvPicPr>
+                  <a:picLocks noChangeAspect="1"/>
+                </p:cNvPicPr>
+                <p:nvPr/>
+              </p:nvPicPr>
+              <p:blipFill>
+                <a:blip r:embed="rId15">
+                  <a:extLst>
+                    <a:ext uri="{28A0092B-C50C-407E-A947-70E740481C1C}">
+                      <a14:useLocalDpi xmlns:a14="http://schemas.microsoft.com/office/drawing/2010/main" val="0"/>
+                    </a:ext>
+                  </a:extLst>
+                </a:blip>
+                <a:stretch>
+                  <a:fillRect/>
+                </a:stretch>
+              </p:blipFill>
+              <p:spPr>
+                <a:xfrm>
+                  <a:off x="20160318" y="27894047"/>
+                  <a:ext cx="2880000" cy="2880000"/>
+                </a:xfrm>
+                <a:prstGeom prst="rect">
+                  <a:avLst/>
+                </a:prstGeom>
+              </p:spPr>
+            </p:pic>
+            <p:pic>
+              <p:nvPicPr>
+                <p:cNvPr id="49" name="그림 48">
+                  <a:extLst>
+                    <a:ext uri="{FF2B5EF4-FFF2-40B4-BE49-F238E27FC236}">
+                      <a16:creationId xmlns:a16="http://schemas.microsoft.com/office/drawing/2014/main" id="{49ACD768-EF8D-4286-801D-56CD8C01528A}"/>
+                    </a:ext>
+                  </a:extLst>
+                </p:cNvPr>
+                <p:cNvPicPr>
+                  <a:picLocks noChangeAspect="1"/>
+                </p:cNvPicPr>
+                <p:nvPr/>
+              </p:nvPicPr>
+              <p:blipFill>
+                <a:blip r:embed="rId16">
+                  <a:extLst>
+                    <a:ext uri="{28A0092B-C50C-407E-A947-70E740481C1C}">
+                      <a14:useLocalDpi xmlns:a14="http://schemas.microsoft.com/office/drawing/2010/main" val="0"/>
+                    </a:ext>
+                  </a:extLst>
+                </a:blip>
+                <a:stretch>
+                  <a:fillRect/>
+                </a:stretch>
+              </p:blipFill>
+              <p:spPr>
+                <a:xfrm>
+                  <a:off x="14580318" y="27894047"/>
+                  <a:ext cx="2880000" cy="2880000"/>
+                </a:xfrm>
+                <a:prstGeom prst="rect">
+                  <a:avLst/>
+                </a:prstGeom>
+              </p:spPr>
+            </p:pic>
+            <p:pic>
+              <p:nvPicPr>
+                <p:cNvPr id="51" name="그림 50">
+                  <a:extLst>
+                    <a:ext uri="{FF2B5EF4-FFF2-40B4-BE49-F238E27FC236}">
+                      <a16:creationId xmlns:a16="http://schemas.microsoft.com/office/drawing/2014/main" id="{C9220B98-1DC7-4808-95BA-7FF3D20473CA}"/>
+                    </a:ext>
+                  </a:extLst>
+                </p:cNvPr>
+                <p:cNvPicPr>
+                  <a:picLocks noChangeAspect="1"/>
+                </p:cNvPicPr>
+                <p:nvPr/>
+              </p:nvPicPr>
+              <p:blipFill>
+                <a:blip r:embed="rId17">
+                  <a:extLst>
+                    <a:ext uri="{28A0092B-C50C-407E-A947-70E740481C1C}">
+                      <a14:useLocalDpi xmlns:a14="http://schemas.microsoft.com/office/drawing/2010/main" val="0"/>
+                    </a:ext>
+                  </a:extLst>
+                </a:blip>
+                <a:stretch>
+                  <a:fillRect/>
+                </a:stretch>
+              </p:blipFill>
+              <p:spPr>
+                <a:xfrm>
+                  <a:off x="14580318" y="22314047"/>
+                  <a:ext cx="2880000" cy="2880000"/>
+                </a:xfrm>
+                <a:prstGeom prst="rect">
+                  <a:avLst/>
+                </a:prstGeom>
+              </p:spPr>
+            </p:pic>
+          </p:grpSp>
+          <p:pic>
+            <p:nvPicPr>
+              <p:cNvPr id="53" name="그림 52">
+                <a:extLst>
+                  <a:ext uri="{FF2B5EF4-FFF2-40B4-BE49-F238E27FC236}">
+                    <a16:creationId xmlns:a16="http://schemas.microsoft.com/office/drawing/2014/main" id="{67307BCD-9054-4CC7-AA0D-84D71BE70E09}"/>
+                  </a:ext>
+                </a:extLst>
+              </p:cNvPr>
+              <p:cNvPicPr>
+                <a:picLocks noChangeAspect="1"/>
+              </p:cNvPicPr>
+              <p:nvPr/>
+            </p:nvPicPr>
+            <p:blipFill>
+              <a:blip r:embed="rId18">
+                <a:extLst>
+                  <a:ext uri="{28A0092B-C50C-407E-A947-70E740481C1C}">
+                    <a14:useLocalDpi xmlns:a14="http://schemas.microsoft.com/office/drawing/2010/main" val="0"/>
+                  </a:ext>
+                </a:extLst>
+              </a:blip>
+              <a:stretch>
+                <a:fillRect/>
+              </a:stretch>
+            </p:blipFill>
+            <p:spPr>
+              <a:xfrm>
+                <a:off x="20880318" y="23034047"/>
+                <a:ext cx="1440000" cy="1440000"/>
+              </a:xfrm>
+              <a:prstGeom prst="rect">
+                <a:avLst/>
+              </a:prstGeom>
+            </p:spPr>
+          </p:pic>
+        </p:grpSp>
+      </p:grpSp>
+    </p:spTree>
+    <p:extLst>
+      <p:ext uri="{BB962C8B-B14F-4D97-AF65-F5344CB8AC3E}">
+        <p14:creationId xmlns:p14="http://schemas.microsoft.com/office/powerpoint/2010/main" val="3377748036"/>
       </p:ext>
     </p:extLst>
   </p:cSld>

</xml_diff>

<commit_message>
Modify integratio marker 5
</commit_message>
<xml_diff>
--- a/apps/data_processing/aruco_marker/aruco_marker_creation/marker_img/integration_marker.pptx
+++ b/apps/data_processing/aruco_marker/aruco_marker_creation/marker_img/integration_marker.pptx
@@ -3774,10 +3774,10 @@
       </p:grpSp>
       <p:grpSp>
         <p:nvGrpSpPr>
-          <p:cNvPr id="7" name="그룹 6">
+          <p:cNvPr id="45" name="그룹 44">
             <a:extLst>
               <a:ext uri="{FF2B5EF4-FFF2-40B4-BE49-F238E27FC236}">
-                <a16:creationId xmlns:a16="http://schemas.microsoft.com/office/drawing/2014/main" id="{D0454F8A-2628-457A-839E-8DF4CDC28F16}"/>
+                <a16:creationId xmlns:a16="http://schemas.microsoft.com/office/drawing/2014/main" id="{C7D54906-1D46-49FE-8954-EC3DD0FDF3F7}"/>
               </a:ext>
             </a:extLst>
           </p:cNvPr>
@@ -3790,226 +3790,688 @@
           <a:xfrm>
             <a:off x="4320319" y="3880719"/>
             <a:ext cx="34560000" cy="55922400"/>
-            <a:chOff x="4320319" y="1543919"/>
-            <a:chExt cx="34560000" cy="55922400"/>
+            <a:chOff x="3060319" y="11703919"/>
+            <a:chExt cx="17280000" cy="27961200"/>
           </a:xfrm>
         </p:grpSpPr>
-        <p:pic>
-          <p:nvPicPr>
-            <p:cNvPr id="30" name="그림 29">
+        <p:grpSp>
+          <p:nvGrpSpPr>
+            <p:cNvPr id="46" name="그룹 45">
               <a:extLst>
                 <a:ext uri="{FF2B5EF4-FFF2-40B4-BE49-F238E27FC236}">
-                  <a16:creationId xmlns:a16="http://schemas.microsoft.com/office/drawing/2014/main" id="{A6AC6242-8357-4933-99E2-6C3A4142E167}"/>
+                  <a16:creationId xmlns:a16="http://schemas.microsoft.com/office/drawing/2014/main" id="{3EF6E67C-0F56-45B9-A3E0-7135F18939D5}"/>
                 </a:ext>
               </a:extLst>
             </p:cNvPr>
-            <p:cNvPicPr>
-              <a:picLocks noChangeAspect="1"/>
-            </p:cNvPicPr>
+            <p:cNvGrpSpPr>
+              <a:grpSpLocks noChangeAspect="1"/>
+            </p:cNvGrpSpPr>
             <p:nvPr/>
-          </p:nvPicPr>
-          <p:blipFill>
-            <a:blip r:embed="rId2">
-              <a:extLst>
-                <a:ext uri="{28A0092B-C50C-407E-A947-70E740481C1C}">
-                  <a14:useLocalDpi xmlns:a14="http://schemas.microsoft.com/office/drawing/2010/main" val="0"/>
-                </a:ext>
-              </a:extLst>
-            </a:blip>
-            <a:stretch>
-              <a:fillRect/>
-            </a:stretch>
-          </p:blipFill>
-          <p:spPr>
+          </p:nvGrpSpPr>
+          <p:grpSpPr>
             <a:xfrm>
-              <a:off x="25682717" y="14748719"/>
-              <a:ext cx="3110400" cy="3110400"/>
+              <a:off x="13741520" y="19865119"/>
+              <a:ext cx="2520000" cy="2520000"/>
+              <a:chOff x="19947575" y="23450076"/>
+              <a:chExt cx="2520000" cy="2520000"/>
             </a:xfrm>
-            <a:prstGeom prst="rect">
-              <a:avLst/>
-            </a:prstGeom>
-          </p:spPr>
-        </p:pic>
-        <p:pic>
-          <p:nvPicPr>
-            <p:cNvPr id="31" name="그림 30">
+          </p:grpSpPr>
+          <p:sp>
+            <p:nvSpPr>
+              <p:cNvPr id="62" name="직사각형 61">
+                <a:extLst>
+                  <a:ext uri="{FF2B5EF4-FFF2-40B4-BE49-F238E27FC236}">
+                    <a16:creationId xmlns:a16="http://schemas.microsoft.com/office/drawing/2014/main" id="{FFF1F042-8AE2-469E-9BB0-1D1BC0A2DB22}"/>
+                  </a:ext>
+                </a:extLst>
+              </p:cNvPr>
+              <p:cNvSpPr>
+                <a:spLocks noChangeAspect="1"/>
+              </p:cNvSpPr>
+              <p:nvPr/>
+            </p:nvSpPr>
+            <p:spPr>
+              <a:xfrm>
+                <a:off x="19947575" y="23450076"/>
+                <a:ext cx="2520000" cy="2520000"/>
+              </a:xfrm>
+              <a:prstGeom prst="rect">
+                <a:avLst/>
+              </a:prstGeom>
+              <a:solidFill>
+                <a:schemeClr val="bg1"/>
+              </a:solidFill>
+              <a:ln>
+                <a:noFill/>
+              </a:ln>
+            </p:spPr>
+            <p:style>
+              <a:lnRef idx="2">
+                <a:schemeClr val="accent1">
+                  <a:shade val="50000"/>
+                </a:schemeClr>
+              </a:lnRef>
+              <a:fillRef idx="1">
+                <a:schemeClr val="accent1"/>
+              </a:fillRef>
+              <a:effectRef idx="0">
+                <a:schemeClr val="accent1"/>
+              </a:effectRef>
+              <a:fontRef idx="minor">
+                <a:schemeClr val="lt1"/>
+              </a:fontRef>
+            </p:style>
+            <p:txBody>
+              <a:bodyPr rtlCol="0" anchor="ctr"/>
+              <a:lstStyle/>
+              <a:p>
+                <a:pPr algn="ctr"/>
+                <a:endParaRPr lang="en-US"/>
+              </a:p>
+            </p:txBody>
+          </p:sp>
+          <p:pic>
+            <p:nvPicPr>
+              <p:cNvPr id="63" name="그림 62">
+                <a:extLst>
+                  <a:ext uri="{FF2B5EF4-FFF2-40B4-BE49-F238E27FC236}">
+                    <a16:creationId xmlns:a16="http://schemas.microsoft.com/office/drawing/2014/main" id="{8EBD0D72-133A-4FA3-B642-26FE85B71D19}"/>
+                  </a:ext>
+                </a:extLst>
+              </p:cNvPr>
+              <p:cNvPicPr>
+                <a:picLocks noChangeAspect="1"/>
+              </p:cNvPicPr>
+              <p:nvPr/>
+            </p:nvPicPr>
+            <p:blipFill>
+              <a:blip r:embed="rId2">
+                <a:extLst>
+                  <a:ext uri="{28A0092B-C50C-407E-A947-70E740481C1C}">
+                    <a14:useLocalDpi xmlns:a14="http://schemas.microsoft.com/office/drawing/2010/main" val="0"/>
+                  </a:ext>
+                </a:extLst>
+              </a:blip>
+              <a:stretch>
+                <a:fillRect/>
+              </a:stretch>
+            </p:blipFill>
+            <p:spPr>
+              <a:xfrm>
+                <a:off x="20262575" y="23765076"/>
+                <a:ext cx="1890000" cy="1890000"/>
+              </a:xfrm>
+              <a:prstGeom prst="rect">
+                <a:avLst/>
+              </a:prstGeom>
+            </p:spPr>
+          </p:pic>
+        </p:grpSp>
+        <p:grpSp>
+          <p:nvGrpSpPr>
+            <p:cNvPr id="47" name="그룹 46">
               <a:extLst>
                 <a:ext uri="{FF2B5EF4-FFF2-40B4-BE49-F238E27FC236}">
-                  <a16:creationId xmlns:a16="http://schemas.microsoft.com/office/drawing/2014/main" id="{EB98527D-8710-4A49-9E73-8C1018B82836}"/>
+                  <a16:creationId xmlns:a16="http://schemas.microsoft.com/office/drawing/2014/main" id="{5A68F631-AA4C-4ABD-89DD-E1E7393A5C5D}"/>
                 </a:ext>
               </a:extLst>
             </p:cNvPr>
-            <p:cNvPicPr>
-              <a:picLocks noChangeAspect="1"/>
-            </p:cNvPicPr>
+            <p:cNvGrpSpPr>
+              <a:grpSpLocks noChangeAspect="1"/>
+            </p:cNvGrpSpPr>
             <p:nvPr/>
-          </p:nvPicPr>
-          <p:blipFill>
-            <a:blip r:embed="rId3">
-              <a:extLst>
-                <a:ext uri="{28A0092B-C50C-407E-A947-70E740481C1C}">
-                  <a14:useLocalDpi xmlns:a14="http://schemas.microsoft.com/office/drawing/2010/main" val="0"/>
-                </a:ext>
-              </a:extLst>
-            </a:blip>
-            <a:stretch>
-              <a:fillRect/>
-            </a:stretch>
-          </p:blipFill>
-          <p:spPr>
+          </p:nvGrpSpPr>
+          <p:grpSpPr>
             <a:xfrm>
-              <a:off x="30722719" y="14748719"/>
-              <a:ext cx="8157600" cy="8157600"/>
+              <a:off x="3060319" y="22385119"/>
+              <a:ext cx="17280000" cy="17280000"/>
+              <a:chOff x="-2760882" y="22385119"/>
+              <a:chExt cx="17280000" cy="17280000"/>
             </a:xfrm>
-            <a:prstGeom prst="rect">
-              <a:avLst/>
-            </a:prstGeom>
-          </p:spPr>
-        </p:pic>
-        <p:pic>
-          <p:nvPicPr>
-            <p:cNvPr id="32" name="그림 31">
+          </p:grpSpPr>
+          <p:sp>
+            <p:nvSpPr>
+              <p:cNvPr id="60" name="직사각형 59">
+                <a:extLst>
+                  <a:ext uri="{FF2B5EF4-FFF2-40B4-BE49-F238E27FC236}">
+                    <a16:creationId xmlns:a16="http://schemas.microsoft.com/office/drawing/2014/main" id="{DAAF6574-20AB-4BFA-BB3F-E18161646F95}"/>
+                  </a:ext>
+                </a:extLst>
+              </p:cNvPr>
+              <p:cNvSpPr>
+                <a:spLocks noChangeAspect="1"/>
+              </p:cNvSpPr>
+              <p:nvPr/>
+            </p:nvSpPr>
+            <p:spPr>
+              <a:xfrm>
+                <a:off x="-2760882" y="22385119"/>
+                <a:ext cx="17280000" cy="17280000"/>
+              </a:xfrm>
+              <a:prstGeom prst="rect">
+                <a:avLst/>
+              </a:prstGeom>
+              <a:solidFill>
+                <a:schemeClr val="bg1"/>
+              </a:solidFill>
+              <a:ln>
+                <a:noFill/>
+              </a:ln>
+            </p:spPr>
+            <p:style>
+              <a:lnRef idx="2">
+                <a:schemeClr val="accent1">
+                  <a:shade val="50000"/>
+                </a:schemeClr>
+              </a:lnRef>
+              <a:fillRef idx="1">
+                <a:schemeClr val="accent1"/>
+              </a:fillRef>
+              <a:effectRef idx="0">
+                <a:schemeClr val="accent1"/>
+              </a:effectRef>
+              <a:fontRef idx="minor">
+                <a:schemeClr val="lt1"/>
+              </a:fontRef>
+            </p:style>
+            <p:txBody>
+              <a:bodyPr rtlCol="0" anchor="ctr"/>
+              <a:lstStyle/>
+              <a:p>
+                <a:pPr algn="ctr"/>
+                <a:endParaRPr lang="en-US"/>
+              </a:p>
+            </p:txBody>
+          </p:sp>
+          <p:pic>
+            <p:nvPicPr>
+              <p:cNvPr id="61" name="그림 60">
+                <a:extLst>
+                  <a:ext uri="{FF2B5EF4-FFF2-40B4-BE49-F238E27FC236}">
+                    <a16:creationId xmlns:a16="http://schemas.microsoft.com/office/drawing/2014/main" id="{7526791E-ABB3-418E-A8E7-6D4E4379BD2D}"/>
+                  </a:ext>
+                </a:extLst>
+              </p:cNvPr>
+              <p:cNvPicPr>
+                <a:picLocks noChangeAspect="1"/>
+              </p:cNvPicPr>
+              <p:nvPr/>
+            </p:nvPicPr>
+            <p:blipFill>
+              <a:blip r:embed="rId3">
+                <a:extLst>
+                  <a:ext uri="{28A0092B-C50C-407E-A947-70E740481C1C}">
+                    <a14:useLocalDpi xmlns:a14="http://schemas.microsoft.com/office/drawing/2010/main" val="0"/>
+                  </a:ext>
+                </a:extLst>
+              </a:blip>
+              <a:stretch>
+                <a:fillRect/>
+              </a:stretch>
+            </p:blipFill>
+            <p:spPr>
+              <a:xfrm>
+                <a:off x="-600882" y="24545119"/>
+                <a:ext cx="12960000" cy="12960000"/>
+              </a:xfrm>
+              <a:prstGeom prst="rect">
+                <a:avLst/>
+              </a:prstGeom>
+            </p:spPr>
+          </p:pic>
+        </p:grpSp>
+        <p:grpSp>
+          <p:nvGrpSpPr>
+            <p:cNvPr id="48" name="그룹 47">
               <a:extLst>
                 <a:ext uri="{FF2B5EF4-FFF2-40B4-BE49-F238E27FC236}">
-                  <a16:creationId xmlns:a16="http://schemas.microsoft.com/office/drawing/2014/main" id="{B6007B57-561F-4710-A096-47953688AF25}"/>
+                  <a16:creationId xmlns:a16="http://schemas.microsoft.com/office/drawing/2014/main" id="{F98403FB-0C12-4706-9EB7-1C978CC44114}"/>
                 </a:ext>
               </a:extLst>
             </p:cNvPr>
-            <p:cNvPicPr>
-              <a:picLocks noChangeAspect="1"/>
-            </p:cNvPicPr>
+            <p:cNvGrpSpPr>
+              <a:grpSpLocks noChangeAspect="1"/>
+            </p:cNvGrpSpPr>
             <p:nvPr/>
-          </p:nvPicPr>
-          <p:blipFill>
-            <a:blip r:embed="rId4">
-              <a:extLst>
-                <a:ext uri="{28A0092B-C50C-407E-A947-70E740481C1C}">
-                  <a14:useLocalDpi xmlns:a14="http://schemas.microsoft.com/office/drawing/2010/main" val="0"/>
-                </a:ext>
-              </a:extLst>
-            </a:blip>
-            <a:stretch>
-              <a:fillRect/>
-            </a:stretch>
-          </p:blipFill>
-          <p:spPr>
+          </p:nvGrpSpPr>
+          <p:grpSpPr>
             <a:xfrm>
-              <a:off x="4320319" y="22906319"/>
-              <a:ext cx="34560000" cy="34560000"/>
+              <a:off x="3060319" y="11703919"/>
+              <a:ext cx="10681200" cy="10681200"/>
+              <a:chOff x="328786" y="11703919"/>
+              <a:chExt cx="10681200" cy="10681200"/>
             </a:xfrm>
-            <a:prstGeom prst="rect">
-              <a:avLst/>
-            </a:prstGeom>
-          </p:spPr>
-        </p:pic>
-        <p:pic>
-          <p:nvPicPr>
-            <p:cNvPr id="33" name="그림 32">
+          </p:grpSpPr>
+          <p:sp>
+            <p:nvSpPr>
+              <p:cNvPr id="58" name="직사각형 57">
+                <a:extLst>
+                  <a:ext uri="{FF2B5EF4-FFF2-40B4-BE49-F238E27FC236}">
+                    <a16:creationId xmlns:a16="http://schemas.microsoft.com/office/drawing/2014/main" id="{970698ED-6E4A-4EBF-937E-909C5CDD541E}"/>
+                  </a:ext>
+                </a:extLst>
+              </p:cNvPr>
+              <p:cNvSpPr>
+                <a:spLocks noChangeAspect="1"/>
+              </p:cNvSpPr>
+              <p:nvPr/>
+            </p:nvSpPr>
+            <p:spPr>
+              <a:xfrm>
+                <a:off x="328786" y="11703919"/>
+                <a:ext cx="10681200" cy="10681200"/>
+              </a:xfrm>
+              <a:prstGeom prst="rect">
+                <a:avLst/>
+              </a:prstGeom>
+              <a:solidFill>
+                <a:schemeClr val="bg1"/>
+              </a:solidFill>
+              <a:ln>
+                <a:noFill/>
+              </a:ln>
+            </p:spPr>
+            <p:style>
+              <a:lnRef idx="2">
+                <a:schemeClr val="accent1">
+                  <a:shade val="50000"/>
+                </a:schemeClr>
+              </a:lnRef>
+              <a:fillRef idx="1">
+                <a:schemeClr val="accent1"/>
+              </a:fillRef>
+              <a:effectRef idx="0">
+                <a:schemeClr val="accent1"/>
+              </a:effectRef>
+              <a:fontRef idx="minor">
+                <a:schemeClr val="lt1"/>
+              </a:fontRef>
+            </p:style>
+            <p:txBody>
+              <a:bodyPr rtlCol="0" anchor="ctr"/>
+              <a:lstStyle/>
+              <a:p>
+                <a:pPr algn="ctr"/>
+                <a:endParaRPr lang="en-US"/>
+              </a:p>
+            </p:txBody>
+          </p:sp>
+          <p:pic>
+            <p:nvPicPr>
+              <p:cNvPr id="59" name="그림 58">
+                <a:extLst>
+                  <a:ext uri="{FF2B5EF4-FFF2-40B4-BE49-F238E27FC236}">
+                    <a16:creationId xmlns:a16="http://schemas.microsoft.com/office/drawing/2014/main" id="{34553A2B-C2CE-43C0-8BC5-520D70FF2833}"/>
+                  </a:ext>
+                </a:extLst>
+              </p:cNvPr>
+              <p:cNvPicPr>
+                <a:picLocks noChangeAspect="1"/>
+              </p:cNvPicPr>
+              <p:nvPr/>
+            </p:nvPicPr>
+            <p:blipFill>
+              <a:blip r:embed="rId4">
+                <a:extLst>
+                  <a:ext uri="{28A0092B-C50C-407E-A947-70E740481C1C}">
+                    <a14:useLocalDpi xmlns:a14="http://schemas.microsoft.com/office/drawing/2010/main" val="0"/>
+                  </a:ext>
+                </a:extLst>
+              </a:blip>
+              <a:stretch>
+                <a:fillRect/>
+              </a:stretch>
+            </p:blipFill>
+            <p:spPr>
+              <a:xfrm>
+                <a:off x="1664386" y="13039519"/>
+                <a:ext cx="8010000" cy="8010000"/>
+              </a:xfrm>
+              <a:prstGeom prst="rect">
+                <a:avLst/>
+              </a:prstGeom>
+            </p:spPr>
+          </p:pic>
+        </p:grpSp>
+        <p:grpSp>
+          <p:nvGrpSpPr>
+            <p:cNvPr id="49" name="그룹 48">
               <a:extLst>
                 <a:ext uri="{FF2B5EF4-FFF2-40B4-BE49-F238E27FC236}">
-                  <a16:creationId xmlns:a16="http://schemas.microsoft.com/office/drawing/2014/main" id="{BAD31C72-B690-46E3-B395-4D896F881BF8}"/>
+                  <a16:creationId xmlns:a16="http://schemas.microsoft.com/office/drawing/2014/main" id="{D02C4EA0-2FA1-4E70-89CB-05E33538254C}"/>
                 </a:ext>
               </a:extLst>
             </p:cNvPr>
-            <p:cNvPicPr>
-              <a:picLocks noChangeAspect="1"/>
-            </p:cNvPicPr>
+            <p:cNvGrpSpPr>
+              <a:grpSpLocks noChangeAspect="1"/>
+            </p:cNvGrpSpPr>
             <p:nvPr/>
-          </p:nvPicPr>
-          <p:blipFill>
-            <a:blip r:embed="rId5">
-              <a:extLst>
-                <a:ext uri="{28A0092B-C50C-407E-A947-70E740481C1C}">
-                  <a14:useLocalDpi xmlns:a14="http://schemas.microsoft.com/office/drawing/2010/main" val="0"/>
-                </a:ext>
-              </a:extLst>
-            </a:blip>
-            <a:stretch>
-              <a:fillRect/>
-            </a:stretch>
-          </p:blipFill>
-          <p:spPr>
+          </p:nvGrpSpPr>
+          <p:grpSpPr>
             <a:xfrm>
-              <a:off x="4320319" y="1543919"/>
-              <a:ext cx="21362400" cy="21362400"/>
+              <a:off x="13741518" y="11703919"/>
+              <a:ext cx="6598800" cy="6598800"/>
+              <a:chOff x="10314342" y="13626019"/>
+              <a:chExt cx="6598800" cy="6598800"/>
             </a:xfrm>
-            <a:prstGeom prst="rect">
-              <a:avLst/>
-            </a:prstGeom>
-          </p:spPr>
-        </p:pic>
-        <p:pic>
-          <p:nvPicPr>
-            <p:cNvPr id="34" name="그림 33">
+          </p:grpSpPr>
+          <p:sp>
+            <p:nvSpPr>
+              <p:cNvPr id="56" name="직사각형 55">
+                <a:extLst>
+                  <a:ext uri="{FF2B5EF4-FFF2-40B4-BE49-F238E27FC236}">
+                    <a16:creationId xmlns:a16="http://schemas.microsoft.com/office/drawing/2014/main" id="{F912FC11-B1C0-4D53-9974-C8099961CAA8}"/>
+                  </a:ext>
+                </a:extLst>
+              </p:cNvPr>
+              <p:cNvSpPr>
+                <a:spLocks noChangeAspect="1"/>
+              </p:cNvSpPr>
+              <p:nvPr/>
+            </p:nvSpPr>
+            <p:spPr>
+              <a:xfrm>
+                <a:off x="10314342" y="13626019"/>
+                <a:ext cx="6598800" cy="6598800"/>
+              </a:xfrm>
+              <a:prstGeom prst="rect">
+                <a:avLst/>
+              </a:prstGeom>
+              <a:solidFill>
+                <a:schemeClr val="bg1"/>
+              </a:solidFill>
+              <a:ln>
+                <a:noFill/>
+              </a:ln>
+            </p:spPr>
+            <p:style>
+              <a:lnRef idx="2">
+                <a:schemeClr val="accent1">
+                  <a:shade val="50000"/>
+                </a:schemeClr>
+              </a:lnRef>
+              <a:fillRef idx="1">
+                <a:schemeClr val="accent1"/>
+              </a:fillRef>
+              <a:effectRef idx="0">
+                <a:schemeClr val="accent1"/>
+              </a:effectRef>
+              <a:fontRef idx="minor">
+                <a:schemeClr val="lt1"/>
+              </a:fontRef>
+            </p:style>
+            <p:txBody>
+              <a:bodyPr rtlCol="0" anchor="ctr"/>
+              <a:lstStyle/>
+              <a:p>
+                <a:pPr algn="ctr"/>
+                <a:endParaRPr lang="en-US"/>
+              </a:p>
+            </p:txBody>
+          </p:sp>
+          <p:pic>
+            <p:nvPicPr>
+              <p:cNvPr id="57" name="그림 56">
+                <a:extLst>
+                  <a:ext uri="{FF2B5EF4-FFF2-40B4-BE49-F238E27FC236}">
+                    <a16:creationId xmlns:a16="http://schemas.microsoft.com/office/drawing/2014/main" id="{9CDDA44B-C3E9-414B-9DEA-A131A167DB3F}"/>
+                  </a:ext>
+                </a:extLst>
+              </p:cNvPr>
+              <p:cNvPicPr>
+                <a:picLocks noChangeAspect="1"/>
+              </p:cNvPicPr>
+              <p:nvPr/>
+            </p:nvPicPr>
+            <p:blipFill>
+              <a:blip r:embed="rId5">
+                <a:extLst>
+                  <a:ext uri="{28A0092B-C50C-407E-A947-70E740481C1C}">
+                    <a14:useLocalDpi xmlns:a14="http://schemas.microsoft.com/office/drawing/2010/main" val="0"/>
+                  </a:ext>
+                </a:extLst>
+              </a:blip>
+              <a:stretch>
+                <a:fillRect/>
+              </a:stretch>
+            </p:blipFill>
+            <p:spPr>
+              <a:xfrm>
+                <a:off x="11138742" y="14450419"/>
+                <a:ext cx="4950000" cy="4950000"/>
+              </a:xfrm>
+              <a:prstGeom prst="rect">
+                <a:avLst/>
+              </a:prstGeom>
+            </p:spPr>
+          </p:pic>
+        </p:grpSp>
+        <p:grpSp>
+          <p:nvGrpSpPr>
+            <p:cNvPr id="50" name="그룹 49">
               <a:extLst>
                 <a:ext uri="{FF2B5EF4-FFF2-40B4-BE49-F238E27FC236}">
-                  <a16:creationId xmlns:a16="http://schemas.microsoft.com/office/drawing/2014/main" id="{701D0A19-E8FF-411F-ACE5-48D4D710EFDE}"/>
+                  <a16:creationId xmlns:a16="http://schemas.microsoft.com/office/drawing/2014/main" id="{BE812996-6F33-4F54-97AF-3BF5AABA3836}"/>
                 </a:ext>
               </a:extLst>
             </p:cNvPr>
-            <p:cNvPicPr>
-              <a:picLocks noChangeAspect="1"/>
-            </p:cNvPicPr>
+            <p:cNvGrpSpPr>
+              <a:grpSpLocks noChangeAspect="1"/>
+            </p:cNvGrpSpPr>
             <p:nvPr/>
-          </p:nvPicPr>
-          <p:blipFill>
-            <a:blip r:embed="rId6">
-              <a:extLst>
-                <a:ext uri="{28A0092B-C50C-407E-A947-70E740481C1C}">
-                  <a14:useLocalDpi xmlns:a14="http://schemas.microsoft.com/office/drawing/2010/main" val="0"/>
-                </a:ext>
-              </a:extLst>
-            </a:blip>
-            <a:stretch>
-              <a:fillRect/>
-            </a:stretch>
-          </p:blipFill>
-          <p:spPr>
+          </p:nvGrpSpPr>
+          <p:grpSpPr>
             <a:xfrm>
-              <a:off x="25682717" y="1543919"/>
-              <a:ext cx="13197600" cy="13197600"/>
+              <a:off x="16261519" y="18306319"/>
+              <a:ext cx="4078800" cy="4078800"/>
+              <a:chOff x="19082678" y="18936701"/>
+              <a:chExt cx="4078800" cy="4078800"/>
             </a:xfrm>
-            <a:prstGeom prst="rect">
-              <a:avLst/>
-            </a:prstGeom>
-          </p:spPr>
-        </p:pic>
-        <p:pic>
-          <p:nvPicPr>
-            <p:cNvPr id="36" name="그림 35">
+          </p:grpSpPr>
+          <p:sp>
+            <p:nvSpPr>
+              <p:cNvPr id="54" name="직사각형 53">
+                <a:extLst>
+                  <a:ext uri="{FF2B5EF4-FFF2-40B4-BE49-F238E27FC236}">
+                    <a16:creationId xmlns:a16="http://schemas.microsoft.com/office/drawing/2014/main" id="{223386DD-2EAF-4EDC-8F91-348DB50E3F1C}"/>
+                  </a:ext>
+                </a:extLst>
+              </p:cNvPr>
+              <p:cNvSpPr>
+                <a:spLocks noChangeAspect="1"/>
+              </p:cNvSpPr>
+              <p:nvPr/>
+            </p:nvSpPr>
+            <p:spPr>
+              <a:xfrm>
+                <a:off x="19082678" y="18936701"/>
+                <a:ext cx="4078800" cy="4078800"/>
+              </a:xfrm>
+              <a:prstGeom prst="rect">
+                <a:avLst/>
+              </a:prstGeom>
+              <a:solidFill>
+                <a:schemeClr val="bg1"/>
+              </a:solidFill>
+              <a:ln>
+                <a:noFill/>
+              </a:ln>
+            </p:spPr>
+            <p:style>
+              <a:lnRef idx="2">
+                <a:schemeClr val="accent1">
+                  <a:shade val="50000"/>
+                </a:schemeClr>
+              </a:lnRef>
+              <a:fillRef idx="1">
+                <a:schemeClr val="accent1"/>
+              </a:fillRef>
+              <a:effectRef idx="0">
+                <a:schemeClr val="accent1"/>
+              </a:effectRef>
+              <a:fontRef idx="minor">
+                <a:schemeClr val="lt1"/>
+              </a:fontRef>
+            </p:style>
+            <p:txBody>
+              <a:bodyPr rtlCol="0" anchor="ctr"/>
+              <a:lstStyle/>
+              <a:p>
+                <a:pPr algn="ctr"/>
+                <a:endParaRPr lang="en-US"/>
+              </a:p>
+            </p:txBody>
+          </p:sp>
+          <p:pic>
+            <p:nvPicPr>
+              <p:cNvPr id="55" name="그림 54">
+                <a:extLst>
+                  <a:ext uri="{FF2B5EF4-FFF2-40B4-BE49-F238E27FC236}">
+                    <a16:creationId xmlns:a16="http://schemas.microsoft.com/office/drawing/2014/main" id="{78B24FC9-DFA8-4E14-9438-5FE4F0D89B7E}"/>
+                  </a:ext>
+                </a:extLst>
+              </p:cNvPr>
+              <p:cNvPicPr>
+                <a:picLocks noChangeAspect="1"/>
+              </p:cNvPicPr>
+              <p:nvPr/>
+            </p:nvPicPr>
+            <p:blipFill>
+              <a:blip r:embed="rId6">
+                <a:extLst>
+                  <a:ext uri="{28A0092B-C50C-407E-A947-70E740481C1C}">
+                    <a14:useLocalDpi xmlns:a14="http://schemas.microsoft.com/office/drawing/2010/main" val="0"/>
+                  </a:ext>
+                </a:extLst>
+              </a:blip>
+              <a:stretch>
+                <a:fillRect/>
+              </a:stretch>
+            </p:blipFill>
+            <p:spPr>
+              <a:xfrm>
+                <a:off x="19592078" y="19446101"/>
+                <a:ext cx="3060000" cy="3060000"/>
+              </a:xfrm>
+              <a:prstGeom prst="rect">
+                <a:avLst/>
+              </a:prstGeom>
+            </p:spPr>
+          </p:pic>
+        </p:grpSp>
+        <p:grpSp>
+          <p:nvGrpSpPr>
+            <p:cNvPr id="51" name="그룹 50">
               <a:extLst>
                 <a:ext uri="{FF2B5EF4-FFF2-40B4-BE49-F238E27FC236}">
-                  <a16:creationId xmlns:a16="http://schemas.microsoft.com/office/drawing/2014/main" id="{F8BAF6D3-275C-471D-9255-263BA84004AE}"/>
+                  <a16:creationId xmlns:a16="http://schemas.microsoft.com/office/drawing/2014/main" id="{5E874C22-8F1B-45C0-AAE5-30A6A504AFAE}"/>
                 </a:ext>
               </a:extLst>
             </p:cNvPr>
-            <p:cNvPicPr>
-              <a:picLocks noChangeAspect="1"/>
-            </p:cNvPicPr>
+            <p:cNvGrpSpPr>
+              <a:grpSpLocks noChangeAspect="1"/>
+            </p:cNvGrpSpPr>
             <p:nvPr/>
-          </p:nvPicPr>
-          <p:blipFill>
-            <a:blip r:embed="rId7">
-              <a:extLst>
-                <a:ext uri="{28A0092B-C50C-407E-A947-70E740481C1C}">
-                  <a14:useLocalDpi xmlns:a14="http://schemas.microsoft.com/office/drawing/2010/main" val="0"/>
-                </a:ext>
-              </a:extLst>
-            </a:blip>
-            <a:stretch>
-              <a:fillRect/>
-            </a:stretch>
-          </p:blipFill>
-          <p:spPr>
+          </p:nvGrpSpPr>
+          <p:grpSpPr>
             <a:xfrm>
-              <a:off x="25682721" y="17866319"/>
-              <a:ext cx="5040000" cy="5040000"/>
+              <a:off x="13741518" y="18306319"/>
+              <a:ext cx="1555200" cy="1555200"/>
+              <a:chOff x="26644062" y="18487410"/>
+              <a:chExt cx="1555200" cy="1555200"/>
             </a:xfrm>
-            <a:prstGeom prst="rect">
-              <a:avLst/>
-            </a:prstGeom>
-          </p:spPr>
-        </p:pic>
+          </p:grpSpPr>
+          <p:sp>
+            <p:nvSpPr>
+              <p:cNvPr id="52" name="직사각형 51">
+                <a:extLst>
+                  <a:ext uri="{FF2B5EF4-FFF2-40B4-BE49-F238E27FC236}">
+                    <a16:creationId xmlns:a16="http://schemas.microsoft.com/office/drawing/2014/main" id="{CB9C401C-0931-4769-8A95-348308A066BF}"/>
+                  </a:ext>
+                </a:extLst>
+              </p:cNvPr>
+              <p:cNvSpPr>
+                <a:spLocks noChangeAspect="1"/>
+              </p:cNvSpPr>
+              <p:nvPr/>
+            </p:nvSpPr>
+            <p:spPr>
+              <a:xfrm>
+                <a:off x="26644062" y="18487410"/>
+                <a:ext cx="1555200" cy="1555200"/>
+              </a:xfrm>
+              <a:prstGeom prst="rect">
+                <a:avLst/>
+              </a:prstGeom>
+              <a:solidFill>
+                <a:schemeClr val="bg1"/>
+              </a:solidFill>
+              <a:ln>
+                <a:noFill/>
+              </a:ln>
+            </p:spPr>
+            <p:style>
+              <a:lnRef idx="2">
+                <a:schemeClr val="accent1">
+                  <a:shade val="50000"/>
+                </a:schemeClr>
+              </a:lnRef>
+              <a:fillRef idx="1">
+                <a:schemeClr val="accent1"/>
+              </a:fillRef>
+              <a:effectRef idx="0">
+                <a:schemeClr val="accent1"/>
+              </a:effectRef>
+              <a:fontRef idx="minor">
+                <a:schemeClr val="lt1"/>
+              </a:fontRef>
+            </p:style>
+            <p:txBody>
+              <a:bodyPr rtlCol="0" anchor="ctr"/>
+              <a:lstStyle/>
+              <a:p>
+                <a:pPr algn="ctr"/>
+                <a:endParaRPr lang="en-US"/>
+              </a:p>
+            </p:txBody>
+          </p:sp>
+          <p:pic>
+            <p:nvPicPr>
+              <p:cNvPr id="53" name="그림 52">
+                <a:extLst>
+                  <a:ext uri="{FF2B5EF4-FFF2-40B4-BE49-F238E27FC236}">
+                    <a16:creationId xmlns:a16="http://schemas.microsoft.com/office/drawing/2014/main" id="{98CD8542-0DAE-42EB-9266-F5EA19AB8E3E}"/>
+                  </a:ext>
+                </a:extLst>
+              </p:cNvPr>
+              <p:cNvPicPr>
+                <a:picLocks noChangeAspect="1"/>
+              </p:cNvPicPr>
+              <p:nvPr/>
+            </p:nvPicPr>
+            <p:blipFill>
+              <a:blip r:embed="rId7">
+                <a:extLst>
+                  <a:ext uri="{28A0092B-C50C-407E-A947-70E740481C1C}">
+                    <a14:useLocalDpi xmlns:a14="http://schemas.microsoft.com/office/drawing/2010/main" val="0"/>
+                  </a:ext>
+                </a:extLst>
+              </a:blip>
+              <a:stretch>
+                <a:fillRect/>
+              </a:stretch>
+            </p:blipFill>
+            <p:spPr>
+              <a:xfrm>
+                <a:off x="26838462" y="18681810"/>
+                <a:ext cx="1166400" cy="1166400"/>
+              </a:xfrm>
+              <a:prstGeom prst="rect">
+                <a:avLst/>
+              </a:prstGeom>
+            </p:spPr>
+          </p:pic>
+        </p:grpSp>
       </p:grpSp>
     </p:spTree>
     <p:extLst>
@@ -4092,10 +4554,10 @@
         </p:nvGrpSpPr>
         <p:grpSpPr>
           <a:xfrm>
-            <a:off x="59068096" y="7358747"/>
-            <a:ext cx="5565256" cy="59522400"/>
+            <a:off x="56020096" y="7358747"/>
+            <a:ext cx="5565256" cy="55922400"/>
             <a:chOff x="41017665" y="1543919"/>
-            <a:chExt cx="5565256" cy="59522400"/>
+            <a:chExt cx="5565256" cy="55922400"/>
           </a:xfrm>
         </p:grpSpPr>
         <p:cxnSp>
@@ -4115,7 +4577,7 @@
           <p:spPr>
             <a:xfrm>
               <a:off x="41017665" y="1543919"/>
-              <a:ext cx="0" cy="59522400"/>
+              <a:ext cx="0" cy="55922400"/>
             </a:xfrm>
             <a:prstGeom prst="line">
               <a:avLst/>
@@ -4152,7 +4614,7 @@
           </p:nvSpPr>
           <p:spPr>
             <a:xfrm>
-              <a:off x="41766945" y="28904954"/>
+              <a:off x="41766945" y="28904955"/>
               <a:ext cx="4815976" cy="1200329"/>
             </a:xfrm>
             <a:prstGeom prst="rect">
@@ -4171,7 +4633,7 @@
                 <a:rPr lang="en-US" sz="7200" dirty="0">
                   <a:latin typeface="Arial" panose="020B0604020202020204" pitchFamily="34" charset="0"/>
                 </a:rPr>
-                <a:t>165.34 cm</a:t>
+                <a:t>155.34 cm</a:t>
               </a:r>
             </a:p>
           </p:txBody>
@@ -4191,10 +4653,10 @@
         </p:nvGrpSpPr>
         <p:grpSpPr>
           <a:xfrm>
-            <a:off x="18410590" y="67736601"/>
-            <a:ext cx="38160000" cy="1403529"/>
-            <a:chOff x="720319" y="59405401"/>
-            <a:chExt cx="38160000" cy="1403529"/>
+            <a:off x="19661882" y="64702026"/>
+            <a:ext cx="34560000" cy="1403529"/>
+            <a:chOff x="4320319" y="59405401"/>
+            <a:chExt cx="34560000" cy="1403529"/>
           </a:xfrm>
         </p:grpSpPr>
         <p:cxnSp>
@@ -4213,8 +4675,8 @@
           </p:nvCxnSpPr>
           <p:spPr>
             <a:xfrm rot="5400000">
-              <a:off x="19800319" y="40325401"/>
-              <a:ext cx="0" cy="38160000"/>
+              <a:off x="21600319" y="42125401"/>
+              <a:ext cx="0" cy="34560000"/>
             </a:xfrm>
             <a:prstGeom prst="line">
               <a:avLst/>
@@ -4270,356 +4732,12 @@
                 <a:rPr lang="en-US" sz="7200" dirty="0">
                   <a:latin typeface="Arial" panose="020B0604020202020204" pitchFamily="34" charset="0"/>
                 </a:rPr>
-                <a:t>106 cm</a:t>
+                <a:t>96 cm</a:t>
               </a:r>
             </a:p>
           </p:txBody>
         </p:sp>
       </p:grpSp>
-      <p:grpSp>
-        <p:nvGrpSpPr>
-          <p:cNvPr id="2" name="그룹 1">
-            <a:extLst>
-              <a:ext uri="{FF2B5EF4-FFF2-40B4-BE49-F238E27FC236}">
-                <a16:creationId xmlns:a16="http://schemas.microsoft.com/office/drawing/2014/main" id="{6C55A87E-3812-4C43-BECC-5058B4F97CAA}"/>
-              </a:ext>
-            </a:extLst>
-          </p:cNvPr>
-          <p:cNvGrpSpPr>
-            <a:grpSpLocks noChangeAspect="1"/>
-          </p:cNvGrpSpPr>
-          <p:nvPr/>
-        </p:nvGrpSpPr>
-        <p:grpSpPr>
-          <a:xfrm>
-            <a:off x="-21432714" y="7358747"/>
-            <a:ext cx="38160000" cy="59522400"/>
-            <a:chOff x="-39951955" y="5656901"/>
-            <a:chExt cx="38160000" cy="59522400"/>
-          </a:xfrm>
-        </p:grpSpPr>
-        <p:sp>
-          <p:nvSpPr>
-            <p:cNvPr id="53" name="직사각형 52">
-              <a:extLst>
-                <a:ext uri="{FF2B5EF4-FFF2-40B4-BE49-F238E27FC236}">
-                  <a16:creationId xmlns:a16="http://schemas.microsoft.com/office/drawing/2014/main" id="{0751A23C-A996-4CFC-B25D-A8287596611E}"/>
-                </a:ext>
-              </a:extLst>
-            </p:cNvPr>
-            <p:cNvSpPr/>
-            <p:nvPr/>
-          </p:nvSpPr>
-          <p:spPr>
-            <a:xfrm>
-              <a:off x="-39951955" y="5656901"/>
-              <a:ext cx="38160000" cy="59522400"/>
-            </a:xfrm>
-            <a:prstGeom prst="rect">
-              <a:avLst/>
-            </a:prstGeom>
-            <a:solidFill>
-              <a:schemeClr val="bg1"/>
-            </a:solidFill>
-            <a:ln>
-              <a:noFill/>
-            </a:ln>
-          </p:spPr>
-          <p:style>
-            <a:lnRef idx="2">
-              <a:schemeClr val="accent1">
-                <a:shade val="50000"/>
-              </a:schemeClr>
-            </a:lnRef>
-            <a:fillRef idx="1">
-              <a:schemeClr val="accent1"/>
-            </a:fillRef>
-            <a:effectRef idx="0">
-              <a:schemeClr val="accent1"/>
-            </a:effectRef>
-            <a:fontRef idx="minor">
-              <a:schemeClr val="lt1"/>
-            </a:fontRef>
-          </p:style>
-          <p:txBody>
-            <a:bodyPr rtlCol="0" anchor="ctr"/>
-            <a:lstStyle/>
-            <a:p>
-              <a:pPr algn="ctr"/>
-              <a:endParaRPr lang="en-US"/>
-            </a:p>
-          </p:txBody>
-        </p:sp>
-        <p:grpSp>
-          <p:nvGrpSpPr>
-            <p:cNvPr id="46" name="그룹 45">
-              <a:extLst>
-                <a:ext uri="{FF2B5EF4-FFF2-40B4-BE49-F238E27FC236}">
-                  <a16:creationId xmlns:a16="http://schemas.microsoft.com/office/drawing/2014/main" id="{7FCE3BD9-C3D4-4473-8446-99DE8B83A3E0}"/>
-                </a:ext>
-              </a:extLst>
-            </p:cNvPr>
-            <p:cNvGrpSpPr>
-              <a:grpSpLocks noChangeAspect="1"/>
-            </p:cNvGrpSpPr>
-            <p:nvPr/>
-          </p:nvGrpSpPr>
-          <p:grpSpPr>
-            <a:xfrm>
-              <a:off x="-38151955" y="7456901"/>
-              <a:ext cx="34560000" cy="55922400"/>
-              <a:chOff x="4320319" y="1543919"/>
-              <a:chExt cx="34560000" cy="55922400"/>
-            </a:xfrm>
-          </p:grpSpPr>
-          <p:pic>
-            <p:nvPicPr>
-              <p:cNvPr id="47" name="그림 46">
-                <a:extLst>
-                  <a:ext uri="{FF2B5EF4-FFF2-40B4-BE49-F238E27FC236}">
-                    <a16:creationId xmlns:a16="http://schemas.microsoft.com/office/drawing/2014/main" id="{9A4502D5-7279-4DBE-B001-D1B222070C49}"/>
-                  </a:ext>
-                </a:extLst>
-              </p:cNvPr>
-              <p:cNvPicPr>
-                <a:picLocks noChangeAspect="1"/>
-              </p:cNvPicPr>
-              <p:nvPr/>
-            </p:nvPicPr>
-            <p:blipFill>
-              <a:blip r:embed="rId2">
-                <a:extLst>
-                  <a:ext uri="{28A0092B-C50C-407E-A947-70E740481C1C}">
-                    <a14:useLocalDpi xmlns:a14="http://schemas.microsoft.com/office/drawing/2010/main" val="0"/>
-                  </a:ext>
-                </a:extLst>
-              </a:blip>
-              <a:stretch>
-                <a:fillRect/>
-              </a:stretch>
-            </p:blipFill>
-            <p:spPr>
-              <a:xfrm>
-                <a:off x="25682717" y="14748719"/>
-                <a:ext cx="3110400" cy="3110400"/>
-              </a:xfrm>
-              <a:prstGeom prst="rect">
-                <a:avLst/>
-              </a:prstGeom>
-            </p:spPr>
-          </p:pic>
-          <p:pic>
-            <p:nvPicPr>
-              <p:cNvPr id="48" name="그림 47">
-                <a:extLst>
-                  <a:ext uri="{FF2B5EF4-FFF2-40B4-BE49-F238E27FC236}">
-                    <a16:creationId xmlns:a16="http://schemas.microsoft.com/office/drawing/2014/main" id="{3E342C55-1172-4585-86C8-66738D7EAE58}"/>
-                  </a:ext>
-                </a:extLst>
-              </p:cNvPr>
-              <p:cNvPicPr>
-                <a:picLocks noChangeAspect="1"/>
-              </p:cNvPicPr>
-              <p:nvPr/>
-            </p:nvPicPr>
-            <p:blipFill>
-              <a:blip r:embed="rId3">
-                <a:extLst>
-                  <a:ext uri="{28A0092B-C50C-407E-A947-70E740481C1C}">
-                    <a14:useLocalDpi xmlns:a14="http://schemas.microsoft.com/office/drawing/2010/main" val="0"/>
-                  </a:ext>
-                </a:extLst>
-              </a:blip>
-              <a:stretch>
-                <a:fillRect/>
-              </a:stretch>
-            </p:blipFill>
-            <p:spPr>
-              <a:xfrm>
-                <a:off x="30722719" y="14748719"/>
-                <a:ext cx="8157600" cy="8157600"/>
-              </a:xfrm>
-              <a:prstGeom prst="rect">
-                <a:avLst/>
-              </a:prstGeom>
-            </p:spPr>
-          </p:pic>
-          <p:pic>
-            <p:nvPicPr>
-              <p:cNvPr id="49" name="그림 48">
-                <a:extLst>
-                  <a:ext uri="{FF2B5EF4-FFF2-40B4-BE49-F238E27FC236}">
-                    <a16:creationId xmlns:a16="http://schemas.microsoft.com/office/drawing/2014/main" id="{EE57099C-071D-4D14-A2C1-108709845890}"/>
-                  </a:ext>
-                </a:extLst>
-              </p:cNvPr>
-              <p:cNvPicPr>
-                <a:picLocks noChangeAspect="1"/>
-              </p:cNvPicPr>
-              <p:nvPr/>
-            </p:nvPicPr>
-            <p:blipFill>
-              <a:blip r:embed="rId4">
-                <a:extLst>
-                  <a:ext uri="{28A0092B-C50C-407E-A947-70E740481C1C}">
-                    <a14:useLocalDpi xmlns:a14="http://schemas.microsoft.com/office/drawing/2010/main" val="0"/>
-                  </a:ext>
-                </a:extLst>
-              </a:blip>
-              <a:stretch>
-                <a:fillRect/>
-              </a:stretch>
-            </p:blipFill>
-            <p:spPr>
-              <a:xfrm>
-                <a:off x="4320319" y="22906319"/>
-                <a:ext cx="34560000" cy="34560000"/>
-              </a:xfrm>
-              <a:prstGeom prst="rect">
-                <a:avLst/>
-              </a:prstGeom>
-            </p:spPr>
-          </p:pic>
-          <p:pic>
-            <p:nvPicPr>
-              <p:cNvPr id="50" name="그림 49">
-                <a:extLst>
-                  <a:ext uri="{FF2B5EF4-FFF2-40B4-BE49-F238E27FC236}">
-                    <a16:creationId xmlns:a16="http://schemas.microsoft.com/office/drawing/2014/main" id="{97C3944C-77D4-4F7D-9238-0E4232872FC2}"/>
-                  </a:ext>
-                </a:extLst>
-              </p:cNvPr>
-              <p:cNvPicPr>
-                <a:picLocks noChangeAspect="1"/>
-              </p:cNvPicPr>
-              <p:nvPr/>
-            </p:nvPicPr>
-            <p:blipFill>
-              <a:blip r:embed="rId5">
-                <a:extLst>
-                  <a:ext uri="{28A0092B-C50C-407E-A947-70E740481C1C}">
-                    <a14:useLocalDpi xmlns:a14="http://schemas.microsoft.com/office/drawing/2010/main" val="0"/>
-                  </a:ext>
-                </a:extLst>
-              </a:blip>
-              <a:stretch>
-                <a:fillRect/>
-              </a:stretch>
-            </p:blipFill>
-            <p:spPr>
-              <a:xfrm>
-                <a:off x="4320319" y="1543919"/>
-                <a:ext cx="21362400" cy="21362400"/>
-              </a:xfrm>
-              <a:prstGeom prst="rect">
-                <a:avLst/>
-              </a:prstGeom>
-            </p:spPr>
-          </p:pic>
-          <p:pic>
-            <p:nvPicPr>
-              <p:cNvPr id="51" name="그림 50">
-                <a:extLst>
-                  <a:ext uri="{FF2B5EF4-FFF2-40B4-BE49-F238E27FC236}">
-                    <a16:creationId xmlns:a16="http://schemas.microsoft.com/office/drawing/2014/main" id="{6125A6E9-8943-44F8-8FCA-B49B0608C475}"/>
-                  </a:ext>
-                </a:extLst>
-              </p:cNvPr>
-              <p:cNvPicPr>
-                <a:picLocks noChangeAspect="1"/>
-              </p:cNvPicPr>
-              <p:nvPr/>
-            </p:nvPicPr>
-            <p:blipFill>
-              <a:blip r:embed="rId6">
-                <a:extLst>
-                  <a:ext uri="{28A0092B-C50C-407E-A947-70E740481C1C}">
-                    <a14:useLocalDpi xmlns:a14="http://schemas.microsoft.com/office/drawing/2010/main" val="0"/>
-                  </a:ext>
-                </a:extLst>
-              </a:blip>
-              <a:stretch>
-                <a:fillRect/>
-              </a:stretch>
-            </p:blipFill>
-            <p:spPr>
-              <a:xfrm>
-                <a:off x="25682717" y="1543919"/>
-                <a:ext cx="13197600" cy="13197600"/>
-              </a:xfrm>
-              <a:prstGeom prst="rect">
-                <a:avLst/>
-              </a:prstGeom>
-            </p:spPr>
-          </p:pic>
-          <p:pic>
-            <p:nvPicPr>
-              <p:cNvPr id="52" name="그림 51">
-                <a:extLst>
-                  <a:ext uri="{FF2B5EF4-FFF2-40B4-BE49-F238E27FC236}">
-                    <a16:creationId xmlns:a16="http://schemas.microsoft.com/office/drawing/2014/main" id="{193F1180-0270-41BE-A03C-3771F0C6BE4A}"/>
-                  </a:ext>
-                </a:extLst>
-              </p:cNvPr>
-              <p:cNvPicPr>
-                <a:picLocks noChangeAspect="1"/>
-              </p:cNvPicPr>
-              <p:nvPr/>
-            </p:nvPicPr>
-            <p:blipFill>
-              <a:blip r:embed="rId7">
-                <a:extLst>
-                  <a:ext uri="{28A0092B-C50C-407E-A947-70E740481C1C}">
-                    <a14:useLocalDpi xmlns:a14="http://schemas.microsoft.com/office/drawing/2010/main" val="0"/>
-                  </a:ext>
-                </a:extLst>
-              </a:blip>
-              <a:stretch>
-                <a:fillRect/>
-              </a:stretch>
-            </p:blipFill>
-            <p:spPr>
-              <a:xfrm>
-                <a:off x="25682721" y="17866319"/>
-                <a:ext cx="5040000" cy="5040000"/>
-              </a:xfrm>
-              <a:prstGeom prst="rect">
-                <a:avLst/>
-              </a:prstGeom>
-            </p:spPr>
-          </p:pic>
-        </p:grpSp>
-      </p:grpSp>
-      <p:pic>
-        <p:nvPicPr>
-          <p:cNvPr id="5" name="그림 4">
-            <a:extLst>
-              <a:ext uri="{FF2B5EF4-FFF2-40B4-BE49-F238E27FC236}">
-                <a16:creationId xmlns:a16="http://schemas.microsoft.com/office/drawing/2014/main" id="{B8C81CD1-4FDF-4332-B007-C54E5F37F854}"/>
-              </a:ext>
-            </a:extLst>
-          </p:cNvPr>
-          <p:cNvPicPr>
-            <a:picLocks noChangeAspect="1"/>
-          </p:cNvPicPr>
-          <p:nvPr/>
-        </p:nvPicPr>
-        <p:blipFill>
-          <a:blip r:embed="rId8"/>
-          <a:stretch>
-            <a:fillRect/>
-          </a:stretch>
-        </p:blipFill>
-        <p:spPr>
-          <a:xfrm>
-            <a:off x="17861882" y="7358747"/>
-            <a:ext cx="38160000" cy="59526170"/>
-          </a:xfrm>
-          <a:prstGeom prst="rect">
-            <a:avLst/>
-          </a:prstGeom>
-        </p:spPr>
-      </p:pic>
       <p:sp>
         <p:nvSpPr>
           <p:cNvPr id="41" name="TextBox 40">
@@ -4671,7 +4789,7 @@
         </p:nvSpPr>
         <p:spPr>
           <a:xfrm>
-            <a:off x="-6992766" y="4439356"/>
+            <a:off x="-5581277" y="4439356"/>
             <a:ext cx="9280105" cy="1878528"/>
           </a:xfrm>
           <a:prstGeom prst="rect">
@@ -4694,6 +4812,737 @@
           </a:p>
         </p:txBody>
       </p:sp>
+      <p:grpSp>
+        <p:nvGrpSpPr>
+          <p:cNvPr id="23" name="그룹 22">
+            <a:extLst>
+              <a:ext uri="{FF2B5EF4-FFF2-40B4-BE49-F238E27FC236}">
+                <a16:creationId xmlns:a16="http://schemas.microsoft.com/office/drawing/2014/main" id="{9760AF28-FD41-4DC0-9C0B-96A6D92DD10F}"/>
+              </a:ext>
+            </a:extLst>
+          </p:cNvPr>
+          <p:cNvGrpSpPr>
+            <a:grpSpLocks noChangeAspect="1"/>
+          </p:cNvGrpSpPr>
+          <p:nvPr/>
+        </p:nvGrpSpPr>
+        <p:grpSpPr>
+          <a:xfrm>
+            <a:off x="-18221225" y="7958911"/>
+            <a:ext cx="34560000" cy="55922400"/>
+            <a:chOff x="3060319" y="11703919"/>
+            <a:chExt cx="17280000" cy="27961200"/>
+          </a:xfrm>
+        </p:grpSpPr>
+        <p:grpSp>
+          <p:nvGrpSpPr>
+            <p:cNvPr id="24" name="그룹 23">
+              <a:extLst>
+                <a:ext uri="{FF2B5EF4-FFF2-40B4-BE49-F238E27FC236}">
+                  <a16:creationId xmlns:a16="http://schemas.microsoft.com/office/drawing/2014/main" id="{9992E6DB-265E-49F1-91C2-F07FD73F98B9}"/>
+                </a:ext>
+              </a:extLst>
+            </p:cNvPr>
+            <p:cNvGrpSpPr>
+              <a:grpSpLocks noChangeAspect="1"/>
+            </p:cNvGrpSpPr>
+            <p:nvPr/>
+          </p:nvGrpSpPr>
+          <p:grpSpPr>
+            <a:xfrm>
+              <a:off x="13741520" y="19865119"/>
+              <a:ext cx="2520000" cy="2520000"/>
+              <a:chOff x="19947575" y="23450076"/>
+              <a:chExt cx="2520000" cy="2520000"/>
+            </a:xfrm>
+          </p:grpSpPr>
+          <p:sp>
+            <p:nvSpPr>
+              <p:cNvPr id="43" name="직사각형 42">
+                <a:extLst>
+                  <a:ext uri="{FF2B5EF4-FFF2-40B4-BE49-F238E27FC236}">
+                    <a16:creationId xmlns:a16="http://schemas.microsoft.com/office/drawing/2014/main" id="{452520E0-8BA3-48CA-BA9F-68A7770C8A5D}"/>
+                  </a:ext>
+                </a:extLst>
+              </p:cNvPr>
+              <p:cNvSpPr>
+                <a:spLocks noChangeAspect="1"/>
+              </p:cNvSpPr>
+              <p:nvPr/>
+            </p:nvSpPr>
+            <p:spPr>
+              <a:xfrm>
+                <a:off x="19947575" y="23450076"/>
+                <a:ext cx="2520000" cy="2520000"/>
+              </a:xfrm>
+              <a:prstGeom prst="rect">
+                <a:avLst/>
+              </a:prstGeom>
+              <a:solidFill>
+                <a:schemeClr val="bg1"/>
+              </a:solidFill>
+              <a:ln>
+                <a:noFill/>
+              </a:ln>
+            </p:spPr>
+            <p:style>
+              <a:lnRef idx="2">
+                <a:schemeClr val="accent1">
+                  <a:shade val="50000"/>
+                </a:schemeClr>
+              </a:lnRef>
+              <a:fillRef idx="1">
+                <a:schemeClr val="accent1"/>
+              </a:fillRef>
+              <a:effectRef idx="0">
+                <a:schemeClr val="accent1"/>
+              </a:effectRef>
+              <a:fontRef idx="minor">
+                <a:schemeClr val="lt1"/>
+              </a:fontRef>
+            </p:style>
+            <p:txBody>
+              <a:bodyPr rtlCol="0" anchor="ctr"/>
+              <a:lstStyle/>
+              <a:p>
+                <a:pPr algn="ctr"/>
+                <a:endParaRPr lang="en-US"/>
+              </a:p>
+            </p:txBody>
+          </p:sp>
+          <p:pic>
+            <p:nvPicPr>
+              <p:cNvPr id="44" name="그림 43">
+                <a:extLst>
+                  <a:ext uri="{FF2B5EF4-FFF2-40B4-BE49-F238E27FC236}">
+                    <a16:creationId xmlns:a16="http://schemas.microsoft.com/office/drawing/2014/main" id="{8ACCF621-CA34-4378-AE70-40F1BA2F05AA}"/>
+                  </a:ext>
+                </a:extLst>
+              </p:cNvPr>
+              <p:cNvPicPr>
+                <a:picLocks noChangeAspect="1"/>
+              </p:cNvPicPr>
+              <p:nvPr/>
+            </p:nvPicPr>
+            <p:blipFill>
+              <a:blip r:embed="rId2">
+                <a:extLst>
+                  <a:ext uri="{28A0092B-C50C-407E-A947-70E740481C1C}">
+                    <a14:useLocalDpi xmlns:a14="http://schemas.microsoft.com/office/drawing/2010/main" val="0"/>
+                  </a:ext>
+                </a:extLst>
+              </a:blip>
+              <a:stretch>
+                <a:fillRect/>
+              </a:stretch>
+            </p:blipFill>
+            <p:spPr>
+              <a:xfrm>
+                <a:off x="20262575" y="23765076"/>
+                <a:ext cx="1890000" cy="1890000"/>
+              </a:xfrm>
+              <a:prstGeom prst="rect">
+                <a:avLst/>
+              </a:prstGeom>
+            </p:spPr>
+          </p:pic>
+        </p:grpSp>
+        <p:grpSp>
+          <p:nvGrpSpPr>
+            <p:cNvPr id="26" name="그룹 25">
+              <a:extLst>
+                <a:ext uri="{FF2B5EF4-FFF2-40B4-BE49-F238E27FC236}">
+                  <a16:creationId xmlns:a16="http://schemas.microsoft.com/office/drawing/2014/main" id="{5C730B9F-B1B9-46A9-A879-E591E0E253F3}"/>
+                </a:ext>
+              </a:extLst>
+            </p:cNvPr>
+            <p:cNvGrpSpPr>
+              <a:grpSpLocks noChangeAspect="1"/>
+            </p:cNvGrpSpPr>
+            <p:nvPr/>
+          </p:nvGrpSpPr>
+          <p:grpSpPr>
+            <a:xfrm>
+              <a:off x="3060319" y="22385119"/>
+              <a:ext cx="17280000" cy="17280000"/>
+              <a:chOff x="-2760882" y="22385119"/>
+              <a:chExt cx="17280000" cy="17280000"/>
+            </a:xfrm>
+          </p:grpSpPr>
+          <p:sp>
+            <p:nvSpPr>
+              <p:cNvPr id="39" name="직사각형 38">
+                <a:extLst>
+                  <a:ext uri="{FF2B5EF4-FFF2-40B4-BE49-F238E27FC236}">
+                    <a16:creationId xmlns:a16="http://schemas.microsoft.com/office/drawing/2014/main" id="{2493708D-7D40-481A-9BD6-C5EDB5C73F96}"/>
+                  </a:ext>
+                </a:extLst>
+              </p:cNvPr>
+              <p:cNvSpPr>
+                <a:spLocks noChangeAspect="1"/>
+              </p:cNvSpPr>
+              <p:nvPr/>
+            </p:nvSpPr>
+            <p:spPr>
+              <a:xfrm>
+                <a:off x="-2760882" y="22385119"/>
+                <a:ext cx="17280000" cy="17280000"/>
+              </a:xfrm>
+              <a:prstGeom prst="rect">
+                <a:avLst/>
+              </a:prstGeom>
+              <a:solidFill>
+                <a:schemeClr val="bg1"/>
+              </a:solidFill>
+              <a:ln>
+                <a:noFill/>
+              </a:ln>
+            </p:spPr>
+            <p:style>
+              <a:lnRef idx="2">
+                <a:schemeClr val="accent1">
+                  <a:shade val="50000"/>
+                </a:schemeClr>
+              </a:lnRef>
+              <a:fillRef idx="1">
+                <a:schemeClr val="accent1"/>
+              </a:fillRef>
+              <a:effectRef idx="0">
+                <a:schemeClr val="accent1"/>
+              </a:effectRef>
+              <a:fontRef idx="minor">
+                <a:schemeClr val="lt1"/>
+              </a:fontRef>
+            </p:style>
+            <p:txBody>
+              <a:bodyPr rtlCol="0" anchor="ctr"/>
+              <a:lstStyle/>
+              <a:p>
+                <a:pPr algn="ctr"/>
+                <a:endParaRPr lang="en-US"/>
+              </a:p>
+            </p:txBody>
+          </p:sp>
+          <p:pic>
+            <p:nvPicPr>
+              <p:cNvPr id="40" name="그림 39">
+                <a:extLst>
+                  <a:ext uri="{FF2B5EF4-FFF2-40B4-BE49-F238E27FC236}">
+                    <a16:creationId xmlns:a16="http://schemas.microsoft.com/office/drawing/2014/main" id="{21C49C06-46F0-4D90-B6A4-F2577C552FA6}"/>
+                  </a:ext>
+                </a:extLst>
+              </p:cNvPr>
+              <p:cNvPicPr>
+                <a:picLocks noChangeAspect="1"/>
+              </p:cNvPicPr>
+              <p:nvPr/>
+            </p:nvPicPr>
+            <p:blipFill>
+              <a:blip r:embed="rId3">
+                <a:extLst>
+                  <a:ext uri="{28A0092B-C50C-407E-A947-70E740481C1C}">
+                    <a14:useLocalDpi xmlns:a14="http://schemas.microsoft.com/office/drawing/2010/main" val="0"/>
+                  </a:ext>
+                </a:extLst>
+              </a:blip>
+              <a:stretch>
+                <a:fillRect/>
+              </a:stretch>
+            </p:blipFill>
+            <p:spPr>
+              <a:xfrm>
+                <a:off x="-600882" y="24545119"/>
+                <a:ext cx="12960000" cy="12960000"/>
+              </a:xfrm>
+              <a:prstGeom prst="rect">
+                <a:avLst/>
+              </a:prstGeom>
+            </p:spPr>
+          </p:pic>
+        </p:grpSp>
+        <p:grpSp>
+          <p:nvGrpSpPr>
+            <p:cNvPr id="27" name="그룹 26">
+              <a:extLst>
+                <a:ext uri="{FF2B5EF4-FFF2-40B4-BE49-F238E27FC236}">
+                  <a16:creationId xmlns:a16="http://schemas.microsoft.com/office/drawing/2014/main" id="{7ACF044D-5837-4F1B-848B-BD9ACA871CF0}"/>
+                </a:ext>
+              </a:extLst>
+            </p:cNvPr>
+            <p:cNvGrpSpPr>
+              <a:grpSpLocks noChangeAspect="1"/>
+            </p:cNvGrpSpPr>
+            <p:nvPr/>
+          </p:nvGrpSpPr>
+          <p:grpSpPr>
+            <a:xfrm>
+              <a:off x="3060319" y="11703919"/>
+              <a:ext cx="10681200" cy="10681200"/>
+              <a:chOff x="328786" y="11703919"/>
+              <a:chExt cx="10681200" cy="10681200"/>
+            </a:xfrm>
+          </p:grpSpPr>
+          <p:sp>
+            <p:nvSpPr>
+              <p:cNvPr id="37" name="직사각형 36">
+                <a:extLst>
+                  <a:ext uri="{FF2B5EF4-FFF2-40B4-BE49-F238E27FC236}">
+                    <a16:creationId xmlns:a16="http://schemas.microsoft.com/office/drawing/2014/main" id="{C3526A40-C3D5-42ED-81BB-B8BF1A2059C6}"/>
+                  </a:ext>
+                </a:extLst>
+              </p:cNvPr>
+              <p:cNvSpPr>
+                <a:spLocks noChangeAspect="1"/>
+              </p:cNvSpPr>
+              <p:nvPr/>
+            </p:nvSpPr>
+            <p:spPr>
+              <a:xfrm>
+                <a:off x="328786" y="11703919"/>
+                <a:ext cx="10681200" cy="10681200"/>
+              </a:xfrm>
+              <a:prstGeom prst="rect">
+                <a:avLst/>
+              </a:prstGeom>
+              <a:solidFill>
+                <a:schemeClr val="bg1"/>
+              </a:solidFill>
+              <a:ln>
+                <a:noFill/>
+              </a:ln>
+            </p:spPr>
+            <p:style>
+              <a:lnRef idx="2">
+                <a:schemeClr val="accent1">
+                  <a:shade val="50000"/>
+                </a:schemeClr>
+              </a:lnRef>
+              <a:fillRef idx="1">
+                <a:schemeClr val="accent1"/>
+              </a:fillRef>
+              <a:effectRef idx="0">
+                <a:schemeClr val="accent1"/>
+              </a:effectRef>
+              <a:fontRef idx="minor">
+                <a:schemeClr val="lt1"/>
+              </a:fontRef>
+            </p:style>
+            <p:txBody>
+              <a:bodyPr rtlCol="0" anchor="ctr"/>
+              <a:lstStyle/>
+              <a:p>
+                <a:pPr algn="ctr"/>
+                <a:endParaRPr lang="en-US"/>
+              </a:p>
+            </p:txBody>
+          </p:sp>
+          <p:pic>
+            <p:nvPicPr>
+              <p:cNvPr id="38" name="그림 37">
+                <a:extLst>
+                  <a:ext uri="{FF2B5EF4-FFF2-40B4-BE49-F238E27FC236}">
+                    <a16:creationId xmlns:a16="http://schemas.microsoft.com/office/drawing/2014/main" id="{BBF518E5-C15E-4D3F-BFC1-67106716F205}"/>
+                  </a:ext>
+                </a:extLst>
+              </p:cNvPr>
+              <p:cNvPicPr>
+                <a:picLocks noChangeAspect="1"/>
+              </p:cNvPicPr>
+              <p:nvPr/>
+            </p:nvPicPr>
+            <p:blipFill>
+              <a:blip r:embed="rId4">
+                <a:extLst>
+                  <a:ext uri="{28A0092B-C50C-407E-A947-70E740481C1C}">
+                    <a14:useLocalDpi xmlns:a14="http://schemas.microsoft.com/office/drawing/2010/main" val="0"/>
+                  </a:ext>
+                </a:extLst>
+              </a:blip>
+              <a:stretch>
+                <a:fillRect/>
+              </a:stretch>
+            </p:blipFill>
+            <p:spPr>
+              <a:xfrm>
+                <a:off x="1664386" y="13039519"/>
+                <a:ext cx="8010000" cy="8010000"/>
+              </a:xfrm>
+              <a:prstGeom prst="rect">
+                <a:avLst/>
+              </a:prstGeom>
+            </p:spPr>
+          </p:pic>
+        </p:grpSp>
+        <p:grpSp>
+          <p:nvGrpSpPr>
+            <p:cNvPr id="28" name="그룹 27">
+              <a:extLst>
+                <a:ext uri="{FF2B5EF4-FFF2-40B4-BE49-F238E27FC236}">
+                  <a16:creationId xmlns:a16="http://schemas.microsoft.com/office/drawing/2014/main" id="{26F4EB98-3DA6-485F-B268-A2CF038CFDB8}"/>
+                </a:ext>
+              </a:extLst>
+            </p:cNvPr>
+            <p:cNvGrpSpPr>
+              <a:grpSpLocks noChangeAspect="1"/>
+            </p:cNvGrpSpPr>
+            <p:nvPr/>
+          </p:nvGrpSpPr>
+          <p:grpSpPr>
+            <a:xfrm>
+              <a:off x="13741518" y="11703919"/>
+              <a:ext cx="6598800" cy="6598800"/>
+              <a:chOff x="10314342" y="13626019"/>
+              <a:chExt cx="6598800" cy="6598800"/>
+            </a:xfrm>
+          </p:grpSpPr>
+          <p:sp>
+            <p:nvSpPr>
+              <p:cNvPr id="35" name="직사각형 34">
+                <a:extLst>
+                  <a:ext uri="{FF2B5EF4-FFF2-40B4-BE49-F238E27FC236}">
+                    <a16:creationId xmlns:a16="http://schemas.microsoft.com/office/drawing/2014/main" id="{A6299B2C-5F7F-4D51-AED9-276C130008BC}"/>
+                  </a:ext>
+                </a:extLst>
+              </p:cNvPr>
+              <p:cNvSpPr>
+                <a:spLocks noChangeAspect="1"/>
+              </p:cNvSpPr>
+              <p:nvPr/>
+            </p:nvSpPr>
+            <p:spPr>
+              <a:xfrm>
+                <a:off x="10314342" y="13626019"/>
+                <a:ext cx="6598800" cy="6598800"/>
+              </a:xfrm>
+              <a:prstGeom prst="rect">
+                <a:avLst/>
+              </a:prstGeom>
+              <a:solidFill>
+                <a:schemeClr val="bg1"/>
+              </a:solidFill>
+              <a:ln>
+                <a:noFill/>
+              </a:ln>
+            </p:spPr>
+            <p:style>
+              <a:lnRef idx="2">
+                <a:schemeClr val="accent1">
+                  <a:shade val="50000"/>
+                </a:schemeClr>
+              </a:lnRef>
+              <a:fillRef idx="1">
+                <a:schemeClr val="accent1"/>
+              </a:fillRef>
+              <a:effectRef idx="0">
+                <a:schemeClr val="accent1"/>
+              </a:effectRef>
+              <a:fontRef idx="minor">
+                <a:schemeClr val="lt1"/>
+              </a:fontRef>
+            </p:style>
+            <p:txBody>
+              <a:bodyPr rtlCol="0" anchor="ctr"/>
+              <a:lstStyle/>
+              <a:p>
+                <a:pPr algn="ctr"/>
+                <a:endParaRPr lang="en-US"/>
+              </a:p>
+            </p:txBody>
+          </p:sp>
+          <p:pic>
+            <p:nvPicPr>
+              <p:cNvPr id="36" name="그림 35">
+                <a:extLst>
+                  <a:ext uri="{FF2B5EF4-FFF2-40B4-BE49-F238E27FC236}">
+                    <a16:creationId xmlns:a16="http://schemas.microsoft.com/office/drawing/2014/main" id="{4D5F4ACE-51EF-4B81-B7E6-6B3F550DF009}"/>
+                  </a:ext>
+                </a:extLst>
+              </p:cNvPr>
+              <p:cNvPicPr>
+                <a:picLocks noChangeAspect="1"/>
+              </p:cNvPicPr>
+              <p:nvPr/>
+            </p:nvPicPr>
+            <p:blipFill>
+              <a:blip r:embed="rId5">
+                <a:extLst>
+                  <a:ext uri="{28A0092B-C50C-407E-A947-70E740481C1C}">
+                    <a14:useLocalDpi xmlns:a14="http://schemas.microsoft.com/office/drawing/2010/main" val="0"/>
+                  </a:ext>
+                </a:extLst>
+              </a:blip>
+              <a:stretch>
+                <a:fillRect/>
+              </a:stretch>
+            </p:blipFill>
+            <p:spPr>
+              <a:xfrm>
+                <a:off x="11138742" y="14450419"/>
+                <a:ext cx="4950000" cy="4950000"/>
+              </a:xfrm>
+              <a:prstGeom prst="rect">
+                <a:avLst/>
+              </a:prstGeom>
+            </p:spPr>
+          </p:pic>
+        </p:grpSp>
+        <p:grpSp>
+          <p:nvGrpSpPr>
+            <p:cNvPr id="29" name="그룹 28">
+              <a:extLst>
+                <a:ext uri="{FF2B5EF4-FFF2-40B4-BE49-F238E27FC236}">
+                  <a16:creationId xmlns:a16="http://schemas.microsoft.com/office/drawing/2014/main" id="{871B9792-FF16-489C-B375-CDF8BFF11376}"/>
+                </a:ext>
+              </a:extLst>
+            </p:cNvPr>
+            <p:cNvGrpSpPr>
+              <a:grpSpLocks noChangeAspect="1"/>
+            </p:cNvGrpSpPr>
+            <p:nvPr/>
+          </p:nvGrpSpPr>
+          <p:grpSpPr>
+            <a:xfrm>
+              <a:off x="16261519" y="18306319"/>
+              <a:ext cx="4078800" cy="4078800"/>
+              <a:chOff x="19082678" y="18936701"/>
+              <a:chExt cx="4078800" cy="4078800"/>
+            </a:xfrm>
+          </p:grpSpPr>
+          <p:sp>
+            <p:nvSpPr>
+              <p:cNvPr id="33" name="직사각형 32">
+                <a:extLst>
+                  <a:ext uri="{FF2B5EF4-FFF2-40B4-BE49-F238E27FC236}">
+                    <a16:creationId xmlns:a16="http://schemas.microsoft.com/office/drawing/2014/main" id="{C458D60F-FBF9-4E8F-B8DD-BA06C6F6769E}"/>
+                  </a:ext>
+                </a:extLst>
+              </p:cNvPr>
+              <p:cNvSpPr>
+                <a:spLocks noChangeAspect="1"/>
+              </p:cNvSpPr>
+              <p:nvPr/>
+            </p:nvSpPr>
+            <p:spPr>
+              <a:xfrm>
+                <a:off x="19082678" y="18936701"/>
+                <a:ext cx="4078800" cy="4078800"/>
+              </a:xfrm>
+              <a:prstGeom prst="rect">
+                <a:avLst/>
+              </a:prstGeom>
+              <a:solidFill>
+                <a:schemeClr val="bg1"/>
+              </a:solidFill>
+              <a:ln>
+                <a:noFill/>
+              </a:ln>
+            </p:spPr>
+            <p:style>
+              <a:lnRef idx="2">
+                <a:schemeClr val="accent1">
+                  <a:shade val="50000"/>
+                </a:schemeClr>
+              </a:lnRef>
+              <a:fillRef idx="1">
+                <a:schemeClr val="accent1"/>
+              </a:fillRef>
+              <a:effectRef idx="0">
+                <a:schemeClr val="accent1"/>
+              </a:effectRef>
+              <a:fontRef idx="minor">
+                <a:schemeClr val="lt1"/>
+              </a:fontRef>
+            </p:style>
+            <p:txBody>
+              <a:bodyPr rtlCol="0" anchor="ctr"/>
+              <a:lstStyle/>
+              <a:p>
+                <a:pPr algn="ctr"/>
+                <a:endParaRPr lang="en-US"/>
+              </a:p>
+            </p:txBody>
+          </p:sp>
+          <p:pic>
+            <p:nvPicPr>
+              <p:cNvPr id="34" name="그림 33">
+                <a:extLst>
+                  <a:ext uri="{FF2B5EF4-FFF2-40B4-BE49-F238E27FC236}">
+                    <a16:creationId xmlns:a16="http://schemas.microsoft.com/office/drawing/2014/main" id="{22FF71AD-2F84-4A1A-8054-6A6DDF84BBE1}"/>
+                  </a:ext>
+                </a:extLst>
+              </p:cNvPr>
+              <p:cNvPicPr>
+                <a:picLocks noChangeAspect="1"/>
+              </p:cNvPicPr>
+              <p:nvPr/>
+            </p:nvPicPr>
+            <p:blipFill>
+              <a:blip r:embed="rId6">
+                <a:extLst>
+                  <a:ext uri="{28A0092B-C50C-407E-A947-70E740481C1C}">
+                    <a14:useLocalDpi xmlns:a14="http://schemas.microsoft.com/office/drawing/2010/main" val="0"/>
+                  </a:ext>
+                </a:extLst>
+              </a:blip>
+              <a:stretch>
+                <a:fillRect/>
+              </a:stretch>
+            </p:blipFill>
+            <p:spPr>
+              <a:xfrm>
+                <a:off x="19592078" y="19446101"/>
+                <a:ext cx="3060000" cy="3060000"/>
+              </a:xfrm>
+              <a:prstGeom prst="rect">
+                <a:avLst/>
+              </a:prstGeom>
+            </p:spPr>
+          </p:pic>
+        </p:grpSp>
+        <p:grpSp>
+          <p:nvGrpSpPr>
+            <p:cNvPr id="30" name="그룹 29">
+              <a:extLst>
+                <a:ext uri="{FF2B5EF4-FFF2-40B4-BE49-F238E27FC236}">
+                  <a16:creationId xmlns:a16="http://schemas.microsoft.com/office/drawing/2014/main" id="{48C31A3C-77BA-4E3D-B5C6-E2AEE14D7F87}"/>
+                </a:ext>
+              </a:extLst>
+            </p:cNvPr>
+            <p:cNvGrpSpPr>
+              <a:grpSpLocks noChangeAspect="1"/>
+            </p:cNvGrpSpPr>
+            <p:nvPr/>
+          </p:nvGrpSpPr>
+          <p:grpSpPr>
+            <a:xfrm>
+              <a:off x="13741518" y="18306319"/>
+              <a:ext cx="1555200" cy="1555200"/>
+              <a:chOff x="26644062" y="18487410"/>
+              <a:chExt cx="1555200" cy="1555200"/>
+            </a:xfrm>
+          </p:grpSpPr>
+          <p:sp>
+            <p:nvSpPr>
+              <p:cNvPr id="31" name="직사각형 30">
+                <a:extLst>
+                  <a:ext uri="{FF2B5EF4-FFF2-40B4-BE49-F238E27FC236}">
+                    <a16:creationId xmlns:a16="http://schemas.microsoft.com/office/drawing/2014/main" id="{7FA2CC86-19B8-49E2-B814-02739E68047D}"/>
+                  </a:ext>
+                </a:extLst>
+              </p:cNvPr>
+              <p:cNvSpPr>
+                <a:spLocks noChangeAspect="1"/>
+              </p:cNvSpPr>
+              <p:nvPr/>
+            </p:nvSpPr>
+            <p:spPr>
+              <a:xfrm>
+                <a:off x="26644062" y="18487410"/>
+                <a:ext cx="1555200" cy="1555200"/>
+              </a:xfrm>
+              <a:prstGeom prst="rect">
+                <a:avLst/>
+              </a:prstGeom>
+              <a:solidFill>
+                <a:schemeClr val="bg1"/>
+              </a:solidFill>
+              <a:ln>
+                <a:noFill/>
+              </a:ln>
+            </p:spPr>
+            <p:style>
+              <a:lnRef idx="2">
+                <a:schemeClr val="accent1">
+                  <a:shade val="50000"/>
+                </a:schemeClr>
+              </a:lnRef>
+              <a:fillRef idx="1">
+                <a:schemeClr val="accent1"/>
+              </a:fillRef>
+              <a:effectRef idx="0">
+                <a:schemeClr val="accent1"/>
+              </a:effectRef>
+              <a:fontRef idx="minor">
+                <a:schemeClr val="lt1"/>
+              </a:fontRef>
+            </p:style>
+            <p:txBody>
+              <a:bodyPr rtlCol="0" anchor="ctr"/>
+              <a:lstStyle/>
+              <a:p>
+                <a:pPr algn="ctr"/>
+                <a:endParaRPr lang="en-US"/>
+              </a:p>
+            </p:txBody>
+          </p:sp>
+          <p:pic>
+            <p:nvPicPr>
+              <p:cNvPr id="32" name="그림 31">
+                <a:extLst>
+                  <a:ext uri="{FF2B5EF4-FFF2-40B4-BE49-F238E27FC236}">
+                    <a16:creationId xmlns:a16="http://schemas.microsoft.com/office/drawing/2014/main" id="{E688D5BE-69FC-4EC4-891E-007A73005535}"/>
+                  </a:ext>
+                </a:extLst>
+              </p:cNvPr>
+              <p:cNvPicPr>
+                <a:picLocks noChangeAspect="1"/>
+              </p:cNvPicPr>
+              <p:nvPr/>
+            </p:nvPicPr>
+            <p:blipFill>
+              <a:blip r:embed="rId7">
+                <a:extLst>
+                  <a:ext uri="{28A0092B-C50C-407E-A947-70E740481C1C}">
+                    <a14:useLocalDpi xmlns:a14="http://schemas.microsoft.com/office/drawing/2010/main" val="0"/>
+                  </a:ext>
+                </a:extLst>
+              </a:blip>
+              <a:stretch>
+                <a:fillRect/>
+              </a:stretch>
+            </p:blipFill>
+            <p:spPr>
+              <a:xfrm>
+                <a:off x="26838462" y="18681810"/>
+                <a:ext cx="1166400" cy="1166400"/>
+              </a:xfrm>
+              <a:prstGeom prst="rect">
+                <a:avLst/>
+              </a:prstGeom>
+            </p:spPr>
+          </p:pic>
+        </p:grpSp>
+      </p:grpSp>
+      <p:pic>
+        <p:nvPicPr>
+          <p:cNvPr id="6" name="그림 5">
+            <a:extLst>
+              <a:ext uri="{FF2B5EF4-FFF2-40B4-BE49-F238E27FC236}">
+                <a16:creationId xmlns:a16="http://schemas.microsoft.com/office/drawing/2014/main" id="{EC4D0D03-7A9D-4074-B66A-F31FAB37EEEE}"/>
+              </a:ext>
+            </a:extLst>
+          </p:cNvPr>
+          <p:cNvPicPr>
+            <a:picLocks noChangeAspect="1"/>
+          </p:cNvPicPr>
+          <p:nvPr/>
+        </p:nvPicPr>
+        <p:blipFill>
+          <a:blip r:embed="rId8"/>
+          <a:stretch>
+            <a:fillRect/>
+          </a:stretch>
+        </p:blipFill>
+        <p:spPr>
+          <a:xfrm>
+            <a:off x="19661882" y="7358747"/>
+            <a:ext cx="34560000" cy="55926615"/>
+          </a:xfrm>
+          <a:prstGeom prst="rect">
+            <a:avLst/>
+          </a:prstGeom>
+        </p:spPr>
+      </p:pic>
     </p:spTree>
     <p:extLst>
       <p:ext uri="{BB962C8B-B14F-4D97-AF65-F5344CB8AC3E}">
@@ -16011,278 +16860,6 @@
       </p:sp>
       <p:sp>
         <p:nvSpPr>
-          <p:cNvPr id="35" name="직사각형 34">
-            <a:extLst>
-              <a:ext uri="{FF2B5EF4-FFF2-40B4-BE49-F238E27FC236}">
-                <a16:creationId xmlns:a16="http://schemas.microsoft.com/office/drawing/2014/main" id="{81CA3AAD-3460-49F7-A92F-1DB8E33C8797}"/>
-              </a:ext>
-            </a:extLst>
-          </p:cNvPr>
-          <p:cNvSpPr>
-            <a:spLocks noChangeAspect="1"/>
-          </p:cNvSpPr>
-          <p:nvPr/>
-        </p:nvSpPr>
-        <p:spPr>
-          <a:xfrm>
-            <a:off x="3060319" y="5105119"/>
-            <a:ext cx="17280000" cy="34560000"/>
-          </a:xfrm>
-          <a:prstGeom prst="rect">
-            <a:avLst/>
-          </a:prstGeom>
-          <a:solidFill>
-            <a:schemeClr val="bg1"/>
-          </a:solidFill>
-          <a:ln>
-            <a:solidFill>
-              <a:schemeClr val="tx1"/>
-            </a:solidFill>
-          </a:ln>
-        </p:spPr>
-        <p:style>
-          <a:lnRef idx="2">
-            <a:schemeClr val="accent1">
-              <a:shade val="50000"/>
-            </a:schemeClr>
-          </a:lnRef>
-          <a:fillRef idx="1">
-            <a:schemeClr val="accent1"/>
-          </a:fillRef>
-          <a:effectRef idx="0">
-            <a:schemeClr val="accent1"/>
-          </a:effectRef>
-          <a:fontRef idx="minor">
-            <a:schemeClr val="lt1"/>
-          </a:fontRef>
-        </p:style>
-        <p:txBody>
-          <a:bodyPr rtlCol="0" anchor="ctr"/>
-          <a:lstStyle/>
-          <a:p>
-            <a:pPr algn="ctr"/>
-            <a:endParaRPr lang="en-US"/>
-          </a:p>
-        </p:txBody>
-      </p:sp>
-      <p:pic>
-        <p:nvPicPr>
-          <p:cNvPr id="70" name="그림 69">
-            <a:extLst>
-              <a:ext uri="{FF2B5EF4-FFF2-40B4-BE49-F238E27FC236}">
-                <a16:creationId xmlns:a16="http://schemas.microsoft.com/office/drawing/2014/main" id="{63D36E5B-9B69-412A-B6EC-7C71F3A9A53A}"/>
-              </a:ext>
-            </a:extLst>
-          </p:cNvPr>
-          <p:cNvPicPr>
-            <a:picLocks noChangeAspect="1"/>
-          </p:cNvPicPr>
-          <p:nvPr/>
-        </p:nvPicPr>
-        <p:blipFill>
-          <a:blip r:embed="rId2">
-            <a:extLst>
-              <a:ext uri="{28A0092B-C50C-407E-A947-70E740481C1C}">
-                <a14:useLocalDpi xmlns:a14="http://schemas.microsoft.com/office/drawing/2010/main" val="0"/>
-              </a:ext>
-            </a:extLst>
-          </a:blip>
-          <a:stretch>
-            <a:fillRect/>
-          </a:stretch>
-        </p:blipFill>
-        <p:spPr>
-          <a:xfrm>
-            <a:off x="13741518" y="18306319"/>
-            <a:ext cx="1555200" cy="1555200"/>
-          </a:xfrm>
-          <a:prstGeom prst="rect">
-            <a:avLst/>
-          </a:prstGeom>
-        </p:spPr>
-      </p:pic>
-      <p:pic>
-        <p:nvPicPr>
-          <p:cNvPr id="67" name="그림 66">
-            <a:extLst>
-              <a:ext uri="{FF2B5EF4-FFF2-40B4-BE49-F238E27FC236}">
-                <a16:creationId xmlns:a16="http://schemas.microsoft.com/office/drawing/2014/main" id="{62884EFD-2A2F-44DA-992B-0E0B6AD5EE3E}"/>
-              </a:ext>
-            </a:extLst>
-          </p:cNvPr>
-          <p:cNvPicPr>
-            <a:picLocks noChangeAspect="1"/>
-          </p:cNvPicPr>
-          <p:nvPr/>
-        </p:nvPicPr>
-        <p:blipFill>
-          <a:blip r:embed="rId3">
-            <a:extLst>
-              <a:ext uri="{28A0092B-C50C-407E-A947-70E740481C1C}">
-                <a14:useLocalDpi xmlns:a14="http://schemas.microsoft.com/office/drawing/2010/main" val="0"/>
-              </a:ext>
-            </a:extLst>
-          </a:blip>
-          <a:stretch>
-            <a:fillRect/>
-          </a:stretch>
-        </p:blipFill>
-        <p:spPr>
-          <a:xfrm>
-            <a:off x="16261519" y="18306319"/>
-            <a:ext cx="4078800" cy="4078800"/>
-          </a:xfrm>
-          <a:prstGeom prst="rect">
-            <a:avLst/>
-          </a:prstGeom>
-        </p:spPr>
-      </p:pic>
-      <p:pic>
-        <p:nvPicPr>
-          <p:cNvPr id="4" name="그림 3">
-            <a:extLst>
-              <a:ext uri="{FF2B5EF4-FFF2-40B4-BE49-F238E27FC236}">
-                <a16:creationId xmlns:a16="http://schemas.microsoft.com/office/drawing/2014/main" id="{296ABC12-9FCB-4B3B-82AE-A9528735FC40}"/>
-              </a:ext>
-            </a:extLst>
-          </p:cNvPr>
-          <p:cNvPicPr>
-            <a:picLocks noChangeAspect="1"/>
-          </p:cNvPicPr>
-          <p:nvPr/>
-        </p:nvPicPr>
-        <p:blipFill>
-          <a:blip r:embed="rId4">
-            <a:extLst>
-              <a:ext uri="{28A0092B-C50C-407E-A947-70E740481C1C}">
-                <a14:useLocalDpi xmlns:a14="http://schemas.microsoft.com/office/drawing/2010/main" val="0"/>
-              </a:ext>
-            </a:extLst>
-          </a:blip>
-          <a:stretch>
-            <a:fillRect/>
-          </a:stretch>
-        </p:blipFill>
-        <p:spPr>
-          <a:xfrm>
-            <a:off x="3060319" y="22385119"/>
-            <a:ext cx="17280000" cy="17280000"/>
-          </a:xfrm>
-          <a:prstGeom prst="rect">
-            <a:avLst/>
-          </a:prstGeom>
-        </p:spPr>
-      </p:pic>
-      <p:pic>
-        <p:nvPicPr>
-          <p:cNvPr id="73" name="그림 72">
-            <a:extLst>
-              <a:ext uri="{FF2B5EF4-FFF2-40B4-BE49-F238E27FC236}">
-                <a16:creationId xmlns:a16="http://schemas.microsoft.com/office/drawing/2014/main" id="{52CFFC47-F443-4E9B-9D08-9481C553B9E8}"/>
-              </a:ext>
-            </a:extLst>
-          </p:cNvPr>
-          <p:cNvPicPr>
-            <a:picLocks noChangeAspect="1"/>
-          </p:cNvPicPr>
-          <p:nvPr/>
-        </p:nvPicPr>
-        <p:blipFill>
-          <a:blip r:embed="rId5">
-            <a:extLst>
-              <a:ext uri="{28A0092B-C50C-407E-A947-70E740481C1C}">
-                <a14:useLocalDpi xmlns:a14="http://schemas.microsoft.com/office/drawing/2010/main" val="0"/>
-              </a:ext>
-            </a:extLst>
-          </a:blip>
-          <a:stretch>
-            <a:fillRect/>
-          </a:stretch>
-        </p:blipFill>
-        <p:spPr>
-          <a:xfrm>
-            <a:off x="3060319" y="11703919"/>
-            <a:ext cx="10681200" cy="10681200"/>
-          </a:xfrm>
-          <a:prstGeom prst="rect">
-            <a:avLst/>
-          </a:prstGeom>
-        </p:spPr>
-      </p:pic>
-      <p:pic>
-        <p:nvPicPr>
-          <p:cNvPr id="74" name="그림 73">
-            <a:extLst>
-              <a:ext uri="{FF2B5EF4-FFF2-40B4-BE49-F238E27FC236}">
-                <a16:creationId xmlns:a16="http://schemas.microsoft.com/office/drawing/2014/main" id="{54A06517-BA3A-463D-ADF4-A62955988D78}"/>
-              </a:ext>
-            </a:extLst>
-          </p:cNvPr>
-          <p:cNvPicPr>
-            <a:picLocks noChangeAspect="1"/>
-          </p:cNvPicPr>
-          <p:nvPr/>
-        </p:nvPicPr>
-        <p:blipFill>
-          <a:blip r:embed="rId6">
-            <a:extLst>
-              <a:ext uri="{28A0092B-C50C-407E-A947-70E740481C1C}">
-                <a14:useLocalDpi xmlns:a14="http://schemas.microsoft.com/office/drawing/2010/main" val="0"/>
-              </a:ext>
-            </a:extLst>
-          </a:blip>
-          <a:stretch>
-            <a:fillRect/>
-          </a:stretch>
-        </p:blipFill>
-        <p:spPr>
-          <a:xfrm>
-            <a:off x="13741518" y="11703919"/>
-            <a:ext cx="6598800" cy="6598800"/>
-          </a:xfrm>
-          <a:prstGeom prst="rect">
-            <a:avLst/>
-          </a:prstGeom>
-        </p:spPr>
-      </p:pic>
-      <p:pic>
-        <p:nvPicPr>
-          <p:cNvPr id="69" name="그림 68">
-            <a:extLst>
-              <a:ext uri="{FF2B5EF4-FFF2-40B4-BE49-F238E27FC236}">
-                <a16:creationId xmlns:a16="http://schemas.microsoft.com/office/drawing/2014/main" id="{106536BE-4FC3-4E59-9CC6-842EFA8F5A8D}"/>
-              </a:ext>
-            </a:extLst>
-          </p:cNvPr>
-          <p:cNvPicPr>
-            <a:picLocks noChangeAspect="1"/>
-          </p:cNvPicPr>
-          <p:nvPr/>
-        </p:nvPicPr>
-        <p:blipFill>
-          <a:blip r:embed="rId7">
-            <a:extLst>
-              <a:ext uri="{28A0092B-C50C-407E-A947-70E740481C1C}">
-                <a14:useLocalDpi xmlns:a14="http://schemas.microsoft.com/office/drawing/2010/main" val="0"/>
-              </a:ext>
-            </a:extLst>
-          </a:blip>
-          <a:stretch>
-            <a:fillRect/>
-          </a:stretch>
-        </p:blipFill>
-        <p:spPr>
-          <a:xfrm>
-            <a:off x="13741520" y="19865119"/>
-            <a:ext cx="2520000" cy="2520000"/>
-          </a:xfrm>
-          <a:prstGeom prst="rect">
-            <a:avLst/>
-          </a:prstGeom>
-        </p:spPr>
-      </p:pic>
-      <p:sp>
-        <p:nvSpPr>
           <p:cNvPr id="113" name="직사각형 112">
             <a:extLst>
               <a:ext uri="{FF2B5EF4-FFF2-40B4-BE49-F238E27FC236}">
@@ -16827,6 +17404,2371 @@
           </a:p>
         </p:txBody>
       </p:sp>
+      <p:sp>
+        <p:nvSpPr>
+          <p:cNvPr id="23" name="직사각형 22">
+            <a:extLst>
+              <a:ext uri="{FF2B5EF4-FFF2-40B4-BE49-F238E27FC236}">
+                <a16:creationId xmlns:a16="http://schemas.microsoft.com/office/drawing/2014/main" id="{00BF5103-85C3-4144-8856-FD74CF63E5F7}"/>
+              </a:ext>
+            </a:extLst>
+          </p:cNvPr>
+          <p:cNvSpPr>
+            <a:spLocks noChangeAspect="1"/>
+          </p:cNvSpPr>
+          <p:nvPr/>
+        </p:nvSpPr>
+        <p:spPr>
+          <a:xfrm>
+            <a:off x="44832604" y="26453639"/>
+            <a:ext cx="17280000" cy="17280000"/>
+          </a:xfrm>
+          <a:prstGeom prst="rect">
+            <a:avLst/>
+          </a:prstGeom>
+          <a:solidFill>
+            <a:schemeClr val="bg1"/>
+          </a:solidFill>
+          <a:ln>
+            <a:solidFill>
+              <a:schemeClr val="tx1"/>
+            </a:solidFill>
+          </a:ln>
+        </p:spPr>
+        <p:style>
+          <a:lnRef idx="2">
+            <a:schemeClr val="accent1">
+              <a:shade val="50000"/>
+            </a:schemeClr>
+          </a:lnRef>
+          <a:fillRef idx="1">
+            <a:schemeClr val="accent1"/>
+          </a:fillRef>
+          <a:effectRef idx="0">
+            <a:schemeClr val="accent1"/>
+          </a:effectRef>
+          <a:fontRef idx="minor">
+            <a:schemeClr val="lt1"/>
+          </a:fontRef>
+        </p:style>
+        <p:txBody>
+          <a:bodyPr rtlCol="0" anchor="ctr" anchorCtr="1"/>
+          <a:lstStyle/>
+          <a:p>
+            <a:pPr algn="ctr"/>
+            <a:r>
+              <a:rPr lang="en-US" sz="9600" dirty="0">
+                <a:solidFill>
+                  <a:schemeClr val="tx1"/>
+                </a:solidFill>
+                <a:latin typeface="Arial" panose="020B0604020202020204" pitchFamily="34" charset="0"/>
+                <a:ea typeface="맑은 고딕" panose="020B0503020000020004" pitchFamily="50" charset="-127"/>
+              </a:rPr>
+              <a:t>0</a:t>
+            </a:r>
+          </a:p>
+        </p:txBody>
+      </p:sp>
+      <p:sp>
+        <p:nvSpPr>
+          <p:cNvPr id="24" name="직사각형 23">
+            <a:extLst>
+              <a:ext uri="{FF2B5EF4-FFF2-40B4-BE49-F238E27FC236}">
+                <a16:creationId xmlns:a16="http://schemas.microsoft.com/office/drawing/2014/main" id="{3D0F1C87-764B-411F-AF85-FD7E1DB4CE5D}"/>
+              </a:ext>
+            </a:extLst>
+          </p:cNvPr>
+          <p:cNvSpPr>
+            <a:spLocks noChangeAspect="1"/>
+          </p:cNvSpPr>
+          <p:nvPr/>
+        </p:nvSpPr>
+        <p:spPr>
+          <a:xfrm>
+            <a:off x="48132004" y="15772439"/>
+            <a:ext cx="10681200" cy="10681200"/>
+          </a:xfrm>
+          <a:prstGeom prst="rect">
+            <a:avLst/>
+          </a:prstGeom>
+          <a:solidFill>
+            <a:schemeClr val="bg1"/>
+          </a:solidFill>
+          <a:ln>
+            <a:solidFill>
+              <a:schemeClr val="tx1"/>
+            </a:solidFill>
+          </a:ln>
+        </p:spPr>
+        <p:style>
+          <a:lnRef idx="2">
+            <a:schemeClr val="accent1">
+              <a:shade val="50000"/>
+            </a:schemeClr>
+          </a:lnRef>
+          <a:fillRef idx="1">
+            <a:schemeClr val="accent1"/>
+          </a:fillRef>
+          <a:effectRef idx="0">
+            <a:schemeClr val="accent1"/>
+          </a:effectRef>
+          <a:fontRef idx="minor">
+            <a:schemeClr val="lt1"/>
+          </a:fontRef>
+        </p:style>
+        <p:txBody>
+          <a:bodyPr rtlCol="0" anchor="ctr" anchorCtr="1"/>
+          <a:lstStyle/>
+          <a:p>
+            <a:pPr algn="ctr"/>
+            <a:r>
+              <a:rPr lang="en-US" sz="9600" dirty="0">
+                <a:solidFill>
+                  <a:schemeClr val="tx1"/>
+                </a:solidFill>
+                <a:latin typeface="Arial" panose="020B0604020202020204" pitchFamily="34" charset="0"/>
+                <a:ea typeface="맑은 고딕" panose="020B0503020000020004" pitchFamily="50" charset="-127"/>
+              </a:rPr>
+              <a:t>1</a:t>
+            </a:r>
+          </a:p>
+        </p:txBody>
+      </p:sp>
+      <p:sp>
+        <p:nvSpPr>
+          <p:cNvPr id="26" name="직사각형 25">
+            <a:extLst>
+              <a:ext uri="{FF2B5EF4-FFF2-40B4-BE49-F238E27FC236}">
+                <a16:creationId xmlns:a16="http://schemas.microsoft.com/office/drawing/2014/main" id="{0FEC8E5A-8B2C-4567-9C04-6F1828547A79}"/>
+              </a:ext>
+            </a:extLst>
+          </p:cNvPr>
+          <p:cNvSpPr>
+            <a:spLocks noChangeAspect="1"/>
+          </p:cNvSpPr>
+          <p:nvPr/>
+        </p:nvSpPr>
+        <p:spPr>
+          <a:xfrm>
+            <a:off x="50173204" y="9173639"/>
+            <a:ext cx="6598800" cy="6598800"/>
+          </a:xfrm>
+          <a:prstGeom prst="rect">
+            <a:avLst/>
+          </a:prstGeom>
+          <a:solidFill>
+            <a:schemeClr val="bg1"/>
+          </a:solidFill>
+          <a:ln>
+            <a:solidFill>
+              <a:schemeClr val="tx1"/>
+            </a:solidFill>
+          </a:ln>
+        </p:spPr>
+        <p:style>
+          <a:lnRef idx="2">
+            <a:schemeClr val="accent1">
+              <a:shade val="50000"/>
+            </a:schemeClr>
+          </a:lnRef>
+          <a:fillRef idx="1">
+            <a:schemeClr val="accent1"/>
+          </a:fillRef>
+          <a:effectRef idx="0">
+            <a:schemeClr val="accent1"/>
+          </a:effectRef>
+          <a:fontRef idx="minor">
+            <a:schemeClr val="lt1"/>
+          </a:fontRef>
+        </p:style>
+        <p:txBody>
+          <a:bodyPr rtlCol="0" anchor="ctr" anchorCtr="1"/>
+          <a:lstStyle/>
+          <a:p>
+            <a:pPr algn="ctr"/>
+            <a:r>
+              <a:rPr lang="en-US" sz="9600" dirty="0">
+                <a:solidFill>
+                  <a:schemeClr val="tx1"/>
+                </a:solidFill>
+                <a:latin typeface="Arial" panose="020B0604020202020204" pitchFamily="34" charset="0"/>
+                <a:ea typeface="맑은 고딕" panose="020B0503020000020004" pitchFamily="50" charset="-127"/>
+              </a:rPr>
+              <a:t>2</a:t>
+            </a:r>
+          </a:p>
+        </p:txBody>
+      </p:sp>
+      <p:sp>
+        <p:nvSpPr>
+          <p:cNvPr id="27" name="직사각형 26">
+            <a:extLst>
+              <a:ext uri="{FF2B5EF4-FFF2-40B4-BE49-F238E27FC236}">
+                <a16:creationId xmlns:a16="http://schemas.microsoft.com/office/drawing/2014/main" id="{2C239DA9-5862-4AFC-AFE9-89DC72BA1917}"/>
+              </a:ext>
+            </a:extLst>
+          </p:cNvPr>
+          <p:cNvSpPr>
+            <a:spLocks noChangeAspect="1"/>
+          </p:cNvSpPr>
+          <p:nvPr/>
+        </p:nvSpPr>
+        <p:spPr>
+          <a:xfrm>
+            <a:off x="51433204" y="5105119"/>
+            <a:ext cx="4078800" cy="4078800"/>
+          </a:xfrm>
+          <a:prstGeom prst="rect">
+            <a:avLst/>
+          </a:prstGeom>
+          <a:solidFill>
+            <a:schemeClr val="bg1"/>
+          </a:solidFill>
+          <a:ln>
+            <a:solidFill>
+              <a:schemeClr val="tx1"/>
+            </a:solidFill>
+          </a:ln>
+        </p:spPr>
+        <p:style>
+          <a:lnRef idx="2">
+            <a:schemeClr val="accent1">
+              <a:shade val="50000"/>
+            </a:schemeClr>
+          </a:lnRef>
+          <a:fillRef idx="1">
+            <a:schemeClr val="accent1"/>
+          </a:fillRef>
+          <a:effectRef idx="0">
+            <a:schemeClr val="accent1"/>
+          </a:effectRef>
+          <a:fontRef idx="minor">
+            <a:schemeClr val="lt1"/>
+          </a:fontRef>
+        </p:style>
+        <p:txBody>
+          <a:bodyPr rtlCol="0" anchor="ctr" anchorCtr="1"/>
+          <a:lstStyle/>
+          <a:p>
+            <a:pPr algn="ctr"/>
+            <a:r>
+              <a:rPr lang="en-US" sz="9600" dirty="0">
+                <a:solidFill>
+                  <a:schemeClr val="tx1"/>
+                </a:solidFill>
+                <a:latin typeface="Arial" panose="020B0604020202020204" pitchFamily="34" charset="0"/>
+                <a:ea typeface="맑은 고딕" panose="020B0503020000020004" pitchFamily="50" charset="-127"/>
+              </a:rPr>
+              <a:t>3</a:t>
+            </a:r>
+          </a:p>
+        </p:txBody>
+      </p:sp>
+      <p:sp>
+        <p:nvSpPr>
+          <p:cNvPr id="28" name="직사각형 27">
+            <a:extLst>
+              <a:ext uri="{FF2B5EF4-FFF2-40B4-BE49-F238E27FC236}">
+                <a16:creationId xmlns:a16="http://schemas.microsoft.com/office/drawing/2014/main" id="{DB71A083-1FE3-4B38-B4BE-9C6CD6409ACA}"/>
+              </a:ext>
+            </a:extLst>
+          </p:cNvPr>
+          <p:cNvSpPr>
+            <a:spLocks noChangeAspect="1"/>
+          </p:cNvSpPr>
+          <p:nvPr/>
+        </p:nvSpPr>
+        <p:spPr>
+          <a:xfrm>
+            <a:off x="52212604" y="2602930"/>
+            <a:ext cx="2520000" cy="2520000"/>
+          </a:xfrm>
+          <a:prstGeom prst="rect">
+            <a:avLst/>
+          </a:prstGeom>
+          <a:solidFill>
+            <a:schemeClr val="bg1"/>
+          </a:solidFill>
+          <a:ln>
+            <a:solidFill>
+              <a:schemeClr val="tx1"/>
+            </a:solidFill>
+          </a:ln>
+        </p:spPr>
+        <p:style>
+          <a:lnRef idx="2">
+            <a:schemeClr val="accent1">
+              <a:shade val="50000"/>
+            </a:schemeClr>
+          </a:lnRef>
+          <a:fillRef idx="1">
+            <a:schemeClr val="accent1"/>
+          </a:fillRef>
+          <a:effectRef idx="0">
+            <a:schemeClr val="accent1"/>
+          </a:effectRef>
+          <a:fontRef idx="minor">
+            <a:schemeClr val="lt1"/>
+          </a:fontRef>
+        </p:style>
+        <p:txBody>
+          <a:bodyPr rtlCol="0" anchor="ctr" anchorCtr="1"/>
+          <a:lstStyle/>
+          <a:p>
+            <a:pPr algn="ctr"/>
+            <a:r>
+              <a:rPr lang="en-US" sz="9600" dirty="0">
+                <a:solidFill>
+                  <a:schemeClr val="tx1"/>
+                </a:solidFill>
+                <a:latin typeface="Arial" panose="020B0604020202020204" pitchFamily="34" charset="0"/>
+                <a:ea typeface="맑은 고딕" panose="020B0503020000020004" pitchFamily="50" charset="-127"/>
+              </a:rPr>
+              <a:t>4</a:t>
+            </a:r>
+          </a:p>
+        </p:txBody>
+      </p:sp>
+      <p:sp>
+        <p:nvSpPr>
+          <p:cNvPr id="29" name="직사각형 28">
+            <a:extLst>
+              <a:ext uri="{FF2B5EF4-FFF2-40B4-BE49-F238E27FC236}">
+                <a16:creationId xmlns:a16="http://schemas.microsoft.com/office/drawing/2014/main" id="{E5991CE1-C06A-4C4E-A069-003DA518E183}"/>
+              </a:ext>
+            </a:extLst>
+          </p:cNvPr>
+          <p:cNvSpPr>
+            <a:spLocks noChangeAspect="1"/>
+          </p:cNvSpPr>
+          <p:nvPr/>
+        </p:nvSpPr>
+        <p:spPr>
+          <a:xfrm>
+            <a:off x="52695004" y="1005759"/>
+            <a:ext cx="1555200" cy="1555200"/>
+          </a:xfrm>
+          <a:prstGeom prst="rect">
+            <a:avLst/>
+          </a:prstGeom>
+          <a:solidFill>
+            <a:schemeClr val="bg1"/>
+          </a:solidFill>
+          <a:ln>
+            <a:solidFill>
+              <a:schemeClr val="tx1"/>
+            </a:solidFill>
+          </a:ln>
+        </p:spPr>
+        <p:style>
+          <a:lnRef idx="2">
+            <a:schemeClr val="accent1">
+              <a:shade val="50000"/>
+            </a:schemeClr>
+          </a:lnRef>
+          <a:fillRef idx="1">
+            <a:schemeClr val="accent1"/>
+          </a:fillRef>
+          <a:effectRef idx="0">
+            <a:schemeClr val="accent1"/>
+          </a:effectRef>
+          <a:fontRef idx="minor">
+            <a:schemeClr val="lt1"/>
+          </a:fontRef>
+        </p:style>
+        <p:txBody>
+          <a:bodyPr rtlCol="0" anchor="ctr" anchorCtr="1"/>
+          <a:lstStyle/>
+          <a:p>
+            <a:pPr algn="ctr"/>
+            <a:r>
+              <a:rPr lang="en-US" sz="9600" dirty="0">
+                <a:solidFill>
+                  <a:schemeClr val="tx1"/>
+                </a:solidFill>
+                <a:latin typeface="Arial" panose="020B0604020202020204" pitchFamily="34" charset="0"/>
+                <a:ea typeface="맑은 고딕" panose="020B0503020000020004" pitchFamily="50" charset="-127"/>
+              </a:rPr>
+              <a:t>5</a:t>
+            </a:r>
+          </a:p>
+        </p:txBody>
+      </p:sp>
+      <p:cxnSp>
+        <p:nvCxnSpPr>
+          <p:cNvPr id="30" name="직선 연결선 29">
+            <a:extLst>
+              <a:ext uri="{FF2B5EF4-FFF2-40B4-BE49-F238E27FC236}">
+                <a16:creationId xmlns:a16="http://schemas.microsoft.com/office/drawing/2014/main" id="{B1FCCB34-AE40-4FE7-8C90-F8B5A9A2D552}"/>
+              </a:ext>
+            </a:extLst>
+          </p:cNvPr>
+          <p:cNvCxnSpPr>
+            <a:cxnSpLocks/>
+          </p:cNvCxnSpPr>
+          <p:nvPr/>
+        </p:nvCxnSpPr>
+        <p:spPr>
+          <a:xfrm>
+            <a:off x="63338993" y="26453639"/>
+            <a:ext cx="0" cy="17280000"/>
+          </a:xfrm>
+          <a:prstGeom prst="line">
+            <a:avLst/>
+          </a:prstGeom>
+        </p:spPr>
+        <p:style>
+          <a:lnRef idx="1">
+            <a:schemeClr val="accent1"/>
+          </a:lnRef>
+          <a:fillRef idx="0">
+            <a:schemeClr val="accent1"/>
+          </a:fillRef>
+          <a:effectRef idx="0">
+            <a:schemeClr val="accent1"/>
+          </a:effectRef>
+          <a:fontRef idx="minor">
+            <a:schemeClr val="tx1"/>
+          </a:fontRef>
+        </p:style>
+      </p:cxnSp>
+      <p:sp>
+        <p:nvSpPr>
+          <p:cNvPr id="31" name="TextBox 30">
+            <a:extLst>
+              <a:ext uri="{FF2B5EF4-FFF2-40B4-BE49-F238E27FC236}">
+                <a16:creationId xmlns:a16="http://schemas.microsoft.com/office/drawing/2014/main" id="{05F3ACBD-E727-4049-8BDD-758D634209AF}"/>
+              </a:ext>
+            </a:extLst>
+          </p:cNvPr>
+          <p:cNvSpPr txBox="1">
+            <a:spLocks noChangeAspect="1"/>
+          </p:cNvSpPr>
+          <p:nvPr/>
+        </p:nvSpPr>
+        <p:spPr>
+          <a:xfrm>
+            <a:off x="64307181" y="34493475"/>
+            <a:ext cx="4378160" cy="1200329"/>
+          </a:xfrm>
+          <a:prstGeom prst="rect">
+            <a:avLst/>
+          </a:prstGeom>
+          <a:noFill/>
+        </p:spPr>
+        <p:txBody>
+          <a:bodyPr wrap="square" rtlCol="0" anchor="ctr" anchorCtr="1">
+            <a:spAutoFit/>
+          </a:bodyPr>
+          <a:lstStyle/>
+          <a:p>
+            <a:pPr algn="ctr"/>
+            <a:r>
+              <a:rPr lang="en-US" sz="7200" dirty="0">
+                <a:latin typeface="Arial" panose="020B0604020202020204" pitchFamily="34" charset="0"/>
+              </a:rPr>
+              <a:t>48 cm</a:t>
+            </a:r>
+          </a:p>
+        </p:txBody>
+      </p:sp>
+      <p:cxnSp>
+        <p:nvCxnSpPr>
+          <p:cNvPr id="32" name="직선 연결선 31">
+            <a:extLst>
+              <a:ext uri="{FF2B5EF4-FFF2-40B4-BE49-F238E27FC236}">
+                <a16:creationId xmlns:a16="http://schemas.microsoft.com/office/drawing/2014/main" id="{3E5B9544-8576-4B93-9976-F1D566CD3B03}"/>
+              </a:ext>
+            </a:extLst>
+          </p:cNvPr>
+          <p:cNvCxnSpPr>
+            <a:cxnSpLocks/>
+          </p:cNvCxnSpPr>
+          <p:nvPr/>
+        </p:nvCxnSpPr>
+        <p:spPr>
+          <a:xfrm>
+            <a:off x="61120868" y="15772439"/>
+            <a:ext cx="0" cy="10681200"/>
+          </a:xfrm>
+          <a:prstGeom prst="line">
+            <a:avLst/>
+          </a:prstGeom>
+        </p:spPr>
+        <p:style>
+          <a:lnRef idx="1">
+            <a:schemeClr val="accent1"/>
+          </a:lnRef>
+          <a:fillRef idx="0">
+            <a:schemeClr val="accent1"/>
+          </a:fillRef>
+          <a:effectRef idx="0">
+            <a:schemeClr val="accent1"/>
+          </a:effectRef>
+          <a:fontRef idx="minor">
+            <a:schemeClr val="tx1"/>
+          </a:fontRef>
+        </p:style>
+      </p:cxnSp>
+      <p:sp>
+        <p:nvSpPr>
+          <p:cNvPr id="33" name="TextBox 32">
+            <a:extLst>
+              <a:ext uri="{FF2B5EF4-FFF2-40B4-BE49-F238E27FC236}">
+                <a16:creationId xmlns:a16="http://schemas.microsoft.com/office/drawing/2014/main" id="{164B6D3C-D865-4422-873A-00A22EE5F305}"/>
+              </a:ext>
+            </a:extLst>
+          </p:cNvPr>
+          <p:cNvSpPr txBox="1">
+            <a:spLocks noChangeAspect="1"/>
+          </p:cNvSpPr>
+          <p:nvPr/>
+        </p:nvSpPr>
+        <p:spPr>
+          <a:xfrm>
+            <a:off x="62089056" y="20512875"/>
+            <a:ext cx="4378160" cy="1200329"/>
+          </a:xfrm>
+          <a:prstGeom prst="rect">
+            <a:avLst/>
+          </a:prstGeom>
+          <a:noFill/>
+        </p:spPr>
+        <p:txBody>
+          <a:bodyPr wrap="square" rtlCol="0" anchor="ctr" anchorCtr="1">
+            <a:spAutoFit/>
+          </a:bodyPr>
+          <a:lstStyle/>
+          <a:p>
+            <a:pPr algn="ctr"/>
+            <a:r>
+              <a:rPr lang="en-US" sz="7200" dirty="0">
+                <a:latin typeface="Arial" panose="020B0604020202020204" pitchFamily="34" charset="0"/>
+              </a:rPr>
+              <a:t>29.67 cm</a:t>
+            </a:r>
+          </a:p>
+        </p:txBody>
+      </p:sp>
+      <p:grpSp>
+        <p:nvGrpSpPr>
+          <p:cNvPr id="2" name="그룹 1">
+            <a:extLst>
+              <a:ext uri="{FF2B5EF4-FFF2-40B4-BE49-F238E27FC236}">
+                <a16:creationId xmlns:a16="http://schemas.microsoft.com/office/drawing/2014/main" id="{02B02248-F1DC-4D0D-BB09-0CA58CEF7AD8}"/>
+              </a:ext>
+            </a:extLst>
+          </p:cNvPr>
+          <p:cNvGrpSpPr/>
+          <p:nvPr/>
+        </p:nvGrpSpPr>
+        <p:grpSpPr>
+          <a:xfrm>
+            <a:off x="59099578" y="9173639"/>
+            <a:ext cx="5346348" cy="6598800"/>
+            <a:chOff x="61120868" y="9970487"/>
+            <a:chExt cx="5346348" cy="6598800"/>
+          </a:xfrm>
+        </p:grpSpPr>
+        <p:cxnSp>
+          <p:nvCxnSpPr>
+            <p:cNvPr id="36" name="직선 연결선 35">
+              <a:extLst>
+                <a:ext uri="{FF2B5EF4-FFF2-40B4-BE49-F238E27FC236}">
+                  <a16:creationId xmlns:a16="http://schemas.microsoft.com/office/drawing/2014/main" id="{7123A322-9358-481A-A45F-F81ED5AB962D}"/>
+                </a:ext>
+              </a:extLst>
+            </p:cNvPr>
+            <p:cNvCxnSpPr>
+              <a:cxnSpLocks/>
+            </p:cNvCxnSpPr>
+            <p:nvPr/>
+          </p:nvCxnSpPr>
+          <p:spPr>
+            <a:xfrm>
+              <a:off x="61120868" y="9970487"/>
+              <a:ext cx="0" cy="6598800"/>
+            </a:xfrm>
+            <a:prstGeom prst="line">
+              <a:avLst/>
+            </a:prstGeom>
+          </p:spPr>
+          <p:style>
+            <a:lnRef idx="1">
+              <a:schemeClr val="accent1"/>
+            </a:lnRef>
+            <a:fillRef idx="0">
+              <a:schemeClr val="accent1"/>
+            </a:fillRef>
+            <a:effectRef idx="0">
+              <a:schemeClr val="accent1"/>
+            </a:effectRef>
+            <a:fontRef idx="minor">
+              <a:schemeClr val="tx1"/>
+            </a:fontRef>
+          </p:style>
+        </p:cxnSp>
+        <p:sp>
+          <p:nvSpPr>
+            <p:cNvPr id="37" name="TextBox 36">
+              <a:extLst>
+                <a:ext uri="{FF2B5EF4-FFF2-40B4-BE49-F238E27FC236}">
+                  <a16:creationId xmlns:a16="http://schemas.microsoft.com/office/drawing/2014/main" id="{9465A2C8-65CF-4996-9039-D701F811ED41}"/>
+                </a:ext>
+              </a:extLst>
+            </p:cNvPr>
+            <p:cNvSpPr txBox="1">
+              <a:spLocks noChangeAspect="1"/>
+            </p:cNvSpPr>
+            <p:nvPr/>
+          </p:nvSpPr>
+          <p:spPr>
+            <a:xfrm>
+              <a:off x="62089056" y="12669723"/>
+              <a:ext cx="4378160" cy="1200329"/>
+            </a:xfrm>
+            <a:prstGeom prst="rect">
+              <a:avLst/>
+            </a:prstGeom>
+            <a:noFill/>
+          </p:spPr>
+          <p:txBody>
+            <a:bodyPr wrap="square" rtlCol="0" anchor="ctr" anchorCtr="1">
+              <a:spAutoFit/>
+            </a:bodyPr>
+            <a:lstStyle/>
+            <a:p>
+              <a:pPr algn="ctr"/>
+              <a:r>
+                <a:rPr lang="en-US" sz="7200" dirty="0">
+                  <a:latin typeface="Arial" panose="020B0604020202020204" pitchFamily="34" charset="0"/>
+                </a:rPr>
+                <a:t>18.33 cm</a:t>
+              </a:r>
+            </a:p>
+          </p:txBody>
+        </p:sp>
+      </p:grpSp>
+      <p:grpSp>
+        <p:nvGrpSpPr>
+          <p:cNvPr id="5" name="그룹 4">
+            <a:extLst>
+              <a:ext uri="{FF2B5EF4-FFF2-40B4-BE49-F238E27FC236}">
+                <a16:creationId xmlns:a16="http://schemas.microsoft.com/office/drawing/2014/main" id="{D28FEBB1-5974-459E-AA74-2B12D4B76295}"/>
+              </a:ext>
+            </a:extLst>
+          </p:cNvPr>
+          <p:cNvGrpSpPr/>
+          <p:nvPr/>
+        </p:nvGrpSpPr>
+        <p:grpSpPr>
+          <a:xfrm>
+            <a:off x="57925164" y="5105119"/>
+            <a:ext cx="5346348" cy="4078800"/>
+            <a:chOff x="59099578" y="4169679"/>
+            <a:chExt cx="5346348" cy="4078800"/>
+          </a:xfrm>
+        </p:grpSpPr>
+        <p:cxnSp>
+          <p:nvCxnSpPr>
+            <p:cNvPr id="39" name="직선 연결선 38">
+              <a:extLst>
+                <a:ext uri="{FF2B5EF4-FFF2-40B4-BE49-F238E27FC236}">
+                  <a16:creationId xmlns:a16="http://schemas.microsoft.com/office/drawing/2014/main" id="{88445734-0E6E-4533-B66A-EEAEF61A0181}"/>
+                </a:ext>
+              </a:extLst>
+            </p:cNvPr>
+            <p:cNvCxnSpPr>
+              <a:cxnSpLocks/>
+            </p:cNvCxnSpPr>
+            <p:nvPr/>
+          </p:nvCxnSpPr>
+          <p:spPr>
+            <a:xfrm>
+              <a:off x="59099578" y="4169679"/>
+              <a:ext cx="0" cy="4078800"/>
+            </a:xfrm>
+            <a:prstGeom prst="line">
+              <a:avLst/>
+            </a:prstGeom>
+          </p:spPr>
+          <p:style>
+            <a:lnRef idx="1">
+              <a:schemeClr val="accent1"/>
+            </a:lnRef>
+            <a:fillRef idx="0">
+              <a:schemeClr val="accent1"/>
+            </a:fillRef>
+            <a:effectRef idx="0">
+              <a:schemeClr val="accent1"/>
+            </a:effectRef>
+            <a:fontRef idx="minor">
+              <a:schemeClr val="tx1"/>
+            </a:fontRef>
+          </p:style>
+        </p:cxnSp>
+        <p:sp>
+          <p:nvSpPr>
+            <p:cNvPr id="40" name="TextBox 39">
+              <a:extLst>
+                <a:ext uri="{FF2B5EF4-FFF2-40B4-BE49-F238E27FC236}">
+                  <a16:creationId xmlns:a16="http://schemas.microsoft.com/office/drawing/2014/main" id="{E268F01A-B28D-4F3C-8D56-A84161BBCB2A}"/>
+                </a:ext>
+              </a:extLst>
+            </p:cNvPr>
+            <p:cNvSpPr txBox="1">
+              <a:spLocks noChangeAspect="1"/>
+            </p:cNvSpPr>
+            <p:nvPr/>
+          </p:nvSpPr>
+          <p:spPr>
+            <a:xfrm>
+              <a:off x="60067766" y="5608915"/>
+              <a:ext cx="4378160" cy="1200329"/>
+            </a:xfrm>
+            <a:prstGeom prst="rect">
+              <a:avLst/>
+            </a:prstGeom>
+            <a:noFill/>
+          </p:spPr>
+          <p:txBody>
+            <a:bodyPr wrap="square" rtlCol="0" anchor="ctr" anchorCtr="1">
+              <a:spAutoFit/>
+            </a:bodyPr>
+            <a:lstStyle/>
+            <a:p>
+              <a:pPr algn="ctr"/>
+              <a:r>
+                <a:rPr lang="en-US" sz="7200" dirty="0">
+                  <a:latin typeface="Arial" panose="020B0604020202020204" pitchFamily="34" charset="0"/>
+                </a:rPr>
+                <a:t>11.33 cm</a:t>
+              </a:r>
+            </a:p>
+          </p:txBody>
+        </p:sp>
+      </p:grpSp>
+      <p:cxnSp>
+        <p:nvCxnSpPr>
+          <p:cNvPr id="42" name="직선 연결선 41">
+            <a:extLst>
+              <a:ext uri="{FF2B5EF4-FFF2-40B4-BE49-F238E27FC236}">
+                <a16:creationId xmlns:a16="http://schemas.microsoft.com/office/drawing/2014/main" id="{D8C94ABE-2E1F-4F07-AC21-3ACDE3F311D1}"/>
+              </a:ext>
+            </a:extLst>
+          </p:cNvPr>
+          <p:cNvCxnSpPr>
+            <a:cxnSpLocks/>
+          </p:cNvCxnSpPr>
+          <p:nvPr/>
+        </p:nvCxnSpPr>
+        <p:spPr>
+          <a:xfrm>
+            <a:off x="56952211" y="2602930"/>
+            <a:ext cx="0" cy="2520000"/>
+          </a:xfrm>
+          <a:prstGeom prst="line">
+            <a:avLst/>
+          </a:prstGeom>
+        </p:spPr>
+        <p:style>
+          <a:lnRef idx="1">
+            <a:schemeClr val="accent1"/>
+          </a:lnRef>
+          <a:fillRef idx="0">
+            <a:schemeClr val="accent1"/>
+          </a:fillRef>
+          <a:effectRef idx="0">
+            <a:schemeClr val="accent1"/>
+          </a:effectRef>
+          <a:fontRef idx="minor">
+            <a:schemeClr val="tx1"/>
+          </a:fontRef>
+        </p:style>
+      </p:cxnSp>
+      <p:sp>
+        <p:nvSpPr>
+          <p:cNvPr id="43" name="TextBox 42">
+            <a:extLst>
+              <a:ext uri="{FF2B5EF4-FFF2-40B4-BE49-F238E27FC236}">
+                <a16:creationId xmlns:a16="http://schemas.microsoft.com/office/drawing/2014/main" id="{73A3DAEF-8A38-4A78-ABDF-59266A408924}"/>
+              </a:ext>
+            </a:extLst>
+          </p:cNvPr>
+          <p:cNvSpPr txBox="1">
+            <a:spLocks noChangeAspect="1"/>
+          </p:cNvSpPr>
+          <p:nvPr/>
+        </p:nvSpPr>
+        <p:spPr>
+          <a:xfrm>
+            <a:off x="57920399" y="3262766"/>
+            <a:ext cx="4378160" cy="1200329"/>
+          </a:xfrm>
+          <a:prstGeom prst="rect">
+            <a:avLst/>
+          </a:prstGeom>
+          <a:noFill/>
+        </p:spPr>
+        <p:txBody>
+          <a:bodyPr wrap="square" rtlCol="0" anchor="ctr" anchorCtr="1">
+            <a:spAutoFit/>
+          </a:bodyPr>
+          <a:lstStyle/>
+          <a:p>
+            <a:pPr algn="ctr"/>
+            <a:r>
+              <a:rPr lang="en-US" sz="7200" dirty="0">
+                <a:latin typeface="Arial" panose="020B0604020202020204" pitchFamily="34" charset="0"/>
+              </a:rPr>
+              <a:t>7 cm</a:t>
+            </a:r>
+          </a:p>
+        </p:txBody>
+      </p:sp>
+      <p:grpSp>
+        <p:nvGrpSpPr>
+          <p:cNvPr id="6" name="그룹 5">
+            <a:extLst>
+              <a:ext uri="{FF2B5EF4-FFF2-40B4-BE49-F238E27FC236}">
+                <a16:creationId xmlns:a16="http://schemas.microsoft.com/office/drawing/2014/main" id="{85E8AC06-4026-46AC-B13B-42B2A42E82F8}"/>
+              </a:ext>
+            </a:extLst>
+          </p:cNvPr>
+          <p:cNvGrpSpPr/>
+          <p:nvPr/>
+        </p:nvGrpSpPr>
+        <p:grpSpPr>
+          <a:xfrm>
+            <a:off x="55926354" y="1005759"/>
+            <a:ext cx="5346348" cy="1555200"/>
+            <a:chOff x="56952211" y="716013"/>
+            <a:chExt cx="5346348" cy="1555200"/>
+          </a:xfrm>
+        </p:grpSpPr>
+        <p:cxnSp>
+          <p:nvCxnSpPr>
+            <p:cNvPr id="44" name="직선 연결선 43">
+              <a:extLst>
+                <a:ext uri="{FF2B5EF4-FFF2-40B4-BE49-F238E27FC236}">
+                  <a16:creationId xmlns:a16="http://schemas.microsoft.com/office/drawing/2014/main" id="{127C332C-74D8-4CE2-9DC1-E2A5CC7F3CF7}"/>
+                </a:ext>
+              </a:extLst>
+            </p:cNvPr>
+            <p:cNvCxnSpPr>
+              <a:cxnSpLocks/>
+            </p:cNvCxnSpPr>
+            <p:nvPr/>
+          </p:nvCxnSpPr>
+          <p:spPr>
+            <a:xfrm>
+              <a:off x="56952211" y="716013"/>
+              <a:ext cx="0" cy="1555200"/>
+            </a:xfrm>
+            <a:prstGeom prst="line">
+              <a:avLst/>
+            </a:prstGeom>
+          </p:spPr>
+          <p:style>
+            <a:lnRef idx="1">
+              <a:schemeClr val="accent1"/>
+            </a:lnRef>
+            <a:fillRef idx="0">
+              <a:schemeClr val="accent1"/>
+            </a:fillRef>
+            <a:effectRef idx="0">
+              <a:schemeClr val="accent1"/>
+            </a:effectRef>
+            <a:fontRef idx="minor">
+              <a:schemeClr val="tx1"/>
+            </a:fontRef>
+          </p:style>
+        </p:cxnSp>
+        <p:sp>
+          <p:nvSpPr>
+            <p:cNvPr id="45" name="TextBox 44">
+              <a:extLst>
+                <a:ext uri="{FF2B5EF4-FFF2-40B4-BE49-F238E27FC236}">
+                  <a16:creationId xmlns:a16="http://schemas.microsoft.com/office/drawing/2014/main" id="{299FF942-2D85-414A-8455-0C07C0E6BC79}"/>
+                </a:ext>
+              </a:extLst>
+            </p:cNvPr>
+            <p:cNvSpPr txBox="1">
+              <a:spLocks noChangeAspect="1"/>
+            </p:cNvSpPr>
+            <p:nvPr/>
+          </p:nvSpPr>
+          <p:spPr>
+            <a:xfrm>
+              <a:off x="57920399" y="893449"/>
+              <a:ext cx="4378160" cy="1200329"/>
+            </a:xfrm>
+            <a:prstGeom prst="rect">
+              <a:avLst/>
+            </a:prstGeom>
+            <a:noFill/>
+          </p:spPr>
+          <p:txBody>
+            <a:bodyPr wrap="square" rtlCol="0" anchor="ctr" anchorCtr="1">
+              <a:spAutoFit/>
+            </a:bodyPr>
+            <a:lstStyle/>
+            <a:p>
+              <a:pPr algn="ctr"/>
+              <a:r>
+                <a:rPr lang="en-US" sz="7200" dirty="0">
+                  <a:latin typeface="Arial" panose="020B0604020202020204" pitchFamily="34" charset="0"/>
+                </a:rPr>
+                <a:t>4.32 cm</a:t>
+              </a:r>
+            </a:p>
+          </p:txBody>
+        </p:sp>
+      </p:grpSp>
+      <p:grpSp>
+        <p:nvGrpSpPr>
+          <p:cNvPr id="91" name="그룹 90">
+            <a:extLst>
+              <a:ext uri="{FF2B5EF4-FFF2-40B4-BE49-F238E27FC236}">
+                <a16:creationId xmlns:a16="http://schemas.microsoft.com/office/drawing/2014/main" id="{D5FD2102-E60E-4424-9FFC-7A76E48DBA8A}"/>
+              </a:ext>
+            </a:extLst>
+          </p:cNvPr>
+          <p:cNvGrpSpPr>
+            <a:grpSpLocks noChangeAspect="1"/>
+          </p:cNvGrpSpPr>
+          <p:nvPr/>
+        </p:nvGrpSpPr>
+        <p:grpSpPr>
+          <a:xfrm>
+            <a:off x="3060319" y="11703919"/>
+            <a:ext cx="17280000" cy="27961200"/>
+            <a:chOff x="3060319" y="11703919"/>
+            <a:chExt cx="17280000" cy="27961200"/>
+          </a:xfrm>
+        </p:grpSpPr>
+        <p:grpSp>
+          <p:nvGrpSpPr>
+            <p:cNvPr id="92" name="그룹 91">
+              <a:extLst>
+                <a:ext uri="{FF2B5EF4-FFF2-40B4-BE49-F238E27FC236}">
+                  <a16:creationId xmlns:a16="http://schemas.microsoft.com/office/drawing/2014/main" id="{54678DDE-1C3C-4149-951D-740D8C6FC472}"/>
+                </a:ext>
+              </a:extLst>
+            </p:cNvPr>
+            <p:cNvGrpSpPr>
+              <a:grpSpLocks noChangeAspect="1"/>
+            </p:cNvGrpSpPr>
+            <p:nvPr/>
+          </p:nvGrpSpPr>
+          <p:grpSpPr>
+            <a:xfrm>
+              <a:off x="13741520" y="19865119"/>
+              <a:ext cx="2520000" cy="2520000"/>
+              <a:chOff x="19947575" y="23450076"/>
+              <a:chExt cx="2520000" cy="2520000"/>
+            </a:xfrm>
+          </p:grpSpPr>
+          <p:sp>
+            <p:nvSpPr>
+              <p:cNvPr id="108" name="직사각형 107">
+                <a:extLst>
+                  <a:ext uri="{FF2B5EF4-FFF2-40B4-BE49-F238E27FC236}">
+                    <a16:creationId xmlns:a16="http://schemas.microsoft.com/office/drawing/2014/main" id="{C66AA19F-632D-42DD-A69A-BE3E9593E2FF}"/>
+                  </a:ext>
+                </a:extLst>
+              </p:cNvPr>
+              <p:cNvSpPr>
+                <a:spLocks noChangeAspect="1"/>
+              </p:cNvSpPr>
+              <p:nvPr/>
+            </p:nvSpPr>
+            <p:spPr>
+              <a:xfrm>
+                <a:off x="19947575" y="23450076"/>
+                <a:ext cx="2520000" cy="2520000"/>
+              </a:xfrm>
+              <a:prstGeom prst="rect">
+                <a:avLst/>
+              </a:prstGeom>
+              <a:solidFill>
+                <a:schemeClr val="bg1"/>
+              </a:solidFill>
+              <a:ln>
+                <a:noFill/>
+              </a:ln>
+            </p:spPr>
+            <p:style>
+              <a:lnRef idx="2">
+                <a:schemeClr val="accent1">
+                  <a:shade val="50000"/>
+                </a:schemeClr>
+              </a:lnRef>
+              <a:fillRef idx="1">
+                <a:schemeClr val="accent1"/>
+              </a:fillRef>
+              <a:effectRef idx="0">
+                <a:schemeClr val="accent1"/>
+              </a:effectRef>
+              <a:fontRef idx="minor">
+                <a:schemeClr val="lt1"/>
+              </a:fontRef>
+            </p:style>
+            <p:txBody>
+              <a:bodyPr rtlCol="0" anchor="ctr"/>
+              <a:lstStyle/>
+              <a:p>
+                <a:pPr algn="ctr"/>
+                <a:endParaRPr lang="en-US"/>
+              </a:p>
+            </p:txBody>
+          </p:sp>
+          <p:pic>
+            <p:nvPicPr>
+              <p:cNvPr id="109" name="그림 108">
+                <a:extLst>
+                  <a:ext uri="{FF2B5EF4-FFF2-40B4-BE49-F238E27FC236}">
+                    <a16:creationId xmlns:a16="http://schemas.microsoft.com/office/drawing/2014/main" id="{D6E96417-5CD4-445F-A328-FAC4FE4EF989}"/>
+                  </a:ext>
+                </a:extLst>
+              </p:cNvPr>
+              <p:cNvPicPr>
+                <a:picLocks noChangeAspect="1"/>
+              </p:cNvPicPr>
+              <p:nvPr/>
+            </p:nvPicPr>
+            <p:blipFill>
+              <a:blip r:embed="rId2">
+                <a:extLst>
+                  <a:ext uri="{28A0092B-C50C-407E-A947-70E740481C1C}">
+                    <a14:useLocalDpi xmlns:a14="http://schemas.microsoft.com/office/drawing/2010/main" val="0"/>
+                  </a:ext>
+                </a:extLst>
+              </a:blip>
+              <a:stretch>
+                <a:fillRect/>
+              </a:stretch>
+            </p:blipFill>
+            <p:spPr>
+              <a:xfrm>
+                <a:off x="20262575" y="23765076"/>
+                <a:ext cx="1890000" cy="1890000"/>
+              </a:xfrm>
+              <a:prstGeom prst="rect">
+                <a:avLst/>
+              </a:prstGeom>
+            </p:spPr>
+          </p:pic>
+        </p:grpSp>
+        <p:grpSp>
+          <p:nvGrpSpPr>
+            <p:cNvPr id="93" name="그룹 92">
+              <a:extLst>
+                <a:ext uri="{FF2B5EF4-FFF2-40B4-BE49-F238E27FC236}">
+                  <a16:creationId xmlns:a16="http://schemas.microsoft.com/office/drawing/2014/main" id="{8E858698-AE87-4404-83EC-D3581BCD31D9}"/>
+                </a:ext>
+              </a:extLst>
+            </p:cNvPr>
+            <p:cNvGrpSpPr>
+              <a:grpSpLocks noChangeAspect="1"/>
+            </p:cNvGrpSpPr>
+            <p:nvPr/>
+          </p:nvGrpSpPr>
+          <p:grpSpPr>
+            <a:xfrm>
+              <a:off x="3060319" y="22385119"/>
+              <a:ext cx="17280000" cy="17280000"/>
+              <a:chOff x="-2760882" y="22385119"/>
+              <a:chExt cx="17280000" cy="17280000"/>
+            </a:xfrm>
+          </p:grpSpPr>
+          <p:sp>
+            <p:nvSpPr>
+              <p:cNvPr id="106" name="직사각형 105">
+                <a:extLst>
+                  <a:ext uri="{FF2B5EF4-FFF2-40B4-BE49-F238E27FC236}">
+                    <a16:creationId xmlns:a16="http://schemas.microsoft.com/office/drawing/2014/main" id="{C96585A4-B4CB-42B3-80B3-6AA0F3597001}"/>
+                  </a:ext>
+                </a:extLst>
+              </p:cNvPr>
+              <p:cNvSpPr>
+                <a:spLocks noChangeAspect="1"/>
+              </p:cNvSpPr>
+              <p:nvPr/>
+            </p:nvSpPr>
+            <p:spPr>
+              <a:xfrm>
+                <a:off x="-2760882" y="22385119"/>
+                <a:ext cx="17280000" cy="17280000"/>
+              </a:xfrm>
+              <a:prstGeom prst="rect">
+                <a:avLst/>
+              </a:prstGeom>
+              <a:solidFill>
+                <a:schemeClr val="bg1"/>
+              </a:solidFill>
+              <a:ln>
+                <a:noFill/>
+              </a:ln>
+            </p:spPr>
+            <p:style>
+              <a:lnRef idx="2">
+                <a:schemeClr val="accent1">
+                  <a:shade val="50000"/>
+                </a:schemeClr>
+              </a:lnRef>
+              <a:fillRef idx="1">
+                <a:schemeClr val="accent1"/>
+              </a:fillRef>
+              <a:effectRef idx="0">
+                <a:schemeClr val="accent1"/>
+              </a:effectRef>
+              <a:fontRef idx="minor">
+                <a:schemeClr val="lt1"/>
+              </a:fontRef>
+            </p:style>
+            <p:txBody>
+              <a:bodyPr rtlCol="0" anchor="ctr"/>
+              <a:lstStyle/>
+              <a:p>
+                <a:pPr algn="ctr"/>
+                <a:endParaRPr lang="en-US"/>
+              </a:p>
+            </p:txBody>
+          </p:sp>
+          <p:pic>
+            <p:nvPicPr>
+              <p:cNvPr id="107" name="그림 106">
+                <a:extLst>
+                  <a:ext uri="{FF2B5EF4-FFF2-40B4-BE49-F238E27FC236}">
+                    <a16:creationId xmlns:a16="http://schemas.microsoft.com/office/drawing/2014/main" id="{C65B93B3-FD39-416A-A1F5-B20AC3A0371F}"/>
+                  </a:ext>
+                </a:extLst>
+              </p:cNvPr>
+              <p:cNvPicPr>
+                <a:picLocks noChangeAspect="1"/>
+              </p:cNvPicPr>
+              <p:nvPr/>
+            </p:nvPicPr>
+            <p:blipFill>
+              <a:blip r:embed="rId3">
+                <a:extLst>
+                  <a:ext uri="{28A0092B-C50C-407E-A947-70E740481C1C}">
+                    <a14:useLocalDpi xmlns:a14="http://schemas.microsoft.com/office/drawing/2010/main" val="0"/>
+                  </a:ext>
+                </a:extLst>
+              </a:blip>
+              <a:stretch>
+                <a:fillRect/>
+              </a:stretch>
+            </p:blipFill>
+            <p:spPr>
+              <a:xfrm>
+                <a:off x="-600882" y="24545119"/>
+                <a:ext cx="12960000" cy="12960000"/>
+              </a:xfrm>
+              <a:prstGeom prst="rect">
+                <a:avLst/>
+              </a:prstGeom>
+            </p:spPr>
+          </p:pic>
+        </p:grpSp>
+        <p:grpSp>
+          <p:nvGrpSpPr>
+            <p:cNvPr id="94" name="그룹 93">
+              <a:extLst>
+                <a:ext uri="{FF2B5EF4-FFF2-40B4-BE49-F238E27FC236}">
+                  <a16:creationId xmlns:a16="http://schemas.microsoft.com/office/drawing/2014/main" id="{4D6720FD-4928-4184-93A9-6786128BBD32}"/>
+                </a:ext>
+              </a:extLst>
+            </p:cNvPr>
+            <p:cNvGrpSpPr>
+              <a:grpSpLocks noChangeAspect="1"/>
+            </p:cNvGrpSpPr>
+            <p:nvPr/>
+          </p:nvGrpSpPr>
+          <p:grpSpPr>
+            <a:xfrm>
+              <a:off x="3060319" y="11703919"/>
+              <a:ext cx="10681200" cy="10681200"/>
+              <a:chOff x="328786" y="11703919"/>
+              <a:chExt cx="10681200" cy="10681200"/>
+            </a:xfrm>
+          </p:grpSpPr>
+          <p:sp>
+            <p:nvSpPr>
+              <p:cNvPr id="104" name="직사각형 103">
+                <a:extLst>
+                  <a:ext uri="{FF2B5EF4-FFF2-40B4-BE49-F238E27FC236}">
+                    <a16:creationId xmlns:a16="http://schemas.microsoft.com/office/drawing/2014/main" id="{A62E2739-43E4-44FB-A890-B6F9B5FE4214}"/>
+                  </a:ext>
+                </a:extLst>
+              </p:cNvPr>
+              <p:cNvSpPr>
+                <a:spLocks noChangeAspect="1"/>
+              </p:cNvSpPr>
+              <p:nvPr/>
+            </p:nvSpPr>
+            <p:spPr>
+              <a:xfrm>
+                <a:off x="328786" y="11703919"/>
+                <a:ext cx="10681200" cy="10681200"/>
+              </a:xfrm>
+              <a:prstGeom prst="rect">
+                <a:avLst/>
+              </a:prstGeom>
+              <a:solidFill>
+                <a:schemeClr val="bg1"/>
+              </a:solidFill>
+              <a:ln>
+                <a:noFill/>
+              </a:ln>
+            </p:spPr>
+            <p:style>
+              <a:lnRef idx="2">
+                <a:schemeClr val="accent1">
+                  <a:shade val="50000"/>
+                </a:schemeClr>
+              </a:lnRef>
+              <a:fillRef idx="1">
+                <a:schemeClr val="accent1"/>
+              </a:fillRef>
+              <a:effectRef idx="0">
+                <a:schemeClr val="accent1"/>
+              </a:effectRef>
+              <a:fontRef idx="minor">
+                <a:schemeClr val="lt1"/>
+              </a:fontRef>
+            </p:style>
+            <p:txBody>
+              <a:bodyPr rtlCol="0" anchor="ctr"/>
+              <a:lstStyle/>
+              <a:p>
+                <a:pPr algn="ctr"/>
+                <a:endParaRPr lang="en-US"/>
+              </a:p>
+            </p:txBody>
+          </p:sp>
+          <p:pic>
+            <p:nvPicPr>
+              <p:cNvPr id="105" name="그림 104">
+                <a:extLst>
+                  <a:ext uri="{FF2B5EF4-FFF2-40B4-BE49-F238E27FC236}">
+                    <a16:creationId xmlns:a16="http://schemas.microsoft.com/office/drawing/2014/main" id="{B0567273-60C4-497E-9BF6-6010B20829C0}"/>
+                  </a:ext>
+                </a:extLst>
+              </p:cNvPr>
+              <p:cNvPicPr>
+                <a:picLocks noChangeAspect="1"/>
+              </p:cNvPicPr>
+              <p:nvPr/>
+            </p:nvPicPr>
+            <p:blipFill>
+              <a:blip r:embed="rId4">
+                <a:extLst>
+                  <a:ext uri="{28A0092B-C50C-407E-A947-70E740481C1C}">
+                    <a14:useLocalDpi xmlns:a14="http://schemas.microsoft.com/office/drawing/2010/main" val="0"/>
+                  </a:ext>
+                </a:extLst>
+              </a:blip>
+              <a:stretch>
+                <a:fillRect/>
+              </a:stretch>
+            </p:blipFill>
+            <p:spPr>
+              <a:xfrm>
+                <a:off x="1664386" y="13039519"/>
+                <a:ext cx="8010000" cy="8010000"/>
+              </a:xfrm>
+              <a:prstGeom prst="rect">
+                <a:avLst/>
+              </a:prstGeom>
+            </p:spPr>
+          </p:pic>
+        </p:grpSp>
+        <p:grpSp>
+          <p:nvGrpSpPr>
+            <p:cNvPr id="95" name="그룹 94">
+              <a:extLst>
+                <a:ext uri="{FF2B5EF4-FFF2-40B4-BE49-F238E27FC236}">
+                  <a16:creationId xmlns:a16="http://schemas.microsoft.com/office/drawing/2014/main" id="{3FD2BCE6-A294-4CDB-B34B-E8BFABD719E1}"/>
+                </a:ext>
+              </a:extLst>
+            </p:cNvPr>
+            <p:cNvGrpSpPr>
+              <a:grpSpLocks noChangeAspect="1"/>
+            </p:cNvGrpSpPr>
+            <p:nvPr/>
+          </p:nvGrpSpPr>
+          <p:grpSpPr>
+            <a:xfrm>
+              <a:off x="13741518" y="11703919"/>
+              <a:ext cx="6598800" cy="6598800"/>
+              <a:chOff x="10314342" y="13626019"/>
+              <a:chExt cx="6598800" cy="6598800"/>
+            </a:xfrm>
+          </p:grpSpPr>
+          <p:sp>
+            <p:nvSpPr>
+              <p:cNvPr id="102" name="직사각형 101">
+                <a:extLst>
+                  <a:ext uri="{FF2B5EF4-FFF2-40B4-BE49-F238E27FC236}">
+                    <a16:creationId xmlns:a16="http://schemas.microsoft.com/office/drawing/2014/main" id="{2BC29D4C-25C9-4DBF-8CE5-1B9452D68500}"/>
+                  </a:ext>
+                </a:extLst>
+              </p:cNvPr>
+              <p:cNvSpPr>
+                <a:spLocks noChangeAspect="1"/>
+              </p:cNvSpPr>
+              <p:nvPr/>
+            </p:nvSpPr>
+            <p:spPr>
+              <a:xfrm>
+                <a:off x="10314342" y="13626019"/>
+                <a:ext cx="6598800" cy="6598800"/>
+              </a:xfrm>
+              <a:prstGeom prst="rect">
+                <a:avLst/>
+              </a:prstGeom>
+              <a:solidFill>
+                <a:schemeClr val="bg1"/>
+              </a:solidFill>
+              <a:ln>
+                <a:noFill/>
+              </a:ln>
+            </p:spPr>
+            <p:style>
+              <a:lnRef idx="2">
+                <a:schemeClr val="accent1">
+                  <a:shade val="50000"/>
+                </a:schemeClr>
+              </a:lnRef>
+              <a:fillRef idx="1">
+                <a:schemeClr val="accent1"/>
+              </a:fillRef>
+              <a:effectRef idx="0">
+                <a:schemeClr val="accent1"/>
+              </a:effectRef>
+              <a:fontRef idx="minor">
+                <a:schemeClr val="lt1"/>
+              </a:fontRef>
+            </p:style>
+            <p:txBody>
+              <a:bodyPr rtlCol="0" anchor="ctr"/>
+              <a:lstStyle/>
+              <a:p>
+                <a:pPr algn="ctr"/>
+                <a:endParaRPr lang="en-US"/>
+              </a:p>
+            </p:txBody>
+          </p:sp>
+          <p:pic>
+            <p:nvPicPr>
+              <p:cNvPr id="103" name="그림 102">
+                <a:extLst>
+                  <a:ext uri="{FF2B5EF4-FFF2-40B4-BE49-F238E27FC236}">
+                    <a16:creationId xmlns:a16="http://schemas.microsoft.com/office/drawing/2014/main" id="{CD347949-2A6A-48ED-9385-7B1A1B221E72}"/>
+                  </a:ext>
+                </a:extLst>
+              </p:cNvPr>
+              <p:cNvPicPr>
+                <a:picLocks noChangeAspect="1"/>
+              </p:cNvPicPr>
+              <p:nvPr/>
+            </p:nvPicPr>
+            <p:blipFill>
+              <a:blip r:embed="rId5">
+                <a:extLst>
+                  <a:ext uri="{28A0092B-C50C-407E-A947-70E740481C1C}">
+                    <a14:useLocalDpi xmlns:a14="http://schemas.microsoft.com/office/drawing/2010/main" val="0"/>
+                  </a:ext>
+                </a:extLst>
+              </a:blip>
+              <a:stretch>
+                <a:fillRect/>
+              </a:stretch>
+            </p:blipFill>
+            <p:spPr>
+              <a:xfrm>
+                <a:off x="11138742" y="14450419"/>
+                <a:ext cx="4950000" cy="4950000"/>
+              </a:xfrm>
+              <a:prstGeom prst="rect">
+                <a:avLst/>
+              </a:prstGeom>
+            </p:spPr>
+          </p:pic>
+        </p:grpSp>
+        <p:grpSp>
+          <p:nvGrpSpPr>
+            <p:cNvPr id="96" name="그룹 95">
+              <a:extLst>
+                <a:ext uri="{FF2B5EF4-FFF2-40B4-BE49-F238E27FC236}">
+                  <a16:creationId xmlns:a16="http://schemas.microsoft.com/office/drawing/2014/main" id="{DB858790-7DDC-4254-9D4A-77124DCFBDCC}"/>
+                </a:ext>
+              </a:extLst>
+            </p:cNvPr>
+            <p:cNvGrpSpPr>
+              <a:grpSpLocks noChangeAspect="1"/>
+            </p:cNvGrpSpPr>
+            <p:nvPr/>
+          </p:nvGrpSpPr>
+          <p:grpSpPr>
+            <a:xfrm>
+              <a:off x="16261519" y="18306319"/>
+              <a:ext cx="4078800" cy="4078800"/>
+              <a:chOff x="19082678" y="18936701"/>
+              <a:chExt cx="4078800" cy="4078800"/>
+            </a:xfrm>
+          </p:grpSpPr>
+          <p:sp>
+            <p:nvSpPr>
+              <p:cNvPr id="100" name="직사각형 99">
+                <a:extLst>
+                  <a:ext uri="{FF2B5EF4-FFF2-40B4-BE49-F238E27FC236}">
+                    <a16:creationId xmlns:a16="http://schemas.microsoft.com/office/drawing/2014/main" id="{F58F11D9-BBE1-49E4-9DD8-56DCFCDD4534}"/>
+                  </a:ext>
+                </a:extLst>
+              </p:cNvPr>
+              <p:cNvSpPr>
+                <a:spLocks noChangeAspect="1"/>
+              </p:cNvSpPr>
+              <p:nvPr/>
+            </p:nvSpPr>
+            <p:spPr>
+              <a:xfrm>
+                <a:off x="19082678" y="18936701"/>
+                <a:ext cx="4078800" cy="4078800"/>
+              </a:xfrm>
+              <a:prstGeom prst="rect">
+                <a:avLst/>
+              </a:prstGeom>
+              <a:solidFill>
+                <a:schemeClr val="bg1"/>
+              </a:solidFill>
+              <a:ln>
+                <a:noFill/>
+              </a:ln>
+            </p:spPr>
+            <p:style>
+              <a:lnRef idx="2">
+                <a:schemeClr val="accent1">
+                  <a:shade val="50000"/>
+                </a:schemeClr>
+              </a:lnRef>
+              <a:fillRef idx="1">
+                <a:schemeClr val="accent1"/>
+              </a:fillRef>
+              <a:effectRef idx="0">
+                <a:schemeClr val="accent1"/>
+              </a:effectRef>
+              <a:fontRef idx="minor">
+                <a:schemeClr val="lt1"/>
+              </a:fontRef>
+            </p:style>
+            <p:txBody>
+              <a:bodyPr rtlCol="0" anchor="ctr"/>
+              <a:lstStyle/>
+              <a:p>
+                <a:pPr algn="ctr"/>
+                <a:endParaRPr lang="en-US"/>
+              </a:p>
+            </p:txBody>
+          </p:sp>
+          <p:pic>
+            <p:nvPicPr>
+              <p:cNvPr id="101" name="그림 100">
+                <a:extLst>
+                  <a:ext uri="{FF2B5EF4-FFF2-40B4-BE49-F238E27FC236}">
+                    <a16:creationId xmlns:a16="http://schemas.microsoft.com/office/drawing/2014/main" id="{E970BAE3-902E-4935-935E-F3DD20C8BD21}"/>
+                  </a:ext>
+                </a:extLst>
+              </p:cNvPr>
+              <p:cNvPicPr>
+                <a:picLocks noChangeAspect="1"/>
+              </p:cNvPicPr>
+              <p:nvPr/>
+            </p:nvPicPr>
+            <p:blipFill>
+              <a:blip r:embed="rId6">
+                <a:extLst>
+                  <a:ext uri="{28A0092B-C50C-407E-A947-70E740481C1C}">
+                    <a14:useLocalDpi xmlns:a14="http://schemas.microsoft.com/office/drawing/2010/main" val="0"/>
+                  </a:ext>
+                </a:extLst>
+              </a:blip>
+              <a:stretch>
+                <a:fillRect/>
+              </a:stretch>
+            </p:blipFill>
+            <p:spPr>
+              <a:xfrm>
+                <a:off x="19592078" y="19446101"/>
+                <a:ext cx="3060000" cy="3060000"/>
+              </a:xfrm>
+              <a:prstGeom prst="rect">
+                <a:avLst/>
+              </a:prstGeom>
+            </p:spPr>
+          </p:pic>
+        </p:grpSp>
+        <p:grpSp>
+          <p:nvGrpSpPr>
+            <p:cNvPr id="97" name="그룹 96">
+              <a:extLst>
+                <a:ext uri="{FF2B5EF4-FFF2-40B4-BE49-F238E27FC236}">
+                  <a16:creationId xmlns:a16="http://schemas.microsoft.com/office/drawing/2014/main" id="{FB52E3C6-0BEF-4A70-8525-39C7C4CA9D19}"/>
+                </a:ext>
+              </a:extLst>
+            </p:cNvPr>
+            <p:cNvGrpSpPr>
+              <a:grpSpLocks noChangeAspect="1"/>
+            </p:cNvGrpSpPr>
+            <p:nvPr/>
+          </p:nvGrpSpPr>
+          <p:grpSpPr>
+            <a:xfrm>
+              <a:off x="13741518" y="18306319"/>
+              <a:ext cx="1555200" cy="1555200"/>
+              <a:chOff x="26644062" y="18487410"/>
+              <a:chExt cx="1555200" cy="1555200"/>
+            </a:xfrm>
+          </p:grpSpPr>
+          <p:sp>
+            <p:nvSpPr>
+              <p:cNvPr id="98" name="직사각형 97">
+                <a:extLst>
+                  <a:ext uri="{FF2B5EF4-FFF2-40B4-BE49-F238E27FC236}">
+                    <a16:creationId xmlns:a16="http://schemas.microsoft.com/office/drawing/2014/main" id="{C719FF3F-181F-4C16-AA5F-0134C82FB34E}"/>
+                  </a:ext>
+                </a:extLst>
+              </p:cNvPr>
+              <p:cNvSpPr>
+                <a:spLocks noChangeAspect="1"/>
+              </p:cNvSpPr>
+              <p:nvPr/>
+            </p:nvSpPr>
+            <p:spPr>
+              <a:xfrm>
+                <a:off x="26644062" y="18487410"/>
+                <a:ext cx="1555200" cy="1555200"/>
+              </a:xfrm>
+              <a:prstGeom prst="rect">
+                <a:avLst/>
+              </a:prstGeom>
+              <a:solidFill>
+                <a:schemeClr val="bg1"/>
+              </a:solidFill>
+              <a:ln>
+                <a:noFill/>
+              </a:ln>
+            </p:spPr>
+            <p:style>
+              <a:lnRef idx="2">
+                <a:schemeClr val="accent1">
+                  <a:shade val="50000"/>
+                </a:schemeClr>
+              </a:lnRef>
+              <a:fillRef idx="1">
+                <a:schemeClr val="accent1"/>
+              </a:fillRef>
+              <a:effectRef idx="0">
+                <a:schemeClr val="accent1"/>
+              </a:effectRef>
+              <a:fontRef idx="minor">
+                <a:schemeClr val="lt1"/>
+              </a:fontRef>
+            </p:style>
+            <p:txBody>
+              <a:bodyPr rtlCol="0" anchor="ctr"/>
+              <a:lstStyle/>
+              <a:p>
+                <a:pPr algn="ctr"/>
+                <a:endParaRPr lang="en-US"/>
+              </a:p>
+            </p:txBody>
+          </p:sp>
+          <p:pic>
+            <p:nvPicPr>
+              <p:cNvPr id="99" name="그림 98">
+                <a:extLst>
+                  <a:ext uri="{FF2B5EF4-FFF2-40B4-BE49-F238E27FC236}">
+                    <a16:creationId xmlns:a16="http://schemas.microsoft.com/office/drawing/2014/main" id="{71D81C63-8DA4-4D59-AA03-D5A7C046879C}"/>
+                  </a:ext>
+                </a:extLst>
+              </p:cNvPr>
+              <p:cNvPicPr>
+                <a:picLocks noChangeAspect="1"/>
+              </p:cNvPicPr>
+              <p:nvPr/>
+            </p:nvPicPr>
+            <p:blipFill>
+              <a:blip r:embed="rId7">
+                <a:extLst>
+                  <a:ext uri="{28A0092B-C50C-407E-A947-70E740481C1C}">
+                    <a14:useLocalDpi xmlns:a14="http://schemas.microsoft.com/office/drawing/2010/main" val="0"/>
+                  </a:ext>
+                </a:extLst>
+              </a:blip>
+              <a:stretch>
+                <a:fillRect/>
+              </a:stretch>
+            </p:blipFill>
+            <p:spPr>
+              <a:xfrm>
+                <a:off x="26838462" y="18681810"/>
+                <a:ext cx="1166400" cy="1166400"/>
+              </a:xfrm>
+              <a:prstGeom prst="rect">
+                <a:avLst/>
+              </a:prstGeom>
+            </p:spPr>
+          </p:pic>
+        </p:grpSp>
+      </p:grpSp>
+      <p:grpSp>
+        <p:nvGrpSpPr>
+          <p:cNvPr id="110" name="그룹 109">
+            <a:extLst>
+              <a:ext uri="{FF2B5EF4-FFF2-40B4-BE49-F238E27FC236}">
+                <a16:creationId xmlns:a16="http://schemas.microsoft.com/office/drawing/2014/main" id="{759CE9F6-EE98-47A7-8049-945636F4D74B}"/>
+              </a:ext>
+            </a:extLst>
+          </p:cNvPr>
+          <p:cNvGrpSpPr>
+            <a:grpSpLocks noChangeAspect="1"/>
+          </p:cNvGrpSpPr>
+          <p:nvPr/>
+        </p:nvGrpSpPr>
+        <p:grpSpPr>
+          <a:xfrm>
+            <a:off x="-18260525" y="11703919"/>
+            <a:ext cx="17280000" cy="27961200"/>
+            <a:chOff x="3060319" y="11703919"/>
+            <a:chExt cx="17280000" cy="27961200"/>
+          </a:xfrm>
+        </p:grpSpPr>
+        <p:grpSp>
+          <p:nvGrpSpPr>
+            <p:cNvPr id="111" name="그룹 110">
+              <a:extLst>
+                <a:ext uri="{FF2B5EF4-FFF2-40B4-BE49-F238E27FC236}">
+                  <a16:creationId xmlns:a16="http://schemas.microsoft.com/office/drawing/2014/main" id="{AA17E872-DA70-44E2-B707-FC5B55562004}"/>
+                </a:ext>
+              </a:extLst>
+            </p:cNvPr>
+            <p:cNvGrpSpPr>
+              <a:grpSpLocks noChangeAspect="1"/>
+            </p:cNvGrpSpPr>
+            <p:nvPr/>
+          </p:nvGrpSpPr>
+          <p:grpSpPr>
+            <a:xfrm>
+              <a:off x="13741520" y="19865119"/>
+              <a:ext cx="2520000" cy="2520000"/>
+              <a:chOff x="19947575" y="23450076"/>
+              <a:chExt cx="2520000" cy="2520000"/>
+            </a:xfrm>
+          </p:grpSpPr>
+          <p:sp>
+            <p:nvSpPr>
+              <p:cNvPr id="133" name="직사각형 132">
+                <a:extLst>
+                  <a:ext uri="{FF2B5EF4-FFF2-40B4-BE49-F238E27FC236}">
+                    <a16:creationId xmlns:a16="http://schemas.microsoft.com/office/drawing/2014/main" id="{A33F922C-14B0-499B-A499-24AB27239702}"/>
+                  </a:ext>
+                </a:extLst>
+              </p:cNvPr>
+              <p:cNvSpPr>
+                <a:spLocks noChangeAspect="1"/>
+              </p:cNvSpPr>
+              <p:nvPr/>
+            </p:nvSpPr>
+            <p:spPr>
+              <a:xfrm>
+                <a:off x="19947575" y="23450076"/>
+                <a:ext cx="2520000" cy="2520000"/>
+              </a:xfrm>
+              <a:prstGeom prst="rect">
+                <a:avLst/>
+              </a:prstGeom>
+              <a:solidFill>
+                <a:schemeClr val="bg1"/>
+              </a:solidFill>
+              <a:ln>
+                <a:solidFill>
+                  <a:schemeClr val="tx1"/>
+                </a:solidFill>
+              </a:ln>
+            </p:spPr>
+            <p:style>
+              <a:lnRef idx="2">
+                <a:schemeClr val="accent1">
+                  <a:shade val="50000"/>
+                </a:schemeClr>
+              </a:lnRef>
+              <a:fillRef idx="1">
+                <a:schemeClr val="accent1"/>
+              </a:fillRef>
+              <a:effectRef idx="0">
+                <a:schemeClr val="accent1"/>
+              </a:effectRef>
+              <a:fontRef idx="minor">
+                <a:schemeClr val="lt1"/>
+              </a:fontRef>
+            </p:style>
+            <p:txBody>
+              <a:bodyPr rtlCol="0" anchor="ctr"/>
+              <a:lstStyle/>
+              <a:p>
+                <a:pPr algn="ctr"/>
+                <a:endParaRPr lang="en-US"/>
+              </a:p>
+            </p:txBody>
+          </p:sp>
+          <p:pic>
+            <p:nvPicPr>
+              <p:cNvPr id="134" name="그림 133">
+                <a:extLst>
+                  <a:ext uri="{FF2B5EF4-FFF2-40B4-BE49-F238E27FC236}">
+                    <a16:creationId xmlns:a16="http://schemas.microsoft.com/office/drawing/2014/main" id="{10EDE35F-82A8-4530-BB81-616D50A2E461}"/>
+                  </a:ext>
+                </a:extLst>
+              </p:cNvPr>
+              <p:cNvPicPr>
+                <a:picLocks noChangeAspect="1"/>
+              </p:cNvPicPr>
+              <p:nvPr/>
+            </p:nvPicPr>
+            <p:blipFill>
+              <a:blip r:embed="rId2">
+                <a:extLst>
+                  <a:ext uri="{28A0092B-C50C-407E-A947-70E740481C1C}">
+                    <a14:useLocalDpi xmlns:a14="http://schemas.microsoft.com/office/drawing/2010/main" val="0"/>
+                  </a:ext>
+                </a:extLst>
+              </a:blip>
+              <a:stretch>
+                <a:fillRect/>
+              </a:stretch>
+            </p:blipFill>
+            <p:spPr>
+              <a:xfrm>
+                <a:off x="20262575" y="23765076"/>
+                <a:ext cx="1890000" cy="1890000"/>
+              </a:xfrm>
+              <a:prstGeom prst="rect">
+                <a:avLst/>
+              </a:prstGeom>
+              <a:ln>
+                <a:solidFill>
+                  <a:schemeClr val="tx1"/>
+                </a:solidFill>
+              </a:ln>
+            </p:spPr>
+          </p:pic>
+        </p:grpSp>
+        <p:grpSp>
+          <p:nvGrpSpPr>
+            <p:cNvPr id="112" name="그룹 111">
+              <a:extLst>
+                <a:ext uri="{FF2B5EF4-FFF2-40B4-BE49-F238E27FC236}">
+                  <a16:creationId xmlns:a16="http://schemas.microsoft.com/office/drawing/2014/main" id="{646D44EB-07AF-4EBE-9643-3452D7EE1CE5}"/>
+                </a:ext>
+              </a:extLst>
+            </p:cNvPr>
+            <p:cNvGrpSpPr>
+              <a:grpSpLocks noChangeAspect="1"/>
+            </p:cNvGrpSpPr>
+            <p:nvPr/>
+          </p:nvGrpSpPr>
+          <p:grpSpPr>
+            <a:xfrm>
+              <a:off x="3060319" y="22385119"/>
+              <a:ext cx="17280000" cy="17280000"/>
+              <a:chOff x="-2760882" y="22385119"/>
+              <a:chExt cx="17280000" cy="17280000"/>
+            </a:xfrm>
+          </p:grpSpPr>
+          <p:sp>
+            <p:nvSpPr>
+              <p:cNvPr id="131" name="직사각형 130">
+                <a:extLst>
+                  <a:ext uri="{FF2B5EF4-FFF2-40B4-BE49-F238E27FC236}">
+                    <a16:creationId xmlns:a16="http://schemas.microsoft.com/office/drawing/2014/main" id="{7AEECE87-3A3D-4F73-A63E-2E6D200899B2}"/>
+                  </a:ext>
+                </a:extLst>
+              </p:cNvPr>
+              <p:cNvSpPr>
+                <a:spLocks noChangeAspect="1"/>
+              </p:cNvSpPr>
+              <p:nvPr/>
+            </p:nvSpPr>
+            <p:spPr>
+              <a:xfrm>
+                <a:off x="-2760882" y="22385119"/>
+                <a:ext cx="17280000" cy="17280000"/>
+              </a:xfrm>
+              <a:prstGeom prst="rect">
+                <a:avLst/>
+              </a:prstGeom>
+              <a:solidFill>
+                <a:schemeClr val="bg1"/>
+              </a:solidFill>
+              <a:ln>
+                <a:solidFill>
+                  <a:schemeClr val="tx1"/>
+                </a:solidFill>
+              </a:ln>
+            </p:spPr>
+            <p:style>
+              <a:lnRef idx="2">
+                <a:schemeClr val="accent1">
+                  <a:shade val="50000"/>
+                </a:schemeClr>
+              </a:lnRef>
+              <a:fillRef idx="1">
+                <a:schemeClr val="accent1"/>
+              </a:fillRef>
+              <a:effectRef idx="0">
+                <a:schemeClr val="accent1"/>
+              </a:effectRef>
+              <a:fontRef idx="minor">
+                <a:schemeClr val="lt1"/>
+              </a:fontRef>
+            </p:style>
+            <p:txBody>
+              <a:bodyPr rtlCol="0" anchor="ctr"/>
+              <a:lstStyle/>
+              <a:p>
+                <a:pPr algn="ctr"/>
+                <a:endParaRPr lang="en-US"/>
+              </a:p>
+            </p:txBody>
+          </p:sp>
+          <p:pic>
+            <p:nvPicPr>
+              <p:cNvPr id="132" name="그림 131">
+                <a:extLst>
+                  <a:ext uri="{FF2B5EF4-FFF2-40B4-BE49-F238E27FC236}">
+                    <a16:creationId xmlns:a16="http://schemas.microsoft.com/office/drawing/2014/main" id="{9F5D474D-F0EF-44D1-91CB-11516D2FC63B}"/>
+                  </a:ext>
+                </a:extLst>
+              </p:cNvPr>
+              <p:cNvPicPr>
+                <a:picLocks noChangeAspect="1"/>
+              </p:cNvPicPr>
+              <p:nvPr/>
+            </p:nvPicPr>
+            <p:blipFill>
+              <a:blip r:embed="rId3">
+                <a:extLst>
+                  <a:ext uri="{28A0092B-C50C-407E-A947-70E740481C1C}">
+                    <a14:useLocalDpi xmlns:a14="http://schemas.microsoft.com/office/drawing/2010/main" val="0"/>
+                  </a:ext>
+                </a:extLst>
+              </a:blip>
+              <a:stretch>
+                <a:fillRect/>
+              </a:stretch>
+            </p:blipFill>
+            <p:spPr>
+              <a:xfrm>
+                <a:off x="-600882" y="24545119"/>
+                <a:ext cx="12960000" cy="12960000"/>
+              </a:xfrm>
+              <a:prstGeom prst="rect">
+                <a:avLst/>
+              </a:prstGeom>
+              <a:ln>
+                <a:solidFill>
+                  <a:schemeClr val="tx1"/>
+                </a:solidFill>
+              </a:ln>
+            </p:spPr>
+          </p:pic>
+        </p:grpSp>
+        <p:grpSp>
+          <p:nvGrpSpPr>
+            <p:cNvPr id="119" name="그룹 118">
+              <a:extLst>
+                <a:ext uri="{FF2B5EF4-FFF2-40B4-BE49-F238E27FC236}">
+                  <a16:creationId xmlns:a16="http://schemas.microsoft.com/office/drawing/2014/main" id="{152A40CA-A388-4505-991E-2A5684BBC4CC}"/>
+                </a:ext>
+              </a:extLst>
+            </p:cNvPr>
+            <p:cNvGrpSpPr>
+              <a:grpSpLocks noChangeAspect="1"/>
+            </p:cNvGrpSpPr>
+            <p:nvPr/>
+          </p:nvGrpSpPr>
+          <p:grpSpPr>
+            <a:xfrm>
+              <a:off x="3060319" y="11703919"/>
+              <a:ext cx="10681200" cy="10681200"/>
+              <a:chOff x="328786" y="11703919"/>
+              <a:chExt cx="10681200" cy="10681200"/>
+            </a:xfrm>
+          </p:grpSpPr>
+          <p:sp>
+            <p:nvSpPr>
+              <p:cNvPr id="129" name="직사각형 128">
+                <a:extLst>
+                  <a:ext uri="{FF2B5EF4-FFF2-40B4-BE49-F238E27FC236}">
+                    <a16:creationId xmlns:a16="http://schemas.microsoft.com/office/drawing/2014/main" id="{7A5EDF32-BE6A-4575-8CCF-3991F30962DA}"/>
+                  </a:ext>
+                </a:extLst>
+              </p:cNvPr>
+              <p:cNvSpPr>
+                <a:spLocks noChangeAspect="1"/>
+              </p:cNvSpPr>
+              <p:nvPr/>
+            </p:nvSpPr>
+            <p:spPr>
+              <a:xfrm>
+                <a:off x="328786" y="11703919"/>
+                <a:ext cx="10681200" cy="10681200"/>
+              </a:xfrm>
+              <a:prstGeom prst="rect">
+                <a:avLst/>
+              </a:prstGeom>
+              <a:solidFill>
+                <a:schemeClr val="bg1"/>
+              </a:solidFill>
+              <a:ln>
+                <a:solidFill>
+                  <a:schemeClr val="tx1"/>
+                </a:solidFill>
+              </a:ln>
+            </p:spPr>
+            <p:style>
+              <a:lnRef idx="2">
+                <a:schemeClr val="accent1">
+                  <a:shade val="50000"/>
+                </a:schemeClr>
+              </a:lnRef>
+              <a:fillRef idx="1">
+                <a:schemeClr val="accent1"/>
+              </a:fillRef>
+              <a:effectRef idx="0">
+                <a:schemeClr val="accent1"/>
+              </a:effectRef>
+              <a:fontRef idx="minor">
+                <a:schemeClr val="lt1"/>
+              </a:fontRef>
+            </p:style>
+            <p:txBody>
+              <a:bodyPr rtlCol="0" anchor="ctr"/>
+              <a:lstStyle/>
+              <a:p>
+                <a:pPr algn="ctr"/>
+                <a:endParaRPr lang="en-US"/>
+              </a:p>
+            </p:txBody>
+          </p:sp>
+          <p:pic>
+            <p:nvPicPr>
+              <p:cNvPr id="130" name="그림 129">
+                <a:extLst>
+                  <a:ext uri="{FF2B5EF4-FFF2-40B4-BE49-F238E27FC236}">
+                    <a16:creationId xmlns:a16="http://schemas.microsoft.com/office/drawing/2014/main" id="{B4309043-6071-4481-94D5-432BDDDB0A3E}"/>
+                  </a:ext>
+                </a:extLst>
+              </p:cNvPr>
+              <p:cNvPicPr>
+                <a:picLocks noChangeAspect="1"/>
+              </p:cNvPicPr>
+              <p:nvPr/>
+            </p:nvPicPr>
+            <p:blipFill>
+              <a:blip r:embed="rId4">
+                <a:extLst>
+                  <a:ext uri="{28A0092B-C50C-407E-A947-70E740481C1C}">
+                    <a14:useLocalDpi xmlns:a14="http://schemas.microsoft.com/office/drawing/2010/main" val="0"/>
+                  </a:ext>
+                </a:extLst>
+              </a:blip>
+              <a:stretch>
+                <a:fillRect/>
+              </a:stretch>
+            </p:blipFill>
+            <p:spPr>
+              <a:xfrm>
+                <a:off x="1664386" y="13039519"/>
+                <a:ext cx="8010000" cy="8010000"/>
+              </a:xfrm>
+              <a:prstGeom prst="rect">
+                <a:avLst/>
+              </a:prstGeom>
+              <a:ln>
+                <a:solidFill>
+                  <a:schemeClr val="tx1"/>
+                </a:solidFill>
+              </a:ln>
+            </p:spPr>
+          </p:pic>
+        </p:grpSp>
+        <p:grpSp>
+          <p:nvGrpSpPr>
+            <p:cNvPr id="120" name="그룹 119">
+              <a:extLst>
+                <a:ext uri="{FF2B5EF4-FFF2-40B4-BE49-F238E27FC236}">
+                  <a16:creationId xmlns:a16="http://schemas.microsoft.com/office/drawing/2014/main" id="{8826FDBE-2F29-46AD-9812-79E7BFF5227E}"/>
+                </a:ext>
+              </a:extLst>
+            </p:cNvPr>
+            <p:cNvGrpSpPr>
+              <a:grpSpLocks noChangeAspect="1"/>
+            </p:cNvGrpSpPr>
+            <p:nvPr/>
+          </p:nvGrpSpPr>
+          <p:grpSpPr>
+            <a:xfrm>
+              <a:off x="13741518" y="11703919"/>
+              <a:ext cx="6598800" cy="6598800"/>
+              <a:chOff x="10314342" y="13626019"/>
+              <a:chExt cx="6598800" cy="6598800"/>
+            </a:xfrm>
+          </p:grpSpPr>
+          <p:sp>
+            <p:nvSpPr>
+              <p:cNvPr id="127" name="직사각형 126">
+                <a:extLst>
+                  <a:ext uri="{FF2B5EF4-FFF2-40B4-BE49-F238E27FC236}">
+                    <a16:creationId xmlns:a16="http://schemas.microsoft.com/office/drawing/2014/main" id="{0DC9F1C3-C382-497E-9952-1AF7845911D7}"/>
+                  </a:ext>
+                </a:extLst>
+              </p:cNvPr>
+              <p:cNvSpPr>
+                <a:spLocks noChangeAspect="1"/>
+              </p:cNvSpPr>
+              <p:nvPr/>
+            </p:nvSpPr>
+            <p:spPr>
+              <a:xfrm>
+                <a:off x="10314342" y="13626019"/>
+                <a:ext cx="6598800" cy="6598800"/>
+              </a:xfrm>
+              <a:prstGeom prst="rect">
+                <a:avLst/>
+              </a:prstGeom>
+              <a:solidFill>
+                <a:schemeClr val="bg1"/>
+              </a:solidFill>
+              <a:ln>
+                <a:solidFill>
+                  <a:schemeClr val="tx1"/>
+                </a:solidFill>
+              </a:ln>
+            </p:spPr>
+            <p:style>
+              <a:lnRef idx="2">
+                <a:schemeClr val="accent1">
+                  <a:shade val="50000"/>
+                </a:schemeClr>
+              </a:lnRef>
+              <a:fillRef idx="1">
+                <a:schemeClr val="accent1"/>
+              </a:fillRef>
+              <a:effectRef idx="0">
+                <a:schemeClr val="accent1"/>
+              </a:effectRef>
+              <a:fontRef idx="minor">
+                <a:schemeClr val="lt1"/>
+              </a:fontRef>
+            </p:style>
+            <p:txBody>
+              <a:bodyPr rtlCol="0" anchor="ctr"/>
+              <a:lstStyle/>
+              <a:p>
+                <a:pPr algn="ctr"/>
+                <a:endParaRPr lang="en-US"/>
+              </a:p>
+            </p:txBody>
+          </p:sp>
+          <p:pic>
+            <p:nvPicPr>
+              <p:cNvPr id="128" name="그림 127">
+                <a:extLst>
+                  <a:ext uri="{FF2B5EF4-FFF2-40B4-BE49-F238E27FC236}">
+                    <a16:creationId xmlns:a16="http://schemas.microsoft.com/office/drawing/2014/main" id="{8170F97D-8667-4A98-A7FB-F368BDF5724E}"/>
+                  </a:ext>
+                </a:extLst>
+              </p:cNvPr>
+              <p:cNvPicPr>
+                <a:picLocks noChangeAspect="1"/>
+              </p:cNvPicPr>
+              <p:nvPr/>
+            </p:nvPicPr>
+            <p:blipFill>
+              <a:blip r:embed="rId5">
+                <a:extLst>
+                  <a:ext uri="{28A0092B-C50C-407E-A947-70E740481C1C}">
+                    <a14:useLocalDpi xmlns:a14="http://schemas.microsoft.com/office/drawing/2010/main" val="0"/>
+                  </a:ext>
+                </a:extLst>
+              </a:blip>
+              <a:stretch>
+                <a:fillRect/>
+              </a:stretch>
+            </p:blipFill>
+            <p:spPr>
+              <a:xfrm>
+                <a:off x="11138742" y="14450419"/>
+                <a:ext cx="4950000" cy="4950000"/>
+              </a:xfrm>
+              <a:prstGeom prst="rect">
+                <a:avLst/>
+              </a:prstGeom>
+              <a:ln>
+                <a:solidFill>
+                  <a:schemeClr val="tx1"/>
+                </a:solidFill>
+              </a:ln>
+            </p:spPr>
+          </p:pic>
+        </p:grpSp>
+        <p:grpSp>
+          <p:nvGrpSpPr>
+            <p:cNvPr id="121" name="그룹 120">
+              <a:extLst>
+                <a:ext uri="{FF2B5EF4-FFF2-40B4-BE49-F238E27FC236}">
+                  <a16:creationId xmlns:a16="http://schemas.microsoft.com/office/drawing/2014/main" id="{B115DE13-46B8-41B1-BCD9-5D1425BFFDF8}"/>
+                </a:ext>
+              </a:extLst>
+            </p:cNvPr>
+            <p:cNvGrpSpPr>
+              <a:grpSpLocks noChangeAspect="1"/>
+            </p:cNvGrpSpPr>
+            <p:nvPr/>
+          </p:nvGrpSpPr>
+          <p:grpSpPr>
+            <a:xfrm>
+              <a:off x="16261519" y="18306319"/>
+              <a:ext cx="4078800" cy="4078800"/>
+              <a:chOff x="19082678" y="18936701"/>
+              <a:chExt cx="4078800" cy="4078800"/>
+            </a:xfrm>
+          </p:grpSpPr>
+          <p:sp>
+            <p:nvSpPr>
+              <p:cNvPr id="125" name="직사각형 124">
+                <a:extLst>
+                  <a:ext uri="{FF2B5EF4-FFF2-40B4-BE49-F238E27FC236}">
+                    <a16:creationId xmlns:a16="http://schemas.microsoft.com/office/drawing/2014/main" id="{FC01D763-7039-4E3B-ACE4-1DC437F078CA}"/>
+                  </a:ext>
+                </a:extLst>
+              </p:cNvPr>
+              <p:cNvSpPr>
+                <a:spLocks noChangeAspect="1"/>
+              </p:cNvSpPr>
+              <p:nvPr/>
+            </p:nvSpPr>
+            <p:spPr>
+              <a:xfrm>
+                <a:off x="19082678" y="18936701"/>
+                <a:ext cx="4078800" cy="4078800"/>
+              </a:xfrm>
+              <a:prstGeom prst="rect">
+                <a:avLst/>
+              </a:prstGeom>
+              <a:solidFill>
+                <a:schemeClr val="bg1"/>
+              </a:solidFill>
+              <a:ln>
+                <a:solidFill>
+                  <a:schemeClr val="tx1"/>
+                </a:solidFill>
+              </a:ln>
+            </p:spPr>
+            <p:style>
+              <a:lnRef idx="2">
+                <a:schemeClr val="accent1">
+                  <a:shade val="50000"/>
+                </a:schemeClr>
+              </a:lnRef>
+              <a:fillRef idx="1">
+                <a:schemeClr val="accent1"/>
+              </a:fillRef>
+              <a:effectRef idx="0">
+                <a:schemeClr val="accent1"/>
+              </a:effectRef>
+              <a:fontRef idx="minor">
+                <a:schemeClr val="lt1"/>
+              </a:fontRef>
+            </p:style>
+            <p:txBody>
+              <a:bodyPr rtlCol="0" anchor="ctr"/>
+              <a:lstStyle/>
+              <a:p>
+                <a:pPr algn="ctr"/>
+                <a:endParaRPr lang="en-US"/>
+              </a:p>
+            </p:txBody>
+          </p:sp>
+          <p:pic>
+            <p:nvPicPr>
+              <p:cNvPr id="126" name="그림 125">
+                <a:extLst>
+                  <a:ext uri="{FF2B5EF4-FFF2-40B4-BE49-F238E27FC236}">
+                    <a16:creationId xmlns:a16="http://schemas.microsoft.com/office/drawing/2014/main" id="{8F7D42E0-198A-4F33-AB5B-F4A56147DB1A}"/>
+                  </a:ext>
+                </a:extLst>
+              </p:cNvPr>
+              <p:cNvPicPr>
+                <a:picLocks noChangeAspect="1"/>
+              </p:cNvPicPr>
+              <p:nvPr/>
+            </p:nvPicPr>
+            <p:blipFill>
+              <a:blip r:embed="rId6">
+                <a:extLst>
+                  <a:ext uri="{28A0092B-C50C-407E-A947-70E740481C1C}">
+                    <a14:useLocalDpi xmlns:a14="http://schemas.microsoft.com/office/drawing/2010/main" val="0"/>
+                  </a:ext>
+                </a:extLst>
+              </a:blip>
+              <a:stretch>
+                <a:fillRect/>
+              </a:stretch>
+            </p:blipFill>
+            <p:spPr>
+              <a:xfrm>
+                <a:off x="19592078" y="19446101"/>
+                <a:ext cx="3060000" cy="3060000"/>
+              </a:xfrm>
+              <a:prstGeom prst="rect">
+                <a:avLst/>
+              </a:prstGeom>
+              <a:ln>
+                <a:solidFill>
+                  <a:schemeClr val="tx1"/>
+                </a:solidFill>
+              </a:ln>
+            </p:spPr>
+          </p:pic>
+        </p:grpSp>
+        <p:grpSp>
+          <p:nvGrpSpPr>
+            <p:cNvPr id="122" name="그룹 121">
+              <a:extLst>
+                <a:ext uri="{FF2B5EF4-FFF2-40B4-BE49-F238E27FC236}">
+                  <a16:creationId xmlns:a16="http://schemas.microsoft.com/office/drawing/2014/main" id="{E54C0027-68F2-4346-92DB-94617CF8B267}"/>
+                </a:ext>
+              </a:extLst>
+            </p:cNvPr>
+            <p:cNvGrpSpPr>
+              <a:grpSpLocks noChangeAspect="1"/>
+            </p:cNvGrpSpPr>
+            <p:nvPr/>
+          </p:nvGrpSpPr>
+          <p:grpSpPr>
+            <a:xfrm>
+              <a:off x="13741518" y="18306319"/>
+              <a:ext cx="1555200" cy="1555200"/>
+              <a:chOff x="26644062" y="18487410"/>
+              <a:chExt cx="1555200" cy="1555200"/>
+            </a:xfrm>
+          </p:grpSpPr>
+          <p:sp>
+            <p:nvSpPr>
+              <p:cNvPr id="123" name="직사각형 122">
+                <a:extLst>
+                  <a:ext uri="{FF2B5EF4-FFF2-40B4-BE49-F238E27FC236}">
+                    <a16:creationId xmlns:a16="http://schemas.microsoft.com/office/drawing/2014/main" id="{62AE4E21-7CB0-4A60-84AC-04E25CD40332}"/>
+                  </a:ext>
+                </a:extLst>
+              </p:cNvPr>
+              <p:cNvSpPr>
+                <a:spLocks noChangeAspect="1"/>
+              </p:cNvSpPr>
+              <p:nvPr/>
+            </p:nvSpPr>
+            <p:spPr>
+              <a:xfrm>
+                <a:off x="26644062" y="18487410"/>
+                <a:ext cx="1555200" cy="1555200"/>
+              </a:xfrm>
+              <a:prstGeom prst="rect">
+                <a:avLst/>
+              </a:prstGeom>
+              <a:solidFill>
+                <a:schemeClr val="bg1"/>
+              </a:solidFill>
+              <a:ln>
+                <a:solidFill>
+                  <a:schemeClr val="tx1"/>
+                </a:solidFill>
+              </a:ln>
+            </p:spPr>
+            <p:style>
+              <a:lnRef idx="2">
+                <a:schemeClr val="accent1">
+                  <a:shade val="50000"/>
+                </a:schemeClr>
+              </a:lnRef>
+              <a:fillRef idx="1">
+                <a:schemeClr val="accent1"/>
+              </a:fillRef>
+              <a:effectRef idx="0">
+                <a:schemeClr val="accent1"/>
+              </a:effectRef>
+              <a:fontRef idx="minor">
+                <a:schemeClr val="lt1"/>
+              </a:fontRef>
+            </p:style>
+            <p:txBody>
+              <a:bodyPr rtlCol="0" anchor="ctr"/>
+              <a:lstStyle/>
+              <a:p>
+                <a:pPr algn="ctr"/>
+                <a:endParaRPr lang="en-US"/>
+              </a:p>
+            </p:txBody>
+          </p:sp>
+          <p:pic>
+            <p:nvPicPr>
+              <p:cNvPr id="124" name="그림 123">
+                <a:extLst>
+                  <a:ext uri="{FF2B5EF4-FFF2-40B4-BE49-F238E27FC236}">
+                    <a16:creationId xmlns:a16="http://schemas.microsoft.com/office/drawing/2014/main" id="{DC5223DE-CD70-4331-B176-B043BD58281D}"/>
+                  </a:ext>
+                </a:extLst>
+              </p:cNvPr>
+              <p:cNvPicPr>
+                <a:picLocks noChangeAspect="1"/>
+              </p:cNvPicPr>
+              <p:nvPr/>
+            </p:nvPicPr>
+            <p:blipFill>
+              <a:blip r:embed="rId7">
+                <a:extLst>
+                  <a:ext uri="{28A0092B-C50C-407E-A947-70E740481C1C}">
+                    <a14:useLocalDpi xmlns:a14="http://schemas.microsoft.com/office/drawing/2010/main" val="0"/>
+                  </a:ext>
+                </a:extLst>
+              </a:blip>
+              <a:stretch>
+                <a:fillRect/>
+              </a:stretch>
+            </p:blipFill>
+            <p:spPr>
+              <a:xfrm>
+                <a:off x="26838462" y="18681810"/>
+                <a:ext cx="1166400" cy="1166400"/>
+              </a:xfrm>
+              <a:prstGeom prst="rect">
+                <a:avLst/>
+              </a:prstGeom>
+              <a:ln>
+                <a:solidFill>
+                  <a:schemeClr val="tx1"/>
+                </a:solidFill>
+              </a:ln>
+            </p:spPr>
+          </p:pic>
+        </p:grpSp>
+      </p:grpSp>
     </p:spTree>
     <p:extLst>
       <p:ext uri="{BB962C8B-B14F-4D97-AF65-F5344CB8AC3E}">

</xml_diff>